<commit_message>
modification de l'emploi du temps
</commit_message>
<xml_diff>
--- a/ProjetFinal/emploi_du_temps.pptx
+++ b/ProjetFinal/emploi_du_temps.pptx
@@ -105,6 +105,11 @@
       </a:defRPr>
     </a:lvl9pPr>
   </p:defaultTextStyle>
+  <p:extLst>
+    <p:ext uri="{EFAFB233-063F-42B5-8137-9DF3F51BA10A}">
+      <p15:sldGuideLst xmlns:p15="http://schemas.microsoft.com/office/powerpoint/2012/main"/>
+    </p:ext>
+  </p:extLst>
 </p:presentation>
 </file>
 
@@ -153,7 +158,6 @@
               <a:rPr lang="fr-FR"/>
               <a:t>Modifiez le style du titre</a:t>
             </a:r>
-            <a:endParaRPr lang="fr-FR"/>
           </a:p>
         </p:txBody>
       </p:sp>
@@ -218,7 +222,6 @@
               <a:rPr lang="fr-FR"/>
               <a:t>Modifier le style des sous-titres du masque</a:t>
             </a:r>
-            <a:endParaRPr lang="fr-FR"/>
           </a:p>
         </p:txBody>
       </p:sp>
@@ -239,7 +242,7 @@
           <a:p>
             <a:fld id="{E6D6A868-46C5-4133-82EC-09BCA41D9628}" type="datetimeFigureOut">
               <a:rPr lang="fr-FR" smtClean="0"/>
-              <a:t>19/01/2017</a:t>
+              <a:t>21/01/2017</a:t>
             </a:fld>
             <a:endParaRPr lang="fr-FR"/>
           </a:p>
@@ -336,7 +339,6 @@
               <a:rPr lang="fr-FR"/>
               <a:t>Modifiez le style du titre</a:t>
             </a:r>
-            <a:endParaRPr lang="fr-FR"/>
           </a:p>
         </p:txBody>
       </p:sp>
@@ -388,7 +390,6 @@
               <a:rPr lang="fr-FR"/>
               <a:t>Cinquième niveau</a:t>
             </a:r>
-            <a:endParaRPr lang="fr-FR"/>
           </a:p>
         </p:txBody>
       </p:sp>
@@ -409,7 +410,7 @@
           <a:p>
             <a:fld id="{E6D6A868-46C5-4133-82EC-09BCA41D9628}" type="datetimeFigureOut">
               <a:rPr lang="fr-FR" smtClean="0"/>
-              <a:t>19/01/2017</a:t>
+              <a:t>21/01/2017</a:t>
             </a:fld>
             <a:endParaRPr lang="fr-FR"/>
           </a:p>
@@ -511,7 +512,6 @@
               <a:rPr lang="fr-FR"/>
               <a:t>Modifiez le style du titre</a:t>
             </a:r>
-            <a:endParaRPr lang="fr-FR"/>
           </a:p>
         </p:txBody>
       </p:sp>
@@ -568,7 +568,6 @@
               <a:rPr lang="fr-FR"/>
               <a:t>Cinquième niveau</a:t>
             </a:r>
-            <a:endParaRPr lang="fr-FR"/>
           </a:p>
         </p:txBody>
       </p:sp>
@@ -589,7 +588,7 @@
           <a:p>
             <a:fld id="{E6D6A868-46C5-4133-82EC-09BCA41D9628}" type="datetimeFigureOut">
               <a:rPr lang="fr-FR" smtClean="0"/>
-              <a:t>19/01/2017</a:t>
+              <a:t>21/01/2017</a:t>
             </a:fld>
             <a:endParaRPr lang="fr-FR"/>
           </a:p>
@@ -686,7 +685,6 @@
               <a:rPr lang="fr-FR"/>
               <a:t>Modifiez le style du titre</a:t>
             </a:r>
-            <a:endParaRPr lang="fr-FR"/>
           </a:p>
         </p:txBody>
       </p:sp>
@@ -738,7 +736,6 @@
               <a:rPr lang="fr-FR"/>
               <a:t>Cinquième niveau</a:t>
             </a:r>
-            <a:endParaRPr lang="fr-FR"/>
           </a:p>
         </p:txBody>
       </p:sp>
@@ -759,7 +756,7 @@
           <a:p>
             <a:fld id="{E6D6A868-46C5-4133-82EC-09BCA41D9628}" type="datetimeFigureOut">
               <a:rPr lang="fr-FR" smtClean="0"/>
-              <a:t>19/01/2017</a:t>
+              <a:t>21/01/2017</a:t>
             </a:fld>
             <a:endParaRPr lang="fr-FR"/>
           </a:p>
@@ -865,7 +862,6 @@
               <a:rPr lang="fr-FR"/>
               <a:t>Modifiez le style du titre</a:t>
             </a:r>
-            <a:endParaRPr lang="fr-FR"/>
           </a:p>
         </p:txBody>
       </p:sp>
@@ -1005,7 +1001,7 @@
           <a:p>
             <a:fld id="{E6D6A868-46C5-4133-82EC-09BCA41D9628}" type="datetimeFigureOut">
               <a:rPr lang="fr-FR" smtClean="0"/>
-              <a:t>19/01/2017</a:t>
+              <a:t>21/01/2017</a:t>
             </a:fld>
             <a:endParaRPr lang="fr-FR"/>
           </a:p>
@@ -1102,7 +1098,6 @@
               <a:rPr lang="fr-FR"/>
               <a:t>Modifiez le style du titre</a:t>
             </a:r>
-            <a:endParaRPr lang="fr-FR"/>
           </a:p>
         </p:txBody>
       </p:sp>
@@ -1159,7 +1154,6 @@
               <a:rPr lang="fr-FR"/>
               <a:t>Cinquième niveau</a:t>
             </a:r>
-            <a:endParaRPr lang="fr-FR"/>
           </a:p>
         </p:txBody>
       </p:sp>
@@ -1216,7 +1210,6 @@
               <a:rPr lang="fr-FR"/>
               <a:t>Cinquième niveau</a:t>
             </a:r>
-            <a:endParaRPr lang="fr-FR"/>
           </a:p>
         </p:txBody>
       </p:sp>
@@ -1237,7 +1230,7 @@
           <a:p>
             <a:fld id="{E6D6A868-46C5-4133-82EC-09BCA41D9628}" type="datetimeFigureOut">
               <a:rPr lang="fr-FR" smtClean="0"/>
-              <a:t>19/01/2017</a:t>
+              <a:t>21/01/2017</a:t>
             </a:fld>
             <a:endParaRPr lang="fr-FR"/>
           </a:p>
@@ -1339,7 +1332,6 @@
               <a:rPr lang="fr-FR"/>
               <a:t>Modifiez le style du titre</a:t>
             </a:r>
-            <a:endParaRPr lang="fr-FR"/>
           </a:p>
         </p:txBody>
       </p:sp>
@@ -1461,7 +1453,6 @@
               <a:rPr lang="fr-FR"/>
               <a:t>Cinquième niveau</a:t>
             </a:r>
-            <a:endParaRPr lang="fr-FR"/>
           </a:p>
         </p:txBody>
       </p:sp>
@@ -1583,7 +1574,6 @@
               <a:rPr lang="fr-FR"/>
               <a:t>Cinquième niveau</a:t>
             </a:r>
-            <a:endParaRPr lang="fr-FR"/>
           </a:p>
         </p:txBody>
       </p:sp>
@@ -1604,7 +1594,7 @@
           <a:p>
             <a:fld id="{E6D6A868-46C5-4133-82EC-09BCA41D9628}" type="datetimeFigureOut">
               <a:rPr lang="fr-FR" smtClean="0"/>
-              <a:t>19/01/2017</a:t>
+              <a:t>21/01/2017</a:t>
             </a:fld>
             <a:endParaRPr lang="fr-FR"/>
           </a:p>
@@ -1701,7 +1691,6 @@
               <a:rPr lang="fr-FR"/>
               <a:t>Modifiez le style du titre</a:t>
             </a:r>
-            <a:endParaRPr lang="fr-FR"/>
           </a:p>
         </p:txBody>
       </p:sp>
@@ -1722,7 +1711,7 @@
           <a:p>
             <a:fld id="{E6D6A868-46C5-4133-82EC-09BCA41D9628}" type="datetimeFigureOut">
               <a:rPr lang="fr-FR" smtClean="0"/>
-              <a:t>19/01/2017</a:t>
+              <a:t>21/01/2017</a:t>
             </a:fld>
             <a:endParaRPr lang="fr-FR"/>
           </a:p>
@@ -1817,7 +1806,7 @@
           <a:p>
             <a:fld id="{E6D6A868-46C5-4133-82EC-09BCA41D9628}" type="datetimeFigureOut">
               <a:rPr lang="fr-FR" smtClean="0"/>
-              <a:t>19/01/2017</a:t>
+              <a:t>21/01/2017</a:t>
             </a:fld>
             <a:endParaRPr lang="fr-FR"/>
           </a:p>
@@ -1923,7 +1912,6 @@
               <a:rPr lang="fr-FR"/>
               <a:t>Modifiez le style du titre</a:t>
             </a:r>
-            <a:endParaRPr lang="fr-FR"/>
           </a:p>
         </p:txBody>
       </p:sp>
@@ -2008,7 +1996,6 @@
               <a:rPr lang="fr-FR"/>
               <a:t>Cinquième niveau</a:t>
             </a:r>
-            <a:endParaRPr lang="fr-FR"/>
           </a:p>
         </p:txBody>
       </p:sp>
@@ -2094,7 +2081,7 @@
           <a:p>
             <a:fld id="{E6D6A868-46C5-4133-82EC-09BCA41D9628}" type="datetimeFigureOut">
               <a:rPr lang="fr-FR" smtClean="0"/>
-              <a:t>19/01/2017</a:t>
+              <a:t>21/01/2017</a:t>
             </a:fld>
             <a:endParaRPr lang="fr-FR"/>
           </a:p>
@@ -2200,7 +2187,6 @@
               <a:rPr lang="fr-FR"/>
               <a:t>Modifiez le style du titre</a:t>
             </a:r>
-            <a:endParaRPr lang="fr-FR"/>
           </a:p>
         </p:txBody>
       </p:sp>
@@ -2347,7 +2333,7 @@
           <a:p>
             <a:fld id="{E6D6A868-46C5-4133-82EC-09BCA41D9628}" type="datetimeFigureOut">
               <a:rPr lang="fr-FR" smtClean="0"/>
-              <a:t>19/01/2017</a:t>
+              <a:t>21/01/2017</a:t>
             </a:fld>
             <a:endParaRPr lang="fr-FR"/>
           </a:p>
@@ -2459,7 +2445,6 @@
               <a:rPr lang="fr-FR"/>
               <a:t>Modifiez le style du titre</a:t>
             </a:r>
-            <a:endParaRPr lang="fr-FR"/>
           </a:p>
         </p:txBody>
       </p:sp>
@@ -2521,7 +2506,6 @@
               <a:rPr lang="fr-FR"/>
               <a:t>Cinquième niveau</a:t>
             </a:r>
-            <a:endParaRPr lang="fr-FR"/>
           </a:p>
         </p:txBody>
       </p:sp>
@@ -2560,7 +2544,7 @@
           <a:p>
             <a:fld id="{E6D6A868-46C5-4133-82EC-09BCA41D9628}" type="datetimeFigureOut">
               <a:rPr lang="fr-FR" smtClean="0"/>
-              <a:t>19/01/2017</a:t>
+              <a:t>21/01/2017</a:t>
             </a:fld>
             <a:endParaRPr lang="fr-FR"/>
           </a:p>
@@ -3041,7 +3025,7 @@
       </p:grpSpPr>
       <p:cxnSp>
         <p:nvCxnSpPr>
-          <p:cNvPr id="96" name="OTLSHAPE_T_639eb425594949de89152d34c2f53fa5_HorizontalConnector1"/>
+          <p:cNvPr id="185" name="OTLSHAPE_T_639eb425594949de89152d34c2f53fa5_HorizontalConnector1"/>
           <p:cNvCxnSpPr/>
           <p:nvPr>
             <p:custDataLst>
@@ -3052,7 +3036,7 @@
         <p:spPr>
           <a:xfrm>
             <a:off x="2304881" y="4846955"/>
-            <a:ext cx="5450539" cy="0"/>
+            <a:ext cx="6425118" cy="0"/>
           </a:xfrm>
           <a:prstGeom prst="line">
             <a:avLst/>
@@ -3084,7 +3068,7 @@
       </p:cxnSp>
       <p:cxnSp>
         <p:nvCxnSpPr>
-          <p:cNvPr id="95" name="OTLSHAPE_T_fbac9a43b55f469785cde806223acaa7_HorizontalConnector1"/>
+          <p:cNvPr id="184" name="OTLSHAPE_T_fbac9a43b55f469785cde806223acaa7_HorizontalConnector1"/>
           <p:cNvCxnSpPr/>
           <p:nvPr>
             <p:custDataLst>
@@ -3095,7 +3079,7 @@
         <p:spPr>
           <a:xfrm>
             <a:off x="3168438" y="4580255"/>
-            <a:ext cx="2743183" cy="0"/>
+            <a:ext cx="3454362" cy="0"/>
           </a:xfrm>
           <a:prstGeom prst="line">
             <a:avLst/>
@@ -3127,7 +3111,7 @@
       </p:cxnSp>
       <p:cxnSp>
         <p:nvCxnSpPr>
-          <p:cNvPr id="94" name="OTLSHAPE_T_db597cc912f24b6eabbfea838f8807b7_HorizontalConnector1"/>
+          <p:cNvPr id="183" name="OTLSHAPE_T_95165ce96d724c39a18b4303569a4811_HorizontalConnector1"/>
           <p:cNvCxnSpPr/>
           <p:nvPr>
             <p:custDataLst>
@@ -3137,8 +3121,8 @@
         </p:nvCxnSpPr>
         <p:spPr>
           <a:xfrm>
-            <a:off x="2175838" y="4046855"/>
-            <a:ext cx="1385242" cy="0"/>
+            <a:off x="3834850" y="4313555"/>
+            <a:ext cx="470033" cy="0"/>
           </a:xfrm>
           <a:prstGeom prst="line">
             <a:avLst/>
@@ -3170,7 +3154,7 @@
       </p:cxnSp>
       <p:cxnSp>
         <p:nvCxnSpPr>
-          <p:cNvPr id="93" name="OTLSHAPE_M_a19c5bf51c9e4549a3efa4cff3afbcae_Connector1"/>
+          <p:cNvPr id="182" name="OTLSHAPE_T_db597cc912f24b6eabbfea838f8807b7_HorizontalConnector1"/>
           <p:cNvCxnSpPr/>
           <p:nvPr>
             <p:custDataLst>
@@ -3180,8 +3164,276 @@
         </p:nvCxnSpPr>
         <p:spPr>
           <a:xfrm>
-            <a:off x="10896227" y="2520569"/>
-            <a:ext cx="0" cy="527431"/>
+            <a:off x="2644742" y="4046855"/>
+            <a:ext cx="916338" cy="0"/>
+          </a:xfrm>
+          <a:prstGeom prst="line">
+            <a:avLst/>
+          </a:prstGeom>
+          <a:ln w="7620" cap="flat" cmpd="sng" algn="ctr">
+            <a:solidFill>
+              <a:srgbClr val="CCCCCC"/>
+            </a:solidFill>
+            <a:prstDash val="solid"/>
+            <a:miter lim="800000"/>
+            <a:headEnd type="none" w="med" len="med"/>
+            <a:tailEnd type="none" w="med" len="med"/>
+          </a:ln>
+        </p:spPr>
+        <p:style>
+          <a:lnRef idx="1">
+            <a:schemeClr val="accent1"/>
+          </a:lnRef>
+          <a:fillRef idx="0">
+            <a:schemeClr val="accent1"/>
+          </a:fillRef>
+          <a:effectRef idx="0">
+            <a:schemeClr val="accent1"/>
+          </a:effectRef>
+          <a:fontRef idx="minor">
+            <a:schemeClr val="tx1"/>
+          </a:fontRef>
+        </p:style>
+      </p:cxnSp>
+      <p:cxnSp>
+        <p:nvCxnSpPr>
+          <p:cNvPr id="181" name="OTLSHAPE_M_61389f5b35b343aaa5f616914a4067b0_Connector1"/>
+          <p:cNvCxnSpPr/>
+          <p:nvPr>
+            <p:custDataLst>
+              <p:tags r:id="rId6"/>
+            </p:custDataLst>
+          </p:nvPr>
+        </p:nvCxnSpPr>
+        <p:spPr>
+          <a:xfrm>
+            <a:off x="9368509" y="2605828"/>
+            <a:ext cx="0" cy="442172"/>
+          </a:xfrm>
+          <a:prstGeom prst="line">
+            <a:avLst/>
+          </a:prstGeom>
+          <a:ln w="7620" cap="flat" cmpd="sng" algn="ctr">
+            <a:solidFill>
+              <a:schemeClr val="accent5">
+                <a:alpha val="49804"/>
+              </a:schemeClr>
+            </a:solidFill>
+            <a:prstDash val="solid"/>
+            <a:miter lim="800000"/>
+            <a:headEnd type="none" w="med" len="med"/>
+            <a:tailEnd type="none" w="med" len="med"/>
+          </a:ln>
+        </p:spPr>
+        <p:style>
+          <a:lnRef idx="1">
+            <a:schemeClr val="accent1"/>
+          </a:lnRef>
+          <a:fillRef idx="0">
+            <a:schemeClr val="accent1"/>
+          </a:fillRef>
+          <a:effectRef idx="0">
+            <a:schemeClr val="accent1"/>
+          </a:effectRef>
+          <a:fontRef idx="minor">
+            <a:schemeClr val="tx1"/>
+          </a:fontRef>
+        </p:style>
+      </p:cxnSp>
+      <p:cxnSp>
+        <p:nvCxnSpPr>
+          <p:cNvPr id="180" name="OTLSHAPE_M_05b33898657548eebb3ddd1d2a9da8c3_Connector1"/>
+          <p:cNvCxnSpPr/>
+          <p:nvPr>
+            <p:custDataLst>
+              <p:tags r:id="rId7"/>
+            </p:custDataLst>
+          </p:nvPr>
+        </p:nvCxnSpPr>
+        <p:spPr>
+          <a:xfrm>
+            <a:off x="7893470" y="2068026"/>
+            <a:ext cx="0" cy="979974"/>
+          </a:xfrm>
+          <a:prstGeom prst="line">
+            <a:avLst/>
+          </a:prstGeom>
+          <a:ln w="7620" cap="flat" cmpd="sng" algn="ctr">
+            <a:solidFill>
+              <a:schemeClr val="accent4">
+                <a:alpha val="49804"/>
+              </a:schemeClr>
+            </a:solidFill>
+            <a:prstDash val="solid"/>
+            <a:miter lim="800000"/>
+            <a:headEnd type="none" w="med" len="med"/>
+            <a:tailEnd type="none" w="med" len="med"/>
+          </a:ln>
+        </p:spPr>
+        <p:style>
+          <a:lnRef idx="1">
+            <a:schemeClr val="accent1"/>
+          </a:lnRef>
+          <a:fillRef idx="0">
+            <a:schemeClr val="accent1"/>
+          </a:fillRef>
+          <a:effectRef idx="0">
+            <a:schemeClr val="accent1"/>
+          </a:effectRef>
+          <a:fontRef idx="minor">
+            <a:schemeClr val="tx1"/>
+          </a:fontRef>
+        </p:style>
+      </p:cxnSp>
+      <p:cxnSp>
+        <p:nvCxnSpPr>
+          <p:cNvPr id="179" name="OTLSHAPE_M_354cfcf56363456cb91d0fe6a7aa2f3a_Connector1"/>
+          <p:cNvCxnSpPr/>
+          <p:nvPr>
+            <p:custDataLst>
+              <p:tags r:id="rId8"/>
+            </p:custDataLst>
+          </p:nvPr>
+        </p:nvCxnSpPr>
+        <p:spPr>
+          <a:xfrm>
+            <a:off x="6418431" y="2605828"/>
+            <a:ext cx="0" cy="442172"/>
+          </a:xfrm>
+          <a:prstGeom prst="line">
+            <a:avLst/>
+          </a:prstGeom>
+          <a:ln w="7620" cap="flat" cmpd="sng" algn="ctr">
+            <a:solidFill>
+              <a:schemeClr val="accent3">
+                <a:alpha val="49804"/>
+              </a:schemeClr>
+            </a:solidFill>
+            <a:prstDash val="solid"/>
+            <a:miter lim="800000"/>
+            <a:headEnd type="none" w="med" len="med"/>
+            <a:tailEnd type="none" w="med" len="med"/>
+          </a:ln>
+        </p:spPr>
+        <p:style>
+          <a:lnRef idx="1">
+            <a:schemeClr val="accent1"/>
+          </a:lnRef>
+          <a:fillRef idx="0">
+            <a:schemeClr val="accent1"/>
+          </a:fillRef>
+          <a:effectRef idx="0">
+            <a:schemeClr val="accent1"/>
+          </a:effectRef>
+          <a:fontRef idx="minor">
+            <a:schemeClr val="tx1"/>
+          </a:fontRef>
+        </p:style>
+      </p:cxnSp>
+      <p:cxnSp>
+        <p:nvCxnSpPr>
+          <p:cNvPr id="178" name="OTLSHAPE_M_f1dd5c3f7a114b44a9e2d099bf632a46_Connector2"/>
+          <p:cNvCxnSpPr/>
+          <p:nvPr>
+            <p:custDataLst>
+              <p:tags r:id="rId9"/>
+            </p:custDataLst>
+          </p:nvPr>
+        </p:nvCxnSpPr>
+        <p:spPr>
+          <a:xfrm>
+            <a:off x="4943392" y="2664375"/>
+            <a:ext cx="0" cy="383625"/>
+          </a:xfrm>
+          <a:prstGeom prst="line">
+            <a:avLst/>
+          </a:prstGeom>
+          <a:ln w="7620" cap="flat" cmpd="sng" algn="ctr">
+            <a:solidFill>
+              <a:schemeClr val="accent2">
+                <a:alpha val="49804"/>
+              </a:schemeClr>
+            </a:solidFill>
+            <a:prstDash val="solid"/>
+            <a:miter lim="800000"/>
+            <a:headEnd type="none" w="med" len="med"/>
+            <a:tailEnd type="none" w="med" len="med"/>
+          </a:ln>
+        </p:spPr>
+        <p:style>
+          <a:lnRef idx="1">
+            <a:schemeClr val="accent1"/>
+          </a:lnRef>
+          <a:fillRef idx="0">
+            <a:schemeClr val="accent1"/>
+          </a:fillRef>
+          <a:effectRef idx="0">
+            <a:schemeClr val="accent1"/>
+          </a:effectRef>
+          <a:fontRef idx="minor">
+            <a:schemeClr val="tx1"/>
+          </a:fontRef>
+        </p:style>
+      </p:cxnSp>
+      <p:cxnSp>
+        <p:nvCxnSpPr>
+          <p:cNvPr id="177" name="OTLSHAPE_M_f1dd5c3f7a114b44a9e2d099bf632a46_Connector1"/>
+          <p:cNvCxnSpPr/>
+          <p:nvPr>
+            <p:custDataLst>
+              <p:tags r:id="rId10"/>
+            </p:custDataLst>
+          </p:nvPr>
+        </p:nvCxnSpPr>
+        <p:spPr>
+          <a:xfrm>
+            <a:off x="4943392" y="2068026"/>
+            <a:ext cx="0" cy="425831"/>
+          </a:xfrm>
+          <a:prstGeom prst="line">
+            <a:avLst/>
+          </a:prstGeom>
+          <a:ln w="7620" cap="flat" cmpd="sng" algn="ctr">
+            <a:solidFill>
+              <a:schemeClr val="accent2">
+                <a:alpha val="49804"/>
+              </a:schemeClr>
+            </a:solidFill>
+            <a:prstDash val="solid"/>
+            <a:miter lim="800000"/>
+            <a:headEnd type="none" w="med" len="med"/>
+            <a:tailEnd type="none" w="med" len="med"/>
+          </a:ln>
+        </p:spPr>
+        <p:style>
+          <a:lnRef idx="1">
+            <a:schemeClr val="accent1"/>
+          </a:lnRef>
+          <a:fillRef idx="0">
+            <a:schemeClr val="accent1"/>
+          </a:fillRef>
+          <a:effectRef idx="0">
+            <a:schemeClr val="accent1"/>
+          </a:effectRef>
+          <a:fontRef idx="minor">
+            <a:schemeClr val="tx1"/>
+          </a:fontRef>
+        </p:style>
+      </p:cxnSp>
+      <p:cxnSp>
+        <p:nvCxnSpPr>
+          <p:cNvPr id="176" name="OTLSHAPE_M_a19c5bf51c9e4549a3efa4cff3afbcae_Connector1"/>
+          <p:cNvCxnSpPr/>
+          <p:nvPr>
+            <p:custDataLst>
+              <p:tags r:id="rId11"/>
+            </p:custDataLst>
+          </p:nvPr>
+        </p:nvCxnSpPr>
+        <p:spPr>
+          <a:xfrm>
+            <a:off x="3468353" y="2605828"/>
+            <a:ext cx="0" cy="442172"/>
           </a:xfrm>
           <a:prstGeom prst="line">
             <a:avLst/>
@@ -3215,11 +3467,11 @@
       </p:cxnSp>
       <p:sp>
         <p:nvSpPr>
-          <p:cNvPr id="72" name="OTLSHAPE_TB_00000000000000000000000000000000_LeftEndCaps"/>
+          <p:cNvPr id="157" name="OTLSHAPE_TB_00000000000000000000000000000000_LeftEndCaps"/>
           <p:cNvSpPr txBox="1"/>
           <p:nvPr>
             <p:custDataLst>
-              <p:tags r:id="rId6"/>
+              <p:tags r:id="rId12"/>
             </p:custDataLst>
           </p:nvPr>
         </p:nvSpPr>
@@ -3260,11 +3512,11 @@
       </p:sp>
       <p:sp>
         <p:nvSpPr>
-          <p:cNvPr id="73" name="OTLSHAPE_TB_00000000000000000000000000000000_RightEndCaps"/>
+          <p:cNvPr id="158" name="OTLSHAPE_TB_00000000000000000000000000000000_RightEndCaps"/>
           <p:cNvSpPr txBox="1"/>
           <p:nvPr>
             <p:custDataLst>
-              <p:tags r:id="rId7"/>
+              <p:tags r:id="rId13"/>
             </p:custDataLst>
           </p:nvPr>
         </p:nvSpPr>
@@ -3305,11 +3557,11 @@
       </p:sp>
       <p:sp>
         <p:nvSpPr>
-          <p:cNvPr id="74" name="OTLSHAPE_TB_00000000000000000000000000000000_ScaleContainer"/>
+          <p:cNvPr id="159" name="OTLSHAPE_TB_00000000000000000000000000000000_ScaleContainer"/>
           <p:cNvSpPr/>
           <p:nvPr>
             <p:custDataLst>
-              <p:tags r:id="rId8"/>
+              <p:tags r:id="rId14"/>
             </p:custDataLst>
           </p:nvPr>
         </p:nvSpPr>
@@ -3391,18 +3643,18 @@
       </p:sp>
       <p:sp>
         <p:nvSpPr>
-          <p:cNvPr id="75" name="OTLSHAPE_TB_00000000000000000000000000000000_ElapsedTime"/>
+          <p:cNvPr id="160" name="OTLSHAPE_TB_00000000000000000000000000000000_ElapsedTime"/>
           <p:cNvSpPr/>
           <p:nvPr>
             <p:custDataLst>
-              <p:tags r:id="rId9"/>
+              <p:tags r:id="rId15"/>
             </p:custDataLst>
           </p:nvPr>
         </p:nvSpPr>
         <p:spPr>
           <a:xfrm>
             <a:off x="933365" y="3352800"/>
-            <a:ext cx="889000" cy="76200"/>
+            <a:ext cx="1358900" cy="76200"/>
           </a:xfrm>
           <a:prstGeom prst="rect">
             <a:avLst/>
@@ -3468,17 +3720,17 @@
       </p:sp>
       <p:sp>
         <p:nvSpPr>
-          <p:cNvPr id="76" name="OTLSHAPE_TB_00000000000000000000000000000000_TodayMarkerShape"/>
+          <p:cNvPr id="161" name="OTLSHAPE_TB_00000000000000000000000000000000_TodayMarkerShape"/>
           <p:cNvSpPr/>
           <p:nvPr>
             <p:custDataLst>
-              <p:tags r:id="rId10"/>
+              <p:tags r:id="rId16"/>
             </p:custDataLst>
           </p:nvPr>
         </p:nvSpPr>
         <p:spPr>
           <a:xfrm>
-            <a:off x="1758951" y="3429000"/>
+            <a:off x="2227855" y="3429000"/>
             <a:ext cx="114300" cy="127000"/>
           </a:xfrm>
           <a:prstGeom prst="triangle">
@@ -3543,17 +3795,17 @@
       </p:sp>
       <p:sp>
         <p:nvSpPr>
-          <p:cNvPr id="77" name="OTLSHAPE_TB_00000000000000000000000000000000_TodayMarkerText"/>
+          <p:cNvPr id="162" name="OTLSHAPE_TB_00000000000000000000000000000000_TodayMarkerText"/>
           <p:cNvSpPr txBox="1"/>
           <p:nvPr>
             <p:custDataLst>
-              <p:tags r:id="rId11"/>
+              <p:tags r:id="rId17"/>
             </p:custDataLst>
           </p:nvPr>
         </p:nvSpPr>
         <p:spPr>
           <a:xfrm>
-            <a:off x="1450922" y="3556000"/>
+            <a:off x="1919826" y="3556000"/>
             <a:ext cx="736600" cy="186055"/>
           </a:xfrm>
           <a:prstGeom prst="rect">
@@ -3588,11 +3840,11 @@
       </p:sp>
       <p:sp>
         <p:nvSpPr>
-          <p:cNvPr id="78" name="OTLSHAPE_TB_00000000000000000000000000000000_TimescaleInterval1"/>
+          <p:cNvPr id="163" name="OTLSHAPE_TB_00000000000000000000000000000000_TimescaleInterval1"/>
           <p:cNvSpPr txBox="1"/>
           <p:nvPr>
             <p:custDataLst>
-              <p:tags r:id="rId12"/>
+              <p:tags r:id="rId18"/>
             </p:custDataLst>
           </p:nvPr>
         </p:nvSpPr>
@@ -3632,17 +3884,17 @@
       </p:sp>
       <p:cxnSp>
         <p:nvCxnSpPr>
-          <p:cNvPr id="79" name="OTLSHAPE_TB_00000000000000000000000000000000_Separator1"/>
+          <p:cNvPr id="164" name="OTLSHAPE_TB_00000000000000000000000000000000_Separator1"/>
           <p:cNvCxnSpPr/>
           <p:nvPr>
             <p:custDataLst>
-              <p:tags r:id="rId13"/>
+              <p:tags r:id="rId19"/>
             </p:custDataLst>
           </p:nvPr>
         </p:nvCxnSpPr>
         <p:spPr>
           <a:xfrm>
-            <a:off x="2224022" y="3136900"/>
+            <a:off x="2408402" y="3136900"/>
             <a:ext cx="0" cy="203200"/>
           </a:xfrm>
           <a:prstGeom prst="line">
@@ -3677,17 +3929,17 @@
       </p:cxnSp>
       <p:sp>
         <p:nvSpPr>
-          <p:cNvPr id="80" name="OTLSHAPE_TB_00000000000000000000000000000000_TimescaleInterval2"/>
+          <p:cNvPr id="165" name="OTLSHAPE_TB_00000000000000000000000000000000_TimescaleInterval2"/>
           <p:cNvSpPr txBox="1"/>
           <p:nvPr>
             <p:custDataLst>
-              <p:tags r:id="rId14"/>
+              <p:tags r:id="rId20"/>
             </p:custDataLst>
           </p:nvPr>
         </p:nvSpPr>
         <p:spPr>
           <a:xfrm>
-            <a:off x="2287524" y="3145473"/>
+            <a:off x="2471904" y="3145473"/>
             <a:ext cx="75470" cy="186055"/>
           </a:xfrm>
           <a:prstGeom prst="rect">
@@ -3721,17 +3973,17 @@
       </p:sp>
       <p:cxnSp>
         <p:nvCxnSpPr>
-          <p:cNvPr id="81" name="OTLSHAPE_TB_00000000000000000000000000000000_Separator2"/>
+          <p:cNvPr id="166" name="OTLSHAPE_TB_00000000000000000000000000000000_Separator2"/>
           <p:cNvCxnSpPr/>
           <p:nvPr>
             <p:custDataLst>
-              <p:tags r:id="rId15"/>
+              <p:tags r:id="rId21"/>
             </p:custDataLst>
           </p:nvPr>
         </p:nvCxnSpPr>
         <p:spPr>
           <a:xfrm>
-            <a:off x="3514681" y="3136900"/>
+            <a:off x="3883440" y="3136900"/>
             <a:ext cx="0" cy="203200"/>
           </a:xfrm>
           <a:prstGeom prst="line">
@@ -3766,17 +4018,17 @@
       </p:cxnSp>
       <p:sp>
         <p:nvSpPr>
-          <p:cNvPr id="82" name="OTLSHAPE_TB_00000000000000000000000000000000_TimescaleInterval3"/>
+          <p:cNvPr id="167" name="OTLSHAPE_TB_00000000000000000000000000000000_TimescaleInterval3"/>
           <p:cNvSpPr txBox="1"/>
           <p:nvPr>
             <p:custDataLst>
-              <p:tags r:id="rId16"/>
+              <p:tags r:id="rId22"/>
             </p:custDataLst>
           </p:nvPr>
         </p:nvSpPr>
         <p:spPr>
           <a:xfrm>
-            <a:off x="3578183" y="3145473"/>
+            <a:off x="3946943" y="3145473"/>
             <a:ext cx="75470" cy="186055"/>
           </a:xfrm>
           <a:prstGeom prst="rect">
@@ -3810,17 +4062,17 @@
       </p:sp>
       <p:cxnSp>
         <p:nvCxnSpPr>
-          <p:cNvPr id="83" name="OTLSHAPE_TB_00000000000000000000000000000000_Separator3"/>
+          <p:cNvPr id="168" name="OTLSHAPE_TB_00000000000000000000000000000000_Separator3"/>
           <p:cNvCxnSpPr/>
           <p:nvPr>
             <p:custDataLst>
-              <p:tags r:id="rId17"/>
+              <p:tags r:id="rId23"/>
             </p:custDataLst>
           </p:nvPr>
         </p:nvCxnSpPr>
         <p:spPr>
           <a:xfrm>
-            <a:off x="4805340" y="3136900"/>
+            <a:off x="5358480" y="3136900"/>
             <a:ext cx="0" cy="203200"/>
           </a:xfrm>
           <a:prstGeom prst="line">
@@ -3855,17 +4107,17 @@
       </p:cxnSp>
       <p:sp>
         <p:nvSpPr>
-          <p:cNvPr id="84" name="OTLSHAPE_TB_00000000000000000000000000000000_TimescaleInterval4"/>
+          <p:cNvPr id="169" name="OTLSHAPE_TB_00000000000000000000000000000000_TimescaleInterval4"/>
           <p:cNvSpPr txBox="1"/>
           <p:nvPr>
             <p:custDataLst>
-              <p:tags r:id="rId18"/>
+              <p:tags r:id="rId24"/>
             </p:custDataLst>
           </p:nvPr>
         </p:nvSpPr>
         <p:spPr>
           <a:xfrm>
-            <a:off x="4868842" y="3145473"/>
+            <a:off x="5421982" y="3145473"/>
             <a:ext cx="75470" cy="186055"/>
           </a:xfrm>
           <a:prstGeom prst="rect">
@@ -3899,17 +4151,17 @@
       </p:sp>
       <p:cxnSp>
         <p:nvCxnSpPr>
-          <p:cNvPr id="85" name="OTLSHAPE_TB_00000000000000000000000000000000_Separator4"/>
+          <p:cNvPr id="170" name="OTLSHAPE_TB_00000000000000000000000000000000_Separator4"/>
           <p:cNvCxnSpPr/>
           <p:nvPr>
             <p:custDataLst>
-              <p:tags r:id="rId19"/>
+              <p:tags r:id="rId25"/>
             </p:custDataLst>
           </p:nvPr>
         </p:nvCxnSpPr>
         <p:spPr>
           <a:xfrm>
-            <a:off x="6095999" y="3136900"/>
+            <a:off x="6833519" y="3136900"/>
             <a:ext cx="0" cy="203200"/>
           </a:xfrm>
           <a:prstGeom prst="line">
@@ -3944,17 +4196,17 @@
       </p:cxnSp>
       <p:sp>
         <p:nvSpPr>
-          <p:cNvPr id="86" name="OTLSHAPE_TB_00000000000000000000000000000000_TimescaleInterval5"/>
+          <p:cNvPr id="171" name="OTLSHAPE_TB_00000000000000000000000000000000_TimescaleInterval5"/>
           <p:cNvSpPr txBox="1"/>
           <p:nvPr>
             <p:custDataLst>
-              <p:tags r:id="rId20"/>
+              <p:tags r:id="rId26"/>
             </p:custDataLst>
           </p:nvPr>
         </p:nvSpPr>
         <p:spPr>
           <a:xfrm>
-            <a:off x="6159501" y="3145473"/>
+            <a:off x="6897021" y="3145473"/>
             <a:ext cx="75470" cy="186055"/>
           </a:xfrm>
           <a:prstGeom prst="rect">
@@ -3988,17 +4240,17 @@
       </p:sp>
       <p:cxnSp>
         <p:nvCxnSpPr>
-          <p:cNvPr id="87" name="OTLSHAPE_TB_00000000000000000000000000000000_Separator5"/>
+          <p:cNvPr id="172" name="OTLSHAPE_TB_00000000000000000000000000000000_Separator5"/>
           <p:cNvCxnSpPr/>
           <p:nvPr>
             <p:custDataLst>
-              <p:tags r:id="rId21"/>
+              <p:tags r:id="rId27"/>
             </p:custDataLst>
           </p:nvPr>
         </p:nvCxnSpPr>
         <p:spPr>
           <a:xfrm>
-            <a:off x="7386658" y="3136900"/>
+            <a:off x="8308557" y="3136900"/>
             <a:ext cx="0" cy="203200"/>
           </a:xfrm>
           <a:prstGeom prst="line">
@@ -4033,17 +4285,17 @@
       </p:cxnSp>
       <p:sp>
         <p:nvSpPr>
-          <p:cNvPr id="88" name="OTLSHAPE_TB_00000000000000000000000000000000_TimescaleInterval6"/>
+          <p:cNvPr id="173" name="OTLSHAPE_TB_00000000000000000000000000000000_TimescaleInterval6"/>
           <p:cNvSpPr txBox="1"/>
           <p:nvPr>
             <p:custDataLst>
-              <p:tags r:id="rId22"/>
+              <p:tags r:id="rId28"/>
             </p:custDataLst>
           </p:nvPr>
         </p:nvSpPr>
         <p:spPr>
           <a:xfrm>
-            <a:off x="7450160" y="3145473"/>
+            <a:off x="8372060" y="3145473"/>
             <a:ext cx="75470" cy="186055"/>
           </a:xfrm>
           <a:prstGeom prst="rect">
@@ -4077,17 +4329,17 @@
       </p:sp>
       <p:cxnSp>
         <p:nvCxnSpPr>
-          <p:cNvPr id="89" name="OTLSHAPE_TB_00000000000000000000000000000000_Separator6"/>
+          <p:cNvPr id="174" name="OTLSHAPE_TB_00000000000000000000000000000000_Separator6"/>
           <p:cNvCxnSpPr/>
           <p:nvPr>
             <p:custDataLst>
-              <p:tags r:id="rId23"/>
+              <p:tags r:id="rId29"/>
             </p:custDataLst>
           </p:nvPr>
         </p:nvCxnSpPr>
         <p:spPr>
           <a:xfrm>
-            <a:off x="8677317" y="3136900"/>
+            <a:off x="9783596" y="3136900"/>
             <a:ext cx="0" cy="203200"/>
           </a:xfrm>
           <a:prstGeom prst="line">
@@ -4122,17 +4374,17 @@
       </p:cxnSp>
       <p:sp>
         <p:nvSpPr>
-          <p:cNvPr id="90" name="OTLSHAPE_TB_00000000000000000000000000000000_TimescaleInterval7"/>
+          <p:cNvPr id="175" name="OTLSHAPE_TB_00000000000000000000000000000000_TimescaleInterval7"/>
           <p:cNvSpPr txBox="1"/>
           <p:nvPr>
             <p:custDataLst>
-              <p:tags r:id="rId24"/>
+              <p:tags r:id="rId30"/>
             </p:custDataLst>
           </p:nvPr>
         </p:nvSpPr>
         <p:spPr>
           <a:xfrm>
-            <a:off x="8740819" y="3145473"/>
+            <a:off x="9847098" y="3145473"/>
             <a:ext cx="75470" cy="186055"/>
           </a:xfrm>
           <a:prstGeom prst="rect">
@@ -4164,109 +4416,20 @@
           </a:p>
         </p:txBody>
       </p:sp>
-      <p:cxnSp>
-        <p:nvCxnSpPr>
-          <p:cNvPr id="91" name="OTLSHAPE_TB_00000000000000000000000000000000_Separator7"/>
-          <p:cNvCxnSpPr/>
+      <p:sp>
+        <p:nvSpPr>
+          <p:cNvPr id="186" name="OTLSHAPE_M_a19c5bf51c9e4549a3efa4cff3afbcae_Title"/>
+          <p:cNvSpPr txBox="1"/>
           <p:nvPr>
             <p:custDataLst>
-              <p:tags r:id="rId25"/>
+              <p:tags r:id="rId31"/>
             </p:custDataLst>
           </p:nvPr>
-        </p:nvCxnSpPr>
-        <p:spPr>
-          <a:xfrm>
-            <a:off x="9967976" y="3136900"/>
-            <a:ext cx="0" cy="203200"/>
-          </a:xfrm>
-          <a:prstGeom prst="line">
-            <a:avLst/>
-          </a:prstGeom>
-          <a:ln w="6350" cap="flat" cmpd="sng" algn="ctr">
-            <a:solidFill>
-              <a:schemeClr val="lt1">
-                <a:alpha val="29804"/>
-              </a:schemeClr>
-            </a:solidFill>
-            <a:prstDash val="solid"/>
-            <a:miter lim="800000"/>
-            <a:headEnd type="none" w="med" len="med"/>
-            <a:tailEnd type="none" w="med" len="med"/>
-          </a:ln>
-        </p:spPr>
-        <p:style>
-          <a:lnRef idx="1">
-            <a:schemeClr val="accent1"/>
-          </a:lnRef>
-          <a:fillRef idx="0">
-            <a:schemeClr val="accent1"/>
-          </a:fillRef>
-          <a:effectRef idx="0">
-            <a:schemeClr val="accent1"/>
-          </a:effectRef>
-          <a:fontRef idx="minor">
-            <a:schemeClr val="tx1"/>
-          </a:fontRef>
-        </p:style>
-      </p:cxnSp>
-      <p:sp>
-        <p:nvSpPr>
-          <p:cNvPr id="92" name="OTLSHAPE_TB_00000000000000000000000000000000_TimescaleInterval8"/>
-          <p:cNvSpPr txBox="1"/>
-          <p:nvPr>
-            <p:custDataLst>
-              <p:tags r:id="rId26"/>
-            </p:custDataLst>
-          </p:nvPr>
-        </p:nvSpPr>
-        <p:spPr>
-          <a:xfrm>
-            <a:off x="10031478" y="3145473"/>
-            <a:ext cx="75470" cy="186055"/>
-          </a:xfrm>
-          <a:prstGeom prst="rect">
-            <a:avLst/>
-          </a:prstGeom>
-          <a:noFill/>
-        </p:spPr>
-        <p:txBody>
-          <a:bodyPr vert="horz" wrap="none" lIns="0" tIns="0" rIns="0" bIns="0" rtlCol="0" anchor="ctr" anchorCtr="0">
-            <a:noAutofit/>
-          </a:bodyPr>
-          <a:lstStyle/>
-          <a:p>
-            <a:r>
-              <a:rPr lang="fr-FR" sz="1200" spc="-26">
-                <a:solidFill>
-                  <a:schemeClr val="lt1"/>
-                </a:solidFill>
-                <a:latin typeface="Calibri" panose="020F0502020204030204" pitchFamily="34" charset="0"/>
-              </a:rPr>
-              <a:t>8</a:t>
-            </a:r>
-            <a:endParaRPr lang="fr-FR" sz="1200" spc="-26">
-              <a:solidFill>
-                <a:schemeClr val="lt1"/>
-              </a:solidFill>
-              <a:latin typeface="Calibri" panose="020F0502020204030204" pitchFamily="34" charset="0"/>
-            </a:endParaRPr>
-          </a:p>
-        </p:txBody>
-      </p:sp>
-      <p:sp>
-        <p:nvSpPr>
-          <p:cNvPr id="97" name="OTLSHAPE_M_a19c5bf51c9e4549a3efa4cff3afbcae_Title"/>
-          <p:cNvSpPr txBox="1"/>
-          <p:nvPr>
-            <p:custDataLst>
-              <p:tags r:id="rId27"/>
-            </p:custDataLst>
-          </p:nvPr>
-        </p:nvSpPr>
-        <p:spPr>
-          <a:xfrm>
-            <a:off x="11118477" y="2323338"/>
-            <a:ext cx="774700" cy="341037"/>
+        </p:nvSpPr>
+        <p:spPr>
+          <a:xfrm>
+            <a:off x="3690603" y="2493857"/>
+            <a:ext cx="2349500" cy="170519"/>
           </a:xfrm>
           <a:prstGeom prst="rect">
             <a:avLst/>
@@ -4280,15 +4443,15 @@
           <a:lstStyle/>
           <a:p>
             <a:r>
-              <a:rPr lang="fr-FR" sz="1100" b="1">
+              <a:rPr lang="fr-FR" sz="1100" b="1" spc="-4">
                 <a:solidFill>
                   <a:schemeClr val="dk1"/>
                 </a:solidFill>
                 <a:latin typeface="Calibri" panose="020F0502020204030204" pitchFamily="34" charset="0"/>
               </a:rPr>
-              <a:t>Présentation orale</a:t>
-            </a:r>
-            <a:endParaRPr lang="fr-FR" sz="1100" b="1">
+              <a:t>Lire et aggreger les différentes données. </a:t>
+            </a:r>
+            <a:endParaRPr lang="fr-FR" sz="1100" b="1" spc="-4">
               <a:solidFill>
                 <a:schemeClr val="dk1"/>
               </a:solidFill>
@@ -4299,18 +4462,18 @@
       </p:sp>
       <p:sp>
         <p:nvSpPr>
-          <p:cNvPr id="98" name="OTLSHAPE_M_a19c5bf51c9e4549a3efa4cff3afbcae_Date"/>
+          <p:cNvPr id="187" name="OTLSHAPE_M_a19c5bf51c9e4549a3efa4cff3afbcae_Date"/>
           <p:cNvSpPr txBox="1"/>
           <p:nvPr>
             <p:custDataLst>
-              <p:tags r:id="rId28"/>
+              <p:tags r:id="rId32"/>
             </p:custDataLst>
           </p:nvPr>
         </p:nvSpPr>
         <p:spPr>
           <a:xfrm>
-            <a:off x="11118477" y="2677075"/>
-            <a:ext cx="495300" cy="155025"/>
+            <a:off x="3690603" y="2677075"/>
+            <a:ext cx="558800" cy="155025"/>
           </a:xfrm>
           <a:prstGeom prst="rect">
             <a:avLst/>
@@ -4330,7 +4493,7 @@
                 </a:solidFill>
                 <a:latin typeface="Calibri" panose="020F0502020204030204" pitchFamily="34" charset="0"/>
               </a:rPr>
-              <a:t>3/9/2017</a:t>
+              <a:t>1/26/2017</a:t>
             </a:r>
             <a:endParaRPr lang="fr-FR" sz="1000" spc="-8">
               <a:solidFill>
@@ -4343,17 +4506,17 @@
       </p:sp>
       <p:sp>
         <p:nvSpPr>
-          <p:cNvPr id="99" name="OTLSHAPE_M_a19c5bf51c9e4549a3efa4cff3afbcae_Shape"/>
+          <p:cNvPr id="188" name="OTLSHAPE_M_a19c5bf51c9e4549a3efa4cff3afbcae_Shape"/>
           <p:cNvSpPr/>
           <p:nvPr>
             <p:custDataLst>
-              <p:tags r:id="rId29"/>
+              <p:tags r:id="rId33"/>
             </p:custDataLst>
           </p:nvPr>
         </p:nvSpPr>
         <p:spPr>
           <a:xfrm rot="16200000">
-            <a:off x="10921627" y="2520569"/>
+            <a:off x="3493753" y="2605828"/>
             <a:ext cx="165100" cy="165100"/>
           </a:xfrm>
           <a:prstGeom prst="flowChartMerge">
@@ -4430,18 +4593,718 @@
       </p:sp>
       <p:sp>
         <p:nvSpPr>
-          <p:cNvPr id="100" name="OTLSHAPE_T_db597cc912f24b6eabbfea838f8807b7_Shape"/>
+          <p:cNvPr id="189" name="OTLSHAPE_M_f1dd5c3f7a114b44a9e2d099bf632a46_Title"/>
+          <p:cNvSpPr txBox="1"/>
+          <p:nvPr>
+            <p:custDataLst>
+              <p:tags r:id="rId34"/>
+            </p:custDataLst>
+          </p:nvPr>
+        </p:nvSpPr>
+        <p:spPr>
+          <a:xfrm>
+            <a:off x="5165642" y="1870795"/>
+            <a:ext cx="2451100" cy="341037"/>
+          </a:xfrm>
+          <a:prstGeom prst="rect">
+            <a:avLst/>
+          </a:prstGeom>
+          <a:noFill/>
+        </p:spPr>
+        <p:txBody>
+          <a:bodyPr vert="horz" wrap="square" lIns="0" tIns="0" rIns="0" bIns="0" rtlCol="0" anchor="ctr" anchorCtr="0">
+            <a:spAutoFit/>
+          </a:bodyPr>
+          <a:lstStyle/>
+          <a:p>
+            <a:r>
+              <a:rPr lang="fr-FR" sz="1100" b="1">
+                <a:solidFill>
+                  <a:schemeClr val="dk1"/>
+                </a:solidFill>
+                <a:latin typeface="Calibri" panose="020F0502020204030204" pitchFamily="34" charset="0"/>
+              </a:rPr>
+              <a:t>coefficient de corrélation sur le 1er jeu de données</a:t>
+            </a:r>
+            <a:endParaRPr lang="fr-FR" sz="1100" b="1">
+              <a:solidFill>
+                <a:schemeClr val="dk1"/>
+              </a:solidFill>
+              <a:latin typeface="Calibri" panose="020F0502020204030204" pitchFamily="34" charset="0"/>
+            </a:endParaRPr>
+          </a:p>
+        </p:txBody>
+      </p:sp>
+      <p:sp>
+        <p:nvSpPr>
+          <p:cNvPr id="190" name="OTLSHAPE_M_f1dd5c3f7a114b44a9e2d099bf632a46_Date"/>
+          <p:cNvSpPr txBox="1"/>
+          <p:nvPr>
+            <p:custDataLst>
+              <p:tags r:id="rId35"/>
+            </p:custDataLst>
+          </p:nvPr>
+        </p:nvSpPr>
+        <p:spPr>
+          <a:xfrm>
+            <a:off x="5165642" y="2224532"/>
+            <a:ext cx="495300" cy="155025"/>
+          </a:xfrm>
+          <a:prstGeom prst="rect">
+            <a:avLst/>
+          </a:prstGeom>
+          <a:noFill/>
+        </p:spPr>
+        <p:txBody>
+          <a:bodyPr vert="horz" wrap="square" lIns="0" tIns="0" rIns="0" bIns="0" rtlCol="0" anchor="ctr" anchorCtr="0">
+            <a:spAutoFit/>
+          </a:bodyPr>
+          <a:lstStyle/>
+          <a:p>
+            <a:r>
+              <a:rPr lang="fr-FR" sz="1000" spc="-8">
+                <a:solidFill>
+                  <a:srgbClr val="1F497E"/>
+                </a:solidFill>
+                <a:latin typeface="Calibri" panose="020F0502020204030204" pitchFamily="34" charset="0"/>
+              </a:rPr>
+              <a:t>2/2/2017</a:t>
+            </a:r>
+            <a:endParaRPr lang="fr-FR" sz="1000" spc="-8">
+              <a:solidFill>
+                <a:srgbClr val="1F497E"/>
+              </a:solidFill>
+              <a:latin typeface="Calibri" panose="020F0502020204030204" pitchFamily="34" charset="0"/>
+            </a:endParaRPr>
+          </a:p>
+        </p:txBody>
+      </p:sp>
+      <p:sp>
+        <p:nvSpPr>
+          <p:cNvPr id="191" name="OTLSHAPE_M_f1dd5c3f7a114b44a9e2d099bf632a46_Shape"/>
           <p:cNvSpPr/>
           <p:nvPr>
             <p:custDataLst>
-              <p:tags r:id="rId30"/>
+              <p:tags r:id="rId36"/>
             </p:custDataLst>
           </p:nvPr>
         </p:nvSpPr>
         <p:spPr>
-          <a:xfrm>
-            <a:off x="1855265" y="3945255"/>
-            <a:ext cx="2032000" cy="203200"/>
+          <a:xfrm rot="16200000">
+            <a:off x="4968792" y="2068026"/>
+            <a:ext cx="165100" cy="165100"/>
+          </a:xfrm>
+          <a:prstGeom prst="flowChartMerge">
+            <a:avLst/>
+          </a:prstGeom>
+          <a:solidFill>
+            <a:schemeClr val="accent2"/>
+          </a:solidFill>
+          <a:ln w="12700" cap="flat" cmpd="sng" algn="ctr">
+            <a:noFill/>
+            <a:prstDash val="solid"/>
+            <a:miter lim="800000"/>
+          </a:ln>
+          <a:effectLst/>
+          <a:scene3d>
+            <a:camera prst="orthographicFront"/>
+            <a:lightRig rig="threePt" dir="t"/>
+          </a:scene3d>
+          <a:sp3d>
+            <a:bevelT h="12700"/>
+          </a:sp3d>
+          <a:extLst>
+            <a:ext uri="{91240B29-F687-4F45-9708-019B960494DF}">
+              <a14:hiddenLine xmlns:a14="http://schemas.microsoft.com/office/drawing/2010/main" w="12700" cap="flat" cmpd="sng" algn="ctr">
+                <a:solidFill>
+                  <a:schemeClr val="accent1">
+                    <a:shade val="50000"/>
+                  </a:schemeClr>
+                </a:solidFill>
+                <a:prstDash val="solid"/>
+                <a:miter lim="800000"/>
+              </a14:hiddenLine>
+            </a:ext>
+            <a:ext uri="{AF507438-7753-43E0-B8FC-AC1667EBCBE1}">
+              <a14:hiddenEffects xmlns:a14="http://schemas.microsoft.com/office/drawing/2010/main">
+                <a:effectLst>
+                  <a:outerShdw>
+                    <a:scrgbClr r="0" g="0" b="0">
+                      <a:alpha val="50000"/>
+                    </a:scrgbClr>
+                  </a:outerShdw>
+                </a:effectLst>
+              </a14:hiddenEffects>
+            </a:ext>
+            <a:ext uri="{53640926-AAD7-44D8-BBD7-CCE9431645EC}">
+              <a14:shadowObscured xmlns:a14="http://schemas.microsoft.com/office/drawing/2010/main" val="1"/>
+            </a:ext>
+          </a:extLst>
+        </p:spPr>
+        <p:style>
+          <a:lnRef idx="2">
+            <a:schemeClr val="accent1">
+              <a:shade val="50000"/>
+            </a:schemeClr>
+          </a:lnRef>
+          <a:fillRef idx="1">
+            <a:schemeClr val="accent1"/>
+          </a:fillRef>
+          <a:effectRef idx="0">
+            <a:schemeClr val="accent1"/>
+          </a:effectRef>
+          <a:fontRef idx="minor">
+            <a:schemeClr val="lt1"/>
+          </a:fontRef>
+        </p:style>
+        <p:txBody>
+          <a:bodyPr rtlCol="0" anchor="ctr"/>
+          <a:lstStyle/>
+          <a:p>
+            <a:pPr algn="ctr"/>
+            <a:endParaRPr lang="fr-FR"/>
+          </a:p>
+        </p:txBody>
+      </p:sp>
+      <p:sp>
+        <p:nvSpPr>
+          <p:cNvPr id="192" name="OTLSHAPE_M_354cfcf56363456cb91d0fe6a7aa2f3a_Title"/>
+          <p:cNvSpPr txBox="1"/>
+          <p:nvPr>
+            <p:custDataLst>
+              <p:tags r:id="rId37"/>
+            </p:custDataLst>
+          </p:nvPr>
+        </p:nvSpPr>
+        <p:spPr>
+          <a:xfrm>
+            <a:off x="6640681" y="2493857"/>
+            <a:ext cx="1104900" cy="170519"/>
+          </a:xfrm>
+          <a:prstGeom prst="rect">
+            <a:avLst/>
+          </a:prstGeom>
+          <a:noFill/>
+        </p:spPr>
+        <p:txBody>
+          <a:bodyPr vert="horz" wrap="square" lIns="0" tIns="0" rIns="0" bIns="0" rtlCol="0" anchor="ctr" anchorCtr="0">
+            <a:spAutoFit/>
+          </a:bodyPr>
+          <a:lstStyle/>
+          <a:p>
+            <a:r>
+              <a:rPr lang="fr-FR" sz="1100" b="1" spc="-6">
+                <a:solidFill>
+                  <a:schemeClr val="dk1"/>
+                </a:solidFill>
+                <a:latin typeface="Calibri" panose="020F0502020204030204" pitchFamily="34" charset="0"/>
+              </a:rPr>
+              <a:t>Regression linéaire</a:t>
+            </a:r>
+            <a:endParaRPr lang="fr-FR" sz="1100" b="1" spc="-6">
+              <a:solidFill>
+                <a:schemeClr val="dk1"/>
+              </a:solidFill>
+              <a:latin typeface="Calibri" panose="020F0502020204030204" pitchFamily="34" charset="0"/>
+            </a:endParaRPr>
+          </a:p>
+        </p:txBody>
+      </p:sp>
+      <p:sp>
+        <p:nvSpPr>
+          <p:cNvPr id="193" name="OTLSHAPE_M_354cfcf56363456cb91d0fe6a7aa2f3a_Date"/>
+          <p:cNvSpPr txBox="1"/>
+          <p:nvPr>
+            <p:custDataLst>
+              <p:tags r:id="rId38"/>
+            </p:custDataLst>
+          </p:nvPr>
+        </p:nvSpPr>
+        <p:spPr>
+          <a:xfrm>
+            <a:off x="6640681" y="2677075"/>
+            <a:ext cx="495300" cy="155025"/>
+          </a:xfrm>
+          <a:prstGeom prst="rect">
+            <a:avLst/>
+          </a:prstGeom>
+          <a:noFill/>
+        </p:spPr>
+        <p:txBody>
+          <a:bodyPr vert="horz" wrap="square" lIns="0" tIns="0" rIns="0" bIns="0" rtlCol="0" anchor="ctr" anchorCtr="0">
+            <a:spAutoFit/>
+          </a:bodyPr>
+          <a:lstStyle/>
+          <a:p>
+            <a:r>
+              <a:rPr lang="fr-FR" sz="1000" spc="-8">
+                <a:solidFill>
+                  <a:srgbClr val="1F497E"/>
+                </a:solidFill>
+                <a:latin typeface="Calibri" panose="020F0502020204030204" pitchFamily="34" charset="0"/>
+              </a:rPr>
+              <a:t>2/9/2017</a:t>
+            </a:r>
+            <a:endParaRPr lang="fr-FR" sz="1000" spc="-8">
+              <a:solidFill>
+                <a:srgbClr val="1F497E"/>
+              </a:solidFill>
+              <a:latin typeface="Calibri" panose="020F0502020204030204" pitchFamily="34" charset="0"/>
+            </a:endParaRPr>
+          </a:p>
+        </p:txBody>
+      </p:sp>
+      <p:sp>
+        <p:nvSpPr>
+          <p:cNvPr id="194" name="OTLSHAPE_M_354cfcf56363456cb91d0fe6a7aa2f3a_Shape"/>
+          <p:cNvSpPr/>
+          <p:nvPr>
+            <p:custDataLst>
+              <p:tags r:id="rId39"/>
+            </p:custDataLst>
+          </p:nvPr>
+        </p:nvSpPr>
+        <p:spPr>
+          <a:xfrm rot="16200000">
+            <a:off x="6443831" y="2605828"/>
+            <a:ext cx="165100" cy="165100"/>
+          </a:xfrm>
+          <a:prstGeom prst="flowChartMerge">
+            <a:avLst/>
+          </a:prstGeom>
+          <a:solidFill>
+            <a:schemeClr val="accent3"/>
+          </a:solidFill>
+          <a:ln w="12700" cap="flat" cmpd="sng" algn="ctr">
+            <a:noFill/>
+            <a:prstDash val="solid"/>
+            <a:miter lim="800000"/>
+          </a:ln>
+          <a:effectLst/>
+          <a:scene3d>
+            <a:camera prst="orthographicFront"/>
+            <a:lightRig rig="threePt" dir="t"/>
+          </a:scene3d>
+          <a:sp3d>
+            <a:bevelT h="12700"/>
+          </a:sp3d>
+          <a:extLst>
+            <a:ext uri="{91240B29-F687-4F45-9708-019B960494DF}">
+              <a14:hiddenLine xmlns:a14="http://schemas.microsoft.com/office/drawing/2010/main" w="12700" cap="flat" cmpd="sng" algn="ctr">
+                <a:solidFill>
+                  <a:schemeClr val="accent1">
+                    <a:shade val="50000"/>
+                  </a:schemeClr>
+                </a:solidFill>
+                <a:prstDash val="solid"/>
+                <a:miter lim="800000"/>
+              </a14:hiddenLine>
+            </a:ext>
+            <a:ext uri="{AF507438-7753-43E0-B8FC-AC1667EBCBE1}">
+              <a14:hiddenEffects xmlns:a14="http://schemas.microsoft.com/office/drawing/2010/main">
+                <a:effectLst>
+                  <a:outerShdw>
+                    <a:scrgbClr r="0" g="0" b="0">
+                      <a:alpha val="50000"/>
+                    </a:scrgbClr>
+                  </a:outerShdw>
+                </a:effectLst>
+              </a14:hiddenEffects>
+            </a:ext>
+            <a:ext uri="{53640926-AAD7-44D8-BBD7-CCE9431645EC}">
+              <a14:shadowObscured xmlns:a14="http://schemas.microsoft.com/office/drawing/2010/main" val="1"/>
+            </a:ext>
+          </a:extLst>
+        </p:spPr>
+        <p:style>
+          <a:lnRef idx="2">
+            <a:schemeClr val="accent1">
+              <a:shade val="50000"/>
+            </a:schemeClr>
+          </a:lnRef>
+          <a:fillRef idx="1">
+            <a:schemeClr val="accent1"/>
+          </a:fillRef>
+          <a:effectRef idx="0">
+            <a:schemeClr val="accent1"/>
+          </a:effectRef>
+          <a:fontRef idx="minor">
+            <a:schemeClr val="lt1"/>
+          </a:fontRef>
+        </p:style>
+        <p:txBody>
+          <a:bodyPr rtlCol="0" anchor="ctr"/>
+          <a:lstStyle/>
+          <a:p>
+            <a:pPr algn="ctr"/>
+            <a:endParaRPr lang="fr-FR"/>
+          </a:p>
+        </p:txBody>
+      </p:sp>
+      <p:sp>
+        <p:nvSpPr>
+          <p:cNvPr id="195" name="OTLSHAPE_M_05b33898657548eebb3ddd1d2a9da8c3_Title"/>
+          <p:cNvSpPr txBox="1"/>
+          <p:nvPr>
+            <p:custDataLst>
+              <p:tags r:id="rId40"/>
+            </p:custDataLst>
+          </p:nvPr>
+        </p:nvSpPr>
+        <p:spPr>
+          <a:xfrm>
+            <a:off x="8115720" y="1870795"/>
+            <a:ext cx="2286000" cy="341037"/>
+          </a:xfrm>
+          <a:prstGeom prst="rect">
+            <a:avLst/>
+          </a:prstGeom>
+          <a:noFill/>
+        </p:spPr>
+        <p:txBody>
+          <a:bodyPr vert="horz" wrap="square" lIns="0" tIns="0" rIns="0" bIns="0" rtlCol="0" anchor="ctr" anchorCtr="0">
+            <a:spAutoFit/>
+          </a:bodyPr>
+          <a:lstStyle/>
+          <a:p>
+            <a:r>
+              <a:rPr lang="fr-FR" sz="1100" b="1">
+                <a:solidFill>
+                  <a:schemeClr val="dk1"/>
+                </a:solidFill>
+                <a:latin typeface="Calibri" panose="020F0502020204030204" pitchFamily="34" charset="0"/>
+              </a:rPr>
+              <a:t>Coefficient de corrélation et régression linéaire sur le 2ème jeu de données</a:t>
+            </a:r>
+            <a:endParaRPr lang="fr-FR" sz="1100" b="1">
+              <a:solidFill>
+                <a:schemeClr val="dk1"/>
+              </a:solidFill>
+              <a:latin typeface="Calibri" panose="020F0502020204030204" pitchFamily="34" charset="0"/>
+            </a:endParaRPr>
+          </a:p>
+        </p:txBody>
+      </p:sp>
+      <p:sp>
+        <p:nvSpPr>
+          <p:cNvPr id="196" name="OTLSHAPE_M_05b33898657548eebb3ddd1d2a9da8c3_Date"/>
+          <p:cNvSpPr txBox="1"/>
+          <p:nvPr>
+            <p:custDataLst>
+              <p:tags r:id="rId41"/>
+            </p:custDataLst>
+          </p:nvPr>
+        </p:nvSpPr>
+        <p:spPr>
+          <a:xfrm>
+            <a:off x="8115720" y="2224532"/>
+            <a:ext cx="558800" cy="155025"/>
+          </a:xfrm>
+          <a:prstGeom prst="rect">
+            <a:avLst/>
+          </a:prstGeom>
+          <a:noFill/>
+        </p:spPr>
+        <p:txBody>
+          <a:bodyPr vert="horz" wrap="square" lIns="0" tIns="0" rIns="0" bIns="0" rtlCol="0" anchor="ctr" anchorCtr="0">
+            <a:spAutoFit/>
+          </a:bodyPr>
+          <a:lstStyle/>
+          <a:p>
+            <a:r>
+              <a:rPr lang="fr-FR" sz="1000" spc="-8">
+                <a:solidFill>
+                  <a:srgbClr val="1F497E"/>
+                </a:solidFill>
+                <a:latin typeface="Calibri" panose="020F0502020204030204" pitchFamily="34" charset="0"/>
+              </a:rPr>
+              <a:t>2/16/2017</a:t>
+            </a:r>
+            <a:endParaRPr lang="fr-FR" sz="1000" spc="-8">
+              <a:solidFill>
+                <a:srgbClr val="1F497E"/>
+              </a:solidFill>
+              <a:latin typeface="Calibri" panose="020F0502020204030204" pitchFamily="34" charset="0"/>
+            </a:endParaRPr>
+          </a:p>
+        </p:txBody>
+      </p:sp>
+      <p:sp>
+        <p:nvSpPr>
+          <p:cNvPr id="197" name="OTLSHAPE_M_05b33898657548eebb3ddd1d2a9da8c3_Shape"/>
+          <p:cNvSpPr/>
+          <p:nvPr>
+            <p:custDataLst>
+              <p:tags r:id="rId42"/>
+            </p:custDataLst>
+          </p:nvPr>
+        </p:nvSpPr>
+        <p:spPr>
+          <a:xfrm rot="16200000">
+            <a:off x="7918870" y="2068026"/>
+            <a:ext cx="165100" cy="165100"/>
+          </a:xfrm>
+          <a:prstGeom prst="flowChartMerge">
+            <a:avLst/>
+          </a:prstGeom>
+          <a:solidFill>
+            <a:schemeClr val="accent4"/>
+          </a:solidFill>
+          <a:ln w="12700" cap="flat" cmpd="sng" algn="ctr">
+            <a:noFill/>
+            <a:prstDash val="solid"/>
+            <a:miter lim="800000"/>
+          </a:ln>
+          <a:effectLst/>
+          <a:scene3d>
+            <a:camera prst="orthographicFront"/>
+            <a:lightRig rig="threePt" dir="t"/>
+          </a:scene3d>
+          <a:sp3d>
+            <a:bevelT h="12700"/>
+          </a:sp3d>
+          <a:extLst>
+            <a:ext uri="{91240B29-F687-4F45-9708-019B960494DF}">
+              <a14:hiddenLine xmlns:a14="http://schemas.microsoft.com/office/drawing/2010/main" w="12700" cap="flat" cmpd="sng" algn="ctr">
+                <a:solidFill>
+                  <a:schemeClr val="accent1">
+                    <a:shade val="50000"/>
+                  </a:schemeClr>
+                </a:solidFill>
+                <a:prstDash val="solid"/>
+                <a:miter lim="800000"/>
+              </a14:hiddenLine>
+            </a:ext>
+            <a:ext uri="{AF507438-7753-43E0-B8FC-AC1667EBCBE1}">
+              <a14:hiddenEffects xmlns:a14="http://schemas.microsoft.com/office/drawing/2010/main">
+                <a:effectLst>
+                  <a:outerShdw>
+                    <a:scrgbClr r="0" g="0" b="0">
+                      <a:alpha val="50000"/>
+                    </a:scrgbClr>
+                  </a:outerShdw>
+                </a:effectLst>
+              </a14:hiddenEffects>
+            </a:ext>
+            <a:ext uri="{53640926-AAD7-44D8-BBD7-CCE9431645EC}">
+              <a14:shadowObscured xmlns:a14="http://schemas.microsoft.com/office/drawing/2010/main" val="1"/>
+            </a:ext>
+          </a:extLst>
+        </p:spPr>
+        <p:style>
+          <a:lnRef idx="2">
+            <a:schemeClr val="accent1">
+              <a:shade val="50000"/>
+            </a:schemeClr>
+          </a:lnRef>
+          <a:fillRef idx="1">
+            <a:schemeClr val="accent1"/>
+          </a:fillRef>
+          <a:effectRef idx="0">
+            <a:schemeClr val="accent1"/>
+          </a:effectRef>
+          <a:fontRef idx="minor">
+            <a:schemeClr val="lt1"/>
+          </a:fontRef>
+        </p:style>
+        <p:txBody>
+          <a:bodyPr rtlCol="0" anchor="ctr"/>
+          <a:lstStyle/>
+          <a:p>
+            <a:pPr algn="ctr"/>
+            <a:endParaRPr lang="fr-FR"/>
+          </a:p>
+        </p:txBody>
+      </p:sp>
+      <p:sp>
+        <p:nvSpPr>
+          <p:cNvPr id="198" name="OTLSHAPE_M_61389f5b35b343aaa5f616914a4067b0_Title"/>
+          <p:cNvSpPr txBox="1"/>
+          <p:nvPr>
+            <p:custDataLst>
+              <p:tags r:id="rId43"/>
+            </p:custDataLst>
+          </p:nvPr>
+        </p:nvSpPr>
+        <p:spPr>
+          <a:xfrm>
+            <a:off x="9590759" y="2493857"/>
+            <a:ext cx="1320800" cy="170519"/>
+          </a:xfrm>
+          <a:prstGeom prst="rect">
+            <a:avLst/>
+          </a:prstGeom>
+          <a:noFill/>
+        </p:spPr>
+        <p:txBody>
+          <a:bodyPr vert="horz" wrap="square" lIns="0" tIns="0" rIns="0" bIns="0" rtlCol="0" anchor="ctr" anchorCtr="0">
+            <a:spAutoFit/>
+          </a:bodyPr>
+          <a:lstStyle/>
+          <a:p>
+            <a:r>
+              <a:rPr lang="fr-FR" sz="1100" b="1" spc="-4">
+                <a:solidFill>
+                  <a:schemeClr val="dk1"/>
+                </a:solidFill>
+                <a:latin typeface="Calibri" panose="020F0502020204030204" pitchFamily="34" charset="0"/>
+              </a:rPr>
+              <a:t>pareil pour l'éducation</a:t>
+            </a:r>
+            <a:endParaRPr lang="fr-FR" sz="1100" b="1" spc="-4">
+              <a:solidFill>
+                <a:schemeClr val="dk1"/>
+              </a:solidFill>
+              <a:latin typeface="Calibri" panose="020F0502020204030204" pitchFamily="34" charset="0"/>
+            </a:endParaRPr>
+          </a:p>
+        </p:txBody>
+      </p:sp>
+      <p:sp>
+        <p:nvSpPr>
+          <p:cNvPr id="199" name="OTLSHAPE_M_61389f5b35b343aaa5f616914a4067b0_Date"/>
+          <p:cNvSpPr txBox="1"/>
+          <p:nvPr>
+            <p:custDataLst>
+              <p:tags r:id="rId44"/>
+            </p:custDataLst>
+          </p:nvPr>
+        </p:nvSpPr>
+        <p:spPr>
+          <a:xfrm>
+            <a:off x="9590759" y="2677075"/>
+            <a:ext cx="558800" cy="155025"/>
+          </a:xfrm>
+          <a:prstGeom prst="rect">
+            <a:avLst/>
+          </a:prstGeom>
+          <a:noFill/>
+        </p:spPr>
+        <p:txBody>
+          <a:bodyPr vert="horz" wrap="square" lIns="0" tIns="0" rIns="0" bIns="0" rtlCol="0" anchor="ctr" anchorCtr="0">
+            <a:spAutoFit/>
+          </a:bodyPr>
+          <a:lstStyle/>
+          <a:p>
+            <a:r>
+              <a:rPr lang="fr-FR" sz="1000" spc="-8">
+                <a:solidFill>
+                  <a:srgbClr val="1F497E"/>
+                </a:solidFill>
+                <a:latin typeface="Calibri" panose="020F0502020204030204" pitchFamily="34" charset="0"/>
+              </a:rPr>
+              <a:t>2/23/2017</a:t>
+            </a:r>
+            <a:endParaRPr lang="fr-FR" sz="1000" spc="-8">
+              <a:solidFill>
+                <a:srgbClr val="1F497E"/>
+              </a:solidFill>
+              <a:latin typeface="Calibri" panose="020F0502020204030204" pitchFamily="34" charset="0"/>
+            </a:endParaRPr>
+          </a:p>
+        </p:txBody>
+      </p:sp>
+      <p:sp>
+        <p:nvSpPr>
+          <p:cNvPr id="200" name="OTLSHAPE_M_61389f5b35b343aaa5f616914a4067b0_Shape"/>
+          <p:cNvSpPr/>
+          <p:nvPr>
+            <p:custDataLst>
+              <p:tags r:id="rId45"/>
+            </p:custDataLst>
+          </p:nvPr>
+        </p:nvSpPr>
+        <p:spPr>
+          <a:xfrm rot="16200000">
+            <a:off x="9393909" y="2605828"/>
+            <a:ext cx="165100" cy="165100"/>
+          </a:xfrm>
+          <a:prstGeom prst="flowChartMerge">
+            <a:avLst/>
+          </a:prstGeom>
+          <a:solidFill>
+            <a:schemeClr val="accent5"/>
+          </a:solidFill>
+          <a:ln w="12700" cap="flat" cmpd="sng" algn="ctr">
+            <a:noFill/>
+            <a:prstDash val="solid"/>
+            <a:miter lim="800000"/>
+          </a:ln>
+          <a:effectLst/>
+          <a:scene3d>
+            <a:camera prst="orthographicFront"/>
+            <a:lightRig rig="threePt" dir="t"/>
+          </a:scene3d>
+          <a:sp3d>
+            <a:bevelT h="12700"/>
+          </a:sp3d>
+          <a:extLst>
+            <a:ext uri="{91240B29-F687-4F45-9708-019B960494DF}">
+              <a14:hiddenLine xmlns:a14="http://schemas.microsoft.com/office/drawing/2010/main" w="12700" cap="flat" cmpd="sng" algn="ctr">
+                <a:solidFill>
+                  <a:schemeClr val="accent1">
+                    <a:shade val="50000"/>
+                  </a:schemeClr>
+                </a:solidFill>
+                <a:prstDash val="solid"/>
+                <a:miter lim="800000"/>
+              </a14:hiddenLine>
+            </a:ext>
+            <a:ext uri="{AF507438-7753-43E0-B8FC-AC1667EBCBE1}">
+              <a14:hiddenEffects xmlns:a14="http://schemas.microsoft.com/office/drawing/2010/main">
+                <a:effectLst>
+                  <a:outerShdw>
+                    <a:scrgbClr r="0" g="0" b="0">
+                      <a:alpha val="50000"/>
+                    </a:scrgbClr>
+                  </a:outerShdw>
+                </a:effectLst>
+              </a14:hiddenEffects>
+            </a:ext>
+            <a:ext uri="{53640926-AAD7-44D8-BBD7-CCE9431645EC}">
+              <a14:shadowObscured xmlns:a14="http://schemas.microsoft.com/office/drawing/2010/main" val="1"/>
+            </a:ext>
+          </a:extLst>
+        </p:spPr>
+        <p:style>
+          <a:lnRef idx="2">
+            <a:schemeClr val="accent1">
+              <a:shade val="50000"/>
+            </a:schemeClr>
+          </a:lnRef>
+          <a:fillRef idx="1">
+            <a:schemeClr val="accent1"/>
+          </a:fillRef>
+          <a:effectRef idx="0">
+            <a:schemeClr val="accent1"/>
+          </a:effectRef>
+          <a:fontRef idx="minor">
+            <a:schemeClr val="lt1"/>
+          </a:fontRef>
+        </p:style>
+        <p:txBody>
+          <a:bodyPr rtlCol="0" anchor="ctr"/>
+          <a:lstStyle/>
+          <a:p>
+            <a:pPr algn="ctr"/>
+            <a:endParaRPr lang="fr-FR"/>
+          </a:p>
+        </p:txBody>
+      </p:sp>
+      <p:sp>
+        <p:nvSpPr>
+          <p:cNvPr id="201" name="OTLSHAPE_T_db597cc912f24b6eabbfea838f8807b7_Shape"/>
+          <p:cNvSpPr/>
+          <p:nvPr>
+            <p:custDataLst>
+              <p:tags r:id="rId46"/>
+            </p:custDataLst>
+          </p:nvPr>
+        </p:nvSpPr>
+        <p:spPr>
+          <a:xfrm>
+            <a:off x="1986965" y="3945255"/>
+            <a:ext cx="2324100" cy="203200"/>
           </a:xfrm>
           <a:prstGeom prst="rect">
             <a:avLst/>
@@ -4519,17 +5382,17 @@
       </p:sp>
       <p:sp>
         <p:nvSpPr>
-          <p:cNvPr id="101" name="OTLSHAPE_T_db597cc912f24b6eabbfea838f8807b7_ShapePercentage" hidden="1"/>
+          <p:cNvPr id="202" name="OTLSHAPE_T_db597cc912f24b6eabbfea838f8807b7_ShapePercentage" hidden="1"/>
           <p:cNvSpPr/>
           <p:nvPr>
             <p:custDataLst>
-              <p:tags r:id="rId31"/>
+              <p:tags r:id="rId47"/>
             </p:custDataLst>
           </p:nvPr>
         </p:nvSpPr>
         <p:spPr>
           <a:xfrm>
-            <a:off x="1855265" y="3945255"/>
+            <a:off x="1986965" y="3945255"/>
             <a:ext cx="0" cy="0"/>
           </a:xfrm>
           <a:prstGeom prst="rect">
@@ -4563,11 +5426,11 @@
       </p:sp>
       <p:sp>
         <p:nvSpPr>
-          <p:cNvPr id="102" name="OTLSHAPE_T_db597cc912f24b6eabbfea838f8807b7_Duration" hidden="1"/>
+          <p:cNvPr id="203" name="OTLSHAPE_T_db597cc912f24b6eabbfea838f8807b7_Duration" hidden="1"/>
           <p:cNvSpPr txBox="1"/>
           <p:nvPr>
             <p:custDataLst>
-              <p:tags r:id="rId32"/>
+              <p:tags r:id="rId48"/>
             </p:custDataLst>
           </p:nvPr>
         </p:nvSpPr>
@@ -4608,11 +5471,11 @@
       </p:sp>
       <p:sp>
         <p:nvSpPr>
-          <p:cNvPr id="103" name="OTLSHAPE_T_db597cc912f24b6eabbfea838f8807b7_TextPercentage" hidden="1"/>
+          <p:cNvPr id="204" name="OTLSHAPE_T_db597cc912f24b6eabbfea838f8807b7_TextPercentage" hidden="1"/>
           <p:cNvSpPr txBox="1"/>
           <p:nvPr>
             <p:custDataLst>
-              <p:tags r:id="rId33"/>
+              <p:tags r:id="rId49"/>
             </p:custDataLst>
           </p:nvPr>
         </p:nvSpPr>
@@ -4644,11 +5507,11 @@
       </p:sp>
       <p:sp>
         <p:nvSpPr>
-          <p:cNvPr id="104" name="OTLSHAPE_T_db597cc912f24b6eabbfea838f8807b7_StartDate" hidden="1"/>
+          <p:cNvPr id="205" name="OTLSHAPE_T_db597cc912f24b6eabbfea838f8807b7_StartDate" hidden="1"/>
           <p:cNvSpPr txBox="1"/>
           <p:nvPr>
             <p:custDataLst>
-              <p:tags r:id="rId34"/>
+              <p:tags r:id="rId50"/>
             </p:custDataLst>
           </p:nvPr>
         </p:nvSpPr>
@@ -4680,11 +5543,11 @@
       </p:sp>
       <p:sp>
         <p:nvSpPr>
-          <p:cNvPr id="105" name="OTLSHAPE_T_db597cc912f24b6eabbfea838f8807b7_EndDate" hidden="1"/>
+          <p:cNvPr id="206" name="OTLSHAPE_T_db597cc912f24b6eabbfea838f8807b7_EndDate" hidden="1"/>
           <p:cNvSpPr txBox="1"/>
           <p:nvPr>
             <p:custDataLst>
-              <p:tags r:id="rId35"/>
+              <p:tags r:id="rId51"/>
             </p:custDataLst>
           </p:nvPr>
         </p:nvSpPr>
@@ -4716,17 +5579,17 @@
       </p:sp>
       <p:sp>
         <p:nvSpPr>
-          <p:cNvPr id="106" name="OTLSHAPE_T_db597cc912f24b6eabbfea838f8807b7_JoinedDate"/>
+          <p:cNvPr id="207" name="OTLSHAPE_T_db597cc912f24b6eabbfea838f8807b7_JoinedDate"/>
           <p:cNvSpPr txBox="1"/>
           <p:nvPr>
             <p:custDataLst>
-              <p:tags r:id="rId36"/>
+              <p:tags r:id="rId52"/>
             </p:custDataLst>
           </p:nvPr>
         </p:nvSpPr>
         <p:spPr>
           <a:xfrm>
-            <a:off x="3934243" y="3969343"/>
+            <a:off x="4355683" y="3969343"/>
             <a:ext cx="1206500" cy="155025"/>
           </a:xfrm>
           <a:prstGeom prst="rect">
@@ -4760,11 +5623,11 @@
       </p:sp>
       <p:sp>
         <p:nvSpPr>
-          <p:cNvPr id="107" name="OTLSHAPE_T_db597cc912f24b6eabbfea838f8807b7_Title"/>
+          <p:cNvPr id="208" name="OTLSHAPE_T_db597cc912f24b6eabbfea838f8807b7_Title"/>
           <p:cNvSpPr txBox="1"/>
           <p:nvPr>
             <p:custDataLst>
-              <p:tags r:id="rId37"/>
+              <p:tags r:id="rId53"/>
             </p:custDataLst>
           </p:nvPr>
         </p:nvSpPr>
@@ -4804,18 +5667,18 @@
       </p:sp>
       <p:sp>
         <p:nvSpPr>
-          <p:cNvPr id="108" name="OTLSHAPE_T_95165ce96d724c39a18b4303569a4811_Shape"/>
+          <p:cNvPr id="209" name="OTLSHAPE_T_95165ce96d724c39a18b4303569a4811_Shape"/>
           <p:cNvSpPr/>
           <p:nvPr>
             <p:custDataLst>
-              <p:tags r:id="rId38"/>
+              <p:tags r:id="rId54"/>
             </p:custDataLst>
           </p:nvPr>
         </p:nvSpPr>
         <p:spPr>
           <a:xfrm>
-            <a:off x="3883443" y="4211955"/>
-            <a:ext cx="2032000" cy="203200"/>
+            <a:off x="4304883" y="4211955"/>
+            <a:ext cx="2324100" cy="203200"/>
           </a:xfrm>
           <a:prstGeom prst="rect">
             <a:avLst/>
@@ -4893,17 +5756,17 @@
       </p:sp>
       <p:sp>
         <p:nvSpPr>
-          <p:cNvPr id="109" name="OTLSHAPE_T_95165ce96d724c39a18b4303569a4811_ShapePercentage" hidden="1"/>
+          <p:cNvPr id="210" name="OTLSHAPE_T_95165ce96d724c39a18b4303569a4811_ShapePercentage" hidden="1"/>
           <p:cNvSpPr/>
           <p:nvPr>
             <p:custDataLst>
-              <p:tags r:id="rId39"/>
+              <p:tags r:id="rId55"/>
             </p:custDataLst>
           </p:nvPr>
         </p:nvSpPr>
         <p:spPr>
           <a:xfrm>
-            <a:off x="3883443" y="4211955"/>
+            <a:off x="4304883" y="4211955"/>
             <a:ext cx="0" cy="0"/>
           </a:xfrm>
           <a:prstGeom prst="rect">
@@ -4937,11 +5800,11 @@
       </p:sp>
       <p:sp>
         <p:nvSpPr>
-          <p:cNvPr id="110" name="OTLSHAPE_T_95165ce96d724c39a18b4303569a4811_Duration" hidden="1"/>
+          <p:cNvPr id="211" name="OTLSHAPE_T_95165ce96d724c39a18b4303569a4811_Duration" hidden="1"/>
           <p:cNvSpPr txBox="1"/>
           <p:nvPr>
             <p:custDataLst>
-              <p:tags r:id="rId40"/>
+              <p:tags r:id="rId56"/>
             </p:custDataLst>
           </p:nvPr>
         </p:nvSpPr>
@@ -4982,11 +5845,11 @@
       </p:sp>
       <p:sp>
         <p:nvSpPr>
-          <p:cNvPr id="111" name="OTLSHAPE_T_95165ce96d724c39a18b4303569a4811_TextPercentage" hidden="1"/>
+          <p:cNvPr id="212" name="OTLSHAPE_T_95165ce96d724c39a18b4303569a4811_TextPercentage" hidden="1"/>
           <p:cNvSpPr txBox="1"/>
           <p:nvPr>
             <p:custDataLst>
-              <p:tags r:id="rId41"/>
+              <p:tags r:id="rId57"/>
             </p:custDataLst>
           </p:nvPr>
         </p:nvSpPr>
@@ -5018,11 +5881,11 @@
       </p:sp>
       <p:sp>
         <p:nvSpPr>
-          <p:cNvPr id="112" name="OTLSHAPE_T_95165ce96d724c39a18b4303569a4811_StartDate" hidden="1"/>
+          <p:cNvPr id="213" name="OTLSHAPE_T_95165ce96d724c39a18b4303569a4811_StartDate" hidden="1"/>
           <p:cNvSpPr txBox="1"/>
           <p:nvPr>
             <p:custDataLst>
-              <p:tags r:id="rId42"/>
+              <p:tags r:id="rId58"/>
             </p:custDataLst>
           </p:nvPr>
         </p:nvSpPr>
@@ -5054,11 +5917,11 @@
       </p:sp>
       <p:sp>
         <p:nvSpPr>
-          <p:cNvPr id="113" name="OTLSHAPE_T_95165ce96d724c39a18b4303569a4811_EndDate" hidden="1"/>
+          <p:cNvPr id="214" name="OTLSHAPE_T_95165ce96d724c39a18b4303569a4811_EndDate" hidden="1"/>
           <p:cNvSpPr txBox="1"/>
           <p:nvPr>
             <p:custDataLst>
-              <p:tags r:id="rId43"/>
+              <p:tags r:id="rId59"/>
             </p:custDataLst>
           </p:nvPr>
         </p:nvSpPr>
@@ -5090,17 +5953,17 @@
       </p:sp>
       <p:sp>
         <p:nvSpPr>
-          <p:cNvPr id="114" name="OTLSHAPE_T_95165ce96d724c39a18b4303569a4811_JoinedDate"/>
+          <p:cNvPr id="215" name="OTLSHAPE_T_95165ce96d724c39a18b4303569a4811_JoinedDate"/>
           <p:cNvSpPr txBox="1"/>
           <p:nvPr>
             <p:custDataLst>
-              <p:tags r:id="rId44"/>
+              <p:tags r:id="rId60"/>
             </p:custDataLst>
           </p:nvPr>
         </p:nvSpPr>
         <p:spPr>
           <a:xfrm>
-            <a:off x="5962421" y="4236043"/>
+            <a:off x="6673601" y="4236043"/>
             <a:ext cx="1206500" cy="155025"/>
           </a:xfrm>
           <a:prstGeom prst="rect">
@@ -5134,11 +5997,11 @@
       </p:sp>
       <p:sp>
         <p:nvSpPr>
-          <p:cNvPr id="115" name="OTLSHAPE_T_95165ce96d724c39a18b4303569a4811_Title"/>
+          <p:cNvPr id="216" name="OTLSHAPE_T_95165ce96d724c39a18b4303569a4811_Title"/>
           <p:cNvSpPr txBox="1"/>
           <p:nvPr>
             <p:custDataLst>
-              <p:tags r:id="rId45"/>
+              <p:tags r:id="rId61"/>
             </p:custDataLst>
           </p:nvPr>
         </p:nvSpPr>
@@ -5178,18 +6041,18 @@
       </p:sp>
       <p:sp>
         <p:nvSpPr>
-          <p:cNvPr id="116" name="OTLSHAPE_T_fbac9a43b55f469785cde806223acaa7_Shape"/>
+          <p:cNvPr id="217" name="OTLSHAPE_T_fbac9a43b55f469785cde806223acaa7_Shape"/>
           <p:cNvSpPr/>
           <p:nvPr>
             <p:custDataLst>
-              <p:tags r:id="rId46"/>
+              <p:tags r:id="rId62"/>
             </p:custDataLst>
           </p:nvPr>
         </p:nvSpPr>
         <p:spPr>
           <a:xfrm>
-            <a:off x="5911621" y="4478655"/>
-            <a:ext cx="1854200" cy="203200"/>
+            <a:off x="6622801" y="4478655"/>
+            <a:ext cx="2108200" cy="203200"/>
           </a:xfrm>
           <a:prstGeom prst="rect">
             <a:avLst/>
@@ -5267,17 +6130,17 @@
       </p:sp>
       <p:sp>
         <p:nvSpPr>
-          <p:cNvPr id="117" name="OTLSHAPE_T_fbac9a43b55f469785cde806223acaa7_ShapePercentage" hidden="1"/>
+          <p:cNvPr id="218" name="OTLSHAPE_T_fbac9a43b55f469785cde806223acaa7_ShapePercentage" hidden="1"/>
           <p:cNvSpPr/>
           <p:nvPr>
             <p:custDataLst>
-              <p:tags r:id="rId47"/>
+              <p:tags r:id="rId63"/>
             </p:custDataLst>
           </p:nvPr>
         </p:nvSpPr>
         <p:spPr>
           <a:xfrm>
-            <a:off x="5911621" y="4478655"/>
+            <a:off x="6622801" y="4478655"/>
             <a:ext cx="0" cy="0"/>
           </a:xfrm>
           <a:prstGeom prst="rect">
@@ -5311,11 +6174,11 @@
       </p:sp>
       <p:sp>
         <p:nvSpPr>
-          <p:cNvPr id="118" name="OTLSHAPE_T_fbac9a43b55f469785cde806223acaa7_Duration" hidden="1"/>
+          <p:cNvPr id="219" name="OTLSHAPE_T_fbac9a43b55f469785cde806223acaa7_Duration" hidden="1"/>
           <p:cNvSpPr txBox="1"/>
           <p:nvPr>
             <p:custDataLst>
-              <p:tags r:id="rId48"/>
+              <p:tags r:id="rId64"/>
             </p:custDataLst>
           </p:nvPr>
         </p:nvSpPr>
@@ -5356,11 +6219,11 @@
       </p:sp>
       <p:sp>
         <p:nvSpPr>
-          <p:cNvPr id="119" name="OTLSHAPE_T_fbac9a43b55f469785cde806223acaa7_TextPercentage" hidden="1"/>
+          <p:cNvPr id="220" name="OTLSHAPE_T_fbac9a43b55f469785cde806223acaa7_TextPercentage" hidden="1"/>
           <p:cNvSpPr txBox="1"/>
           <p:nvPr>
             <p:custDataLst>
-              <p:tags r:id="rId49"/>
+              <p:tags r:id="rId65"/>
             </p:custDataLst>
           </p:nvPr>
         </p:nvSpPr>
@@ -5392,11 +6255,11 @@
       </p:sp>
       <p:sp>
         <p:nvSpPr>
-          <p:cNvPr id="120" name="OTLSHAPE_T_fbac9a43b55f469785cde806223acaa7_StartDate" hidden="1"/>
+          <p:cNvPr id="221" name="OTLSHAPE_T_fbac9a43b55f469785cde806223acaa7_StartDate" hidden="1"/>
           <p:cNvSpPr txBox="1"/>
           <p:nvPr>
             <p:custDataLst>
-              <p:tags r:id="rId50"/>
+              <p:tags r:id="rId66"/>
             </p:custDataLst>
           </p:nvPr>
         </p:nvSpPr>
@@ -5428,11 +6291,11 @@
       </p:sp>
       <p:sp>
         <p:nvSpPr>
-          <p:cNvPr id="121" name="OTLSHAPE_T_fbac9a43b55f469785cde806223acaa7_EndDate" hidden="1"/>
+          <p:cNvPr id="222" name="OTLSHAPE_T_fbac9a43b55f469785cde806223acaa7_EndDate" hidden="1"/>
           <p:cNvSpPr txBox="1"/>
           <p:nvPr>
             <p:custDataLst>
-              <p:tags r:id="rId51"/>
+              <p:tags r:id="rId67"/>
             </p:custDataLst>
           </p:nvPr>
         </p:nvSpPr>
@@ -5464,17 +6327,17 @@
       </p:sp>
       <p:sp>
         <p:nvSpPr>
-          <p:cNvPr id="122" name="OTLSHAPE_T_fbac9a43b55f469785cde806223acaa7_JoinedDate"/>
+          <p:cNvPr id="223" name="OTLSHAPE_T_fbac9a43b55f469785cde806223acaa7_JoinedDate"/>
           <p:cNvSpPr txBox="1"/>
           <p:nvPr>
             <p:custDataLst>
-              <p:tags r:id="rId52"/>
+              <p:tags r:id="rId68"/>
             </p:custDataLst>
           </p:nvPr>
         </p:nvSpPr>
         <p:spPr>
           <a:xfrm>
-            <a:off x="7806220" y="4502743"/>
+            <a:off x="8780799" y="4502743"/>
             <a:ext cx="1206500" cy="155025"/>
           </a:xfrm>
           <a:prstGeom prst="rect">
@@ -5508,11 +6371,11 @@
       </p:sp>
       <p:sp>
         <p:nvSpPr>
-          <p:cNvPr id="123" name="OTLSHAPE_T_fbac9a43b55f469785cde806223acaa7_Title"/>
+          <p:cNvPr id="224" name="OTLSHAPE_T_fbac9a43b55f469785cde806223acaa7_Title"/>
           <p:cNvSpPr txBox="1"/>
           <p:nvPr>
             <p:custDataLst>
-              <p:tags r:id="rId53"/>
+              <p:tags r:id="rId69"/>
             </p:custDataLst>
           </p:nvPr>
         </p:nvSpPr>
@@ -5552,18 +6415,18 @@
       </p:sp>
       <p:sp>
         <p:nvSpPr>
-          <p:cNvPr id="124" name="OTLSHAPE_T_639eb425594949de89152d34c2f53fa5_Shape"/>
+          <p:cNvPr id="225" name="OTLSHAPE_T_639eb425594949de89152d34c2f53fa5_Shape"/>
           <p:cNvSpPr/>
           <p:nvPr>
             <p:custDataLst>
-              <p:tags r:id="rId54"/>
+              <p:tags r:id="rId70"/>
             </p:custDataLst>
           </p:nvPr>
         </p:nvSpPr>
         <p:spPr>
           <a:xfrm>
-            <a:off x="7755420" y="4745355"/>
-            <a:ext cx="1663700" cy="203200"/>
+            <a:off x="8729999" y="4745355"/>
+            <a:ext cx="1905000" cy="203200"/>
           </a:xfrm>
           <a:prstGeom prst="rect">
             <a:avLst/>
@@ -5641,17 +6504,17 @@
       </p:sp>
       <p:sp>
         <p:nvSpPr>
-          <p:cNvPr id="125" name="OTLSHAPE_T_639eb425594949de89152d34c2f53fa5_ShapePercentage" hidden="1"/>
+          <p:cNvPr id="226" name="OTLSHAPE_T_639eb425594949de89152d34c2f53fa5_ShapePercentage" hidden="1"/>
           <p:cNvSpPr/>
           <p:nvPr>
             <p:custDataLst>
-              <p:tags r:id="rId55"/>
+              <p:tags r:id="rId71"/>
             </p:custDataLst>
           </p:nvPr>
         </p:nvSpPr>
         <p:spPr>
           <a:xfrm>
-            <a:off x="7755420" y="4745355"/>
+            <a:off x="8729999" y="4745355"/>
             <a:ext cx="0" cy="0"/>
           </a:xfrm>
           <a:prstGeom prst="rect">
@@ -5685,11 +6548,11 @@
       </p:sp>
       <p:sp>
         <p:nvSpPr>
-          <p:cNvPr id="126" name="OTLSHAPE_T_639eb425594949de89152d34c2f53fa5_Duration" hidden="1"/>
+          <p:cNvPr id="227" name="OTLSHAPE_T_639eb425594949de89152d34c2f53fa5_Duration" hidden="1"/>
           <p:cNvSpPr txBox="1"/>
           <p:nvPr>
             <p:custDataLst>
-              <p:tags r:id="rId56"/>
+              <p:tags r:id="rId72"/>
             </p:custDataLst>
           </p:nvPr>
         </p:nvSpPr>
@@ -5730,11 +6593,11 @@
       </p:sp>
       <p:sp>
         <p:nvSpPr>
-          <p:cNvPr id="127" name="OTLSHAPE_T_639eb425594949de89152d34c2f53fa5_TextPercentage" hidden="1"/>
+          <p:cNvPr id="228" name="OTLSHAPE_T_639eb425594949de89152d34c2f53fa5_TextPercentage" hidden="1"/>
           <p:cNvSpPr txBox="1"/>
           <p:nvPr>
             <p:custDataLst>
-              <p:tags r:id="rId57"/>
+              <p:tags r:id="rId73"/>
             </p:custDataLst>
           </p:nvPr>
         </p:nvSpPr>
@@ -5766,11 +6629,11 @@
       </p:sp>
       <p:sp>
         <p:nvSpPr>
-          <p:cNvPr id="128" name="OTLSHAPE_T_639eb425594949de89152d34c2f53fa5_StartDate" hidden="1"/>
+          <p:cNvPr id="229" name="OTLSHAPE_T_639eb425594949de89152d34c2f53fa5_StartDate" hidden="1"/>
           <p:cNvSpPr txBox="1"/>
           <p:nvPr>
             <p:custDataLst>
-              <p:tags r:id="rId58"/>
+              <p:tags r:id="rId74"/>
             </p:custDataLst>
           </p:nvPr>
         </p:nvSpPr>
@@ -5802,11 +6665,11 @@
       </p:sp>
       <p:sp>
         <p:nvSpPr>
-          <p:cNvPr id="129" name="OTLSHAPE_T_639eb425594949de89152d34c2f53fa5_EndDate" hidden="1"/>
+          <p:cNvPr id="230" name="OTLSHAPE_T_639eb425594949de89152d34c2f53fa5_EndDate" hidden="1"/>
           <p:cNvSpPr txBox="1"/>
           <p:nvPr>
             <p:custDataLst>
-              <p:tags r:id="rId59"/>
+              <p:tags r:id="rId75"/>
             </p:custDataLst>
           </p:nvPr>
         </p:nvSpPr>
@@ -5838,17 +6701,17 @@
       </p:sp>
       <p:sp>
         <p:nvSpPr>
-          <p:cNvPr id="130" name="OTLSHAPE_T_639eb425594949de89152d34c2f53fa5_JoinedDate"/>
+          <p:cNvPr id="231" name="OTLSHAPE_T_639eb425594949de89152d34c2f53fa5_JoinedDate"/>
           <p:cNvSpPr txBox="1"/>
           <p:nvPr>
             <p:custDataLst>
-              <p:tags r:id="rId60"/>
+              <p:tags r:id="rId76"/>
             </p:custDataLst>
           </p:nvPr>
         </p:nvSpPr>
         <p:spPr>
           <a:xfrm>
-            <a:off x="9465639" y="4769443"/>
+            <a:off x="10677278" y="4769443"/>
             <a:ext cx="1130300" cy="155025"/>
           </a:xfrm>
           <a:prstGeom prst="rect">
@@ -5882,11 +6745,11 @@
       </p:sp>
       <p:sp>
         <p:nvSpPr>
-          <p:cNvPr id="131" name="OTLSHAPE_T_639eb425594949de89152d34c2f53fa5_Title"/>
+          <p:cNvPr id="232" name="OTLSHAPE_T_639eb425594949de89152d34c2f53fa5_Title"/>
           <p:cNvSpPr txBox="1"/>
           <p:nvPr>
             <p:custDataLst>
-              <p:tags r:id="rId61"/>
+              <p:tags r:id="rId77"/>
             </p:custDataLst>
           </p:nvPr>
         </p:nvSpPr>
@@ -5942,7 +6805,7 @@
 
 <file path=ppt/tags/tag1.xml><?xml version="1.0" encoding="utf-8"?>
 <p:tagLst xmlns:a="http://schemas.openxmlformats.org/drawingml/2006/main" xmlns:r="http://schemas.openxmlformats.org/officeDocument/2006/relationships" xmlns:p="http://schemas.openxmlformats.org/presentationml/2006/main">
-  <p:tag name="__PART_0" val="eyIkaWQiOiIxIiwiQ3VsdHVyZUluZm9OYW1lIjoiZnItRlIiLCJTdHlsZU5hbWUiOiJTdGFuZGFyZCIsIklzVGVtcGxhdGUiOmZhbHNlLCJWZXJzaW9uIjp7IiRpZCI6IjIiLCJWZXJzaW9uIjoiMy4wLjEiLCJPcmlnaW5hbEFzc2VtYmx5VmVyc2lvbiI6IjMuMDkuMDUuMDAiLCJFZGl0aW9uIjoiQmFzaWMiLCJJc1BsdXNFZGl0aW9uIjpmYWxzZX0sIkVmZmVjdCI6MSwiU3R5bGUiOnsiJGlkIjoiMyIsIlRpbWViYW5kU3R5bGUiOnsiJGlkIjoiNCIsIlNjYWxlTWFya2luZyI6MCwiU2hhcGUiOjAsIlNoYXBlU3R5bGUiOnsiJGlkIjoiNSIsIk1hcmdpbiI6eyIkaWQiOiI2IiwiVG9wIjowLCJMZWZ0IjoxMiwiUmlnaHQiOjEyLCJCb3R0b20iOjB9LCJQYWRkaW5nIjp7IiRpZCI6IjciLCJUb3AiOjUsIkxlZnQiOjAsIlJpZ2h0IjowLCJCb3R0b20iOjV9LCJCYWNrZ3JvdW5kIjp7IiRpZCI6IjgiLCJDb2xvciI6eyIkaWQiOiI5IiwiQSI6MjU1LCJSIjo2OCwiRyI6ODQsIkIiOjEwNn19LCJJc1Zpc2libGUiOnRydWUsIldpZHRoIjo4NTguMCwiSGVpZ2h0IjozMC4wLCJCb3JkZXJTdHlsZSI6eyIkaWQiOiIxMCIsIkxpbmVDb2xvciI6eyIkaWQiOiIxMSIsIiR0eXBlIjoiTkxSRS5Db21tb24uRG9tLlNvbGlkQ29sb3JCcnVzaCwgTkxSRS5Db21tb24iLCJDb2xvciI6eyIkaWQiOiIxMiIsIkEiOjI1NSwiUiI6MjU1LCJHIjowLCJCIjowfX0sIkxpbmVXZWlnaHQiOjAuMCwiTGluZVR5cGUiOjAsIlBhcmVudFN0eWxlIjpudWxsfSwiUGFyZW50U3R5bGUiOm51bGx9LCJSaWdodEVuZENhcHNTdHlsZSI6eyIkaWQiOiIxMyIsIkZvbnRTZXR0aW5ncyI6eyIkaWQiOiIxNCIsIkZvbnRTaXplIjoxOCwiRm9udE5hbWUiOiJDYWxpYnJpIiwiSXNCb2xkIjp0cnVlLCJJc0l0YWxpYyI6ZmFsc2UsIklzVW5kZXJsaW5lZCI6ZmFsc2UsIlBhcmVudFN0eWxlIjpudWxsfSwiQXV0b1NpemUiOjAsIkZvcmVncm91bmQiOnsiJGlkIjoiMTUiLCJDb2xvciI6eyIkaWQiOiIxNiIsIkEiOjI1NSwiUiI6MTkyLCJHIjo4MCwiQiI6Nzd9fSwiTWF4V2lkdGgiOiJJbmZpbml0eSIsIk1heEhlaWdodCI6IkluZmluaXR5IiwiU21hcnRGb3JlZ3JvdW5kSXNBY3RpdmUiOmZhbHNlLCJIb3Jpem9udGFsQWxpZ25tZW50IjowLCJWZXJ0aWNhbEFsaWdubWVudCI6MCwiU21hcnRGb3JlZ3JvdW5kIjpudWxsLCJNYXJnaW4iOnsiJGlkIjoiMTciLCJUb3AiOjAsIkxlZnQiOjAsIlJpZ2h0IjoyNSwiQm90dG9tIjowfSwiUGFkZGluZyI6eyIkaWQiOiIxOCIsIlRvcCI6MCwiTGVmdCI6MCwiUmlnaHQiOjAsIkJvdHRvbSI6MH0sIkJhY2tncm91bmQiOnsiJGlkIjoiMTkiLCJDb2xvciI6eyIkaWQiOiIyMCIsIkEiOjg5LCJSIjowLCJHIjowLCJCIjowfX0sIklzVmlzaWJsZSI6dHJ1ZSwiV2lkdGgiOjAuMCwiSGVpZ2h0IjowLjAsIkJvcmRlclN0eWxlIjpudWxsLCJQYXJlbnRTdHlsZSI6bnVsbH0sIkxlZnRFbmRDYXBzU3R5bGUiOnsiJGlkIjoiMjEiLCJGb250U2V0dGluZ3MiOnsiJGlkIjoiMjIiLCJGb250U2l6ZSI6MTgsIkZvbnROYW1lIjoiQ2FsaWJyaSIsIklzQm9sZCI6dHJ1ZSwiSXNJdGFsaWMiOmZhbHNlLCJJc1VuZGVybGluZWQiOmZhbHNlLCJQYXJlbnRTdHlsZSI6bnVsbH0sIkF1dG9TaXplIjowLCJGb3JlZ3JvdW5kIjp7IiRpZCI6IjIzIiwiQ29sb3IiOnsiJGlkIjoiMjQiLCJBIjoyNTUsIlIiOjE5MiwiRyI6ODAsIkIiOjc3fX0sIk1heFdpZHRoIjoiSW5maW5pdHkiLCJNYXhIZWlnaHQiOiJJbmZpbml0eSIsIlNtYXJ0Rm9yZWdyb3VuZElzQWN0aXZlIjpmYWxzZSwiSG9yaXpvbnRhbEFsaWdubWVudCI6MCwiVmVydGljYWxBbGlnbm1lbnQiOjAsIlNtYXJ0Rm9yZWdyb3VuZCI6bnVsbCwiTWFyZ2luIjp7IiRpZCI6IjI1IiwiVG9wIjowLCJMZWZ0IjoyNSwiUmlnaHQiOjAsIkJvdHRvbSI6MH0sIlBhZGRpbmciOnsiJGlkIjoiMjYiLCJUb3AiOjAsIkxlZnQiOjAsIlJpZ2h0IjowLCJCb3R0b20iOjB9LCJCYWNrZ3JvdW5kIjp7IiRpZCI6IjI3IiwiQ29sb3IiOnsiJHJlZiI6IjIwIn19LCJJc1Zpc2libGUiOnRydWUsIldpZHRoIjowLjAsIkhlaWdodCI6MC4wLCJCb3JkZXJTdHlsZSI6bnVsbCwiUGFyZW50U3R5bGUiOm51bGx9LCJUb2RheVRleHRTdHlsZSI6eyIkaWQiOiIyOCIsIkZvbnRTZXR0aW5ncyI6eyIkaWQiOiIyOSIsIkZvbnRTaXplIjoxMiwiRm9udE5hbWUiOiJDYWxpYnJpIiwiSXNCb2xkIjpmYWxzZSwiSXNJdGFsaWMiOmZhbHNlLCJJc1VuZGVybGluZWQiOmZhbHNlLCJQYXJlbnRTdHlsZSI6bnVsbH0sIkF1dG9TaXplIjowLCJGb3JlZ3JvdW5kIjp7IiRpZCI6IjMwIiwiQ29sb3IiOnsiJGlkIjoiMzEiLCJBIjoyNTUsIlIiOjAsIkciOjAsIkIiOjB9fSwiTWF4V2lkdGgiOjIwMC4wLCJNYXhIZWlnaHQiOiJJbmZpbml0eSIsIlNtYXJ0Rm9yZWdyb3VuZElzQWN0aXZlIjpmYWxzZSwiSG9yaXpvbnRhbEFsaWdubWVudCI6MCwiVmVydGljYWxBbGlnbm1lbnQiOjAsIlNtYXJ0Rm9yZWdyb3VuZCI6bnVsbCwiTWFyZ2luIjp7IiRpZCI6IjMyIiwiVG9wIjowLCJMZWZ0IjowLCJSaWdodCI6MCwiQm90dG9tIjowfSwiUGFkZGluZyI6eyIkaWQiOiIzMyIsIlRvcCI6MCwiTGVmdCI6MCwiUmlnaHQiOjAsIkJvdHRvbSI6MH0sIkJhY2tncm91bmQiOnsiJGlkIjoiMzQiLCJDb2xvciI6eyIkcmVmIjoiMjAifX0sIklzVmlzaWJsZSI6dHJ1ZSwiV2lkdGgiOjAuMCwiSGVpZ2h0IjowLjAsIkJvcmRlclN0eWxlIjpudWxsLCJQYXJlbnRTdHlsZSI6bnVsbH0sIlRvZGF5TWFya2VyU3R5bGUiOnsiJGlkIjoiMzUiLCJNYXJnaW4iOnsiJGlkIjoiMzYiLCJUb3AiOjAsIkxlZnQiOjAsIlJpZ2h0IjowLCJCb3R0b20iOjB9LCJQYWRkaW5nIjp7IiRpZCI6IjM3IiwiVG9wIjowLCJMZWZ0IjowLCJSaWdodCI6MCwiQm90dG9tIjowfSwiQmFja2dyb3VuZCI6eyIkaWQiOiIzOCIsIkNvbG9yIjp7IiRpZCI6IjM5IiwiQSI6MjU1LCJSIjoyNTUsIkciOjAsIkIiOjB9fSwiSXNWaXNpYmxlIjp0cnVlLCJXaWR0aCI6MC4wLCJIZWlnaHQiOjAuMCwiQm9yZGVyU3R5bGUiOm51bGwsIlBhcmVudFN0eWxlIjpudWxsfSwiU2NhbGVTdHlsZSI6eyIkaWQiOiI0MCIsIlNob3dTZWdtZW50U2VwYXJhdG9ycyI6dHJ1ZSwiU2VnbWVudFNlcGFyYXRvck9wYWNpdHkiOjMwLCJGb250U2V0dGluZ3MiOnsiJGlkIjoiNDEiLCJGb250U2l6ZSI6MTIsIkZvbnROYW1lIjoiQ2FsaWJyaSIsIklzQm9sZCI6ZmFsc2UsIklzSXRhbGljIjpmYWxzZSwiSXNVbmRlcmxpbmVkIjpmYWxzZSwiUGFyZW50U3R5bGUiOm51bGx9LCJBdXRvU2l6ZSI6MCwiRm9yZWdyb3VuZCI6eyIkaWQiOiI0MiIsIkNvbG9yIjp7IiRpZCI6IjQzIiwiQSI6MjU1LCJSIjoyNTUsIkciOjI1NSwiQiI6MjU1fX0sIk1heFdpZHRoIjoyMDAuMCwiTWF4SGVpZ2h0IjoiSW5maW5pdHkiLCJTbWFydEZvcmVncm91bmRJc0FjdGl2ZSI6ZmFsc2UsIkhvcml6b250YWxBbGlnbm1lbnQiOjAsIlZlcnRpY2FsQWxpZ25tZW50IjoxLCJTbWFydEZvcmVncm91bmQiOm51bGwsIk1hcmdpbiI6eyIkaWQiOiI0NCIsIlRvcCI6MCwiTGVmdCI6NSwiUmlnaHQiOjAsIkJvdHRvbSI6MH0sIlBhZGRpbmciOnsiJGlkIjoiNDUiLCJUb3AiOjAsIkxlZnQiOjAsIlJpZ2h0IjowLCJCb3R0b20iOjB9LCJCYWNrZ3JvdW5kIjp7IiRpZCI6IjQ2IiwiQ29sb3IiOnsiJHJlZiI6IjIwIn19LCJJc1Zpc2libGUiOnRydWUsIldpZHRoIjowLjAsIkhlaWdodCI6MC4wLCJCb3JkZXJTdHlsZSI6bnVsbCwiUGFyZW50U3R5bGUiOm51bGx9LCJFbGFwc2VkVGltZUJhY2tncm91bmQiOnsiJGlkIjoiNDciLCJDb2xvciI6eyIkaWQiOiI0OCIsIkEiOjE5MSwiUiI6MjU1LCJHIjowLCJCIjowfX0sIkFwcGVuZFllYXJPblllYXJDaGFuZ2UiOnRydWUsIkVsYXBzZWRUaW1lRm9ybWF0IjoyLCJUb2RheU1hcmtlclBvc2l0aW9uIjozLCJRdWlja1Bvc2l0aW9uIjoxLCJBYnNvbHV0ZVBvc2l0aW9uIjoyNDAuMCwiTWFyZ2luIjp7IiRpZCI6IjQ5IiwiVG9wIjowLCJMZWZ0IjoxMCwiUmlnaHQiOjEwLCJCb3R0b20iOjB9LCJQYWRkaW5nIjp7IiRpZCI6IjUwIiwiVG9wIjowLCJMZWZ0IjowLCJSaWdodCI6MCwiQm90dG9tIjowfSwiQmFja2dyb3VuZCI6eyIkaWQiOiI1MSIsIkNvbG9yIjp7IiRpZCI6IjUyIiwiQSI6MjU1LCJSIjozMSwiRyI6NzMsIkIiOjEyNX19LCJJc1Zpc2libGUiOnRydWUsIldpZHRoIjowLjAsIkhlaWdodCI6MC4wLCJCb3JkZXJTdHlsZSI6bnVsbCwiUGFyZW50U3R5bGUiOm51bGx9LCJEZWZhdWx0TWlsZXN0b25lU3R5bGUiOnsiJGlkIjoiNTMiLCJTaGFwZSI6MiwiQ29ubmVjdG9yTWFyZ2luIjp7IiRpZCI6IjU0IiwiVG9wIjowLCJMZWZ0IjoyLCJSaWdodCI6MiwiQm90dG9tIjowfSwiQ29ubmVjdG9yU3R5bGUiOnsiJGlkIjoiNTUiLCJMaW5lQ29sb3IiOnsiJGlkIjoiNTYiLCIkdHlwZSI6Ik5MUkUuQ29tbW9uLkRvbS5Tb2xpZENvbG9yQnJ1c2gsIE5MUkUuQ29tbW9uIiwiQ29sb3IiOnsiJGlkIjoiNTciLCJBIjoyNTUsIlIiOjMxLCJHIjo3MywiQiI6MTI2fX0sIkxpbmVXZWlnaHQiOjEuMCwiTGluZVR5cGUiOjAsIlBhcmVudFN0eWxlIjpudWxsfSwiSXNCZWxvd1RpbWViYW5kIjpmYWxzZSwiSGlkZURhdGUiOmZhbHNlLCJTaGFwZVNpemUiOjEsIlNwYWNpbmciOjEuMCwiUGFkZGluZyI6eyIkaWQiOiI1OCIsIlRvcCI6NywiTGVmdCI6MywiUmlnaHQiOjAsIkJvdHRvbSI6Mn0sIlNoYXBlU3R5bGUiOnsiJGlkIjoiNTkiLCJNYXJnaW4iOnsiJGlkIjoiNjAiLCJUb3AiOjAsIkxlZnQiOjAsIlJpZ2h0IjowLCJCb3R0b20iOjB9LCJQYWRkaW5nIjp7IiRpZCI6IjYxIiwiVG9wIjowLCJMZWZ0IjowLCJSaWdodCI6MCwiQm90dG9tIjowfSwiQmFja2dyb3VuZCI6bnVsbCwiSXNWaXNpYmxlIjp0cnVlLCJXaWR0aCI6MTguMCwiSGVpZ2h0IjoyMC4wLCJCb3JkZXJTdHlsZSI6eyIkaWQiOiI2MiIsIkxpbmVDb2xvciI6eyIkaWQiOiI2MyIsIiR0eXBlIjoiTkxSRS5Db21tb24uRG9tLlNvbGlkQ29sb3JCcnVzaCwgTkxSRS5Db21tb24iLCJDb2xvciI6eyIkaWQiOiI2NCIsIkEiOjI1NSwiUiI6MjU1LCJHIjowLCJCIjowfX0sIkxpbmVXZWlnaHQiOjAuMCwiTGluZVR5cGUiOjAsIlBhcmVudFN0eWxlIjpudWxsfSwiUGFyZW50U3R5bGUiOm51bGx9LCJUaXRsZVN0eWxlIjp7IiRpZCI6IjY1IiwiRm9udFNldHRpbmdzIjp7IiRpZCI6IjY2IiwiRm9udFNpemUiOjExLCJGb250TmFtZSI6IkNhbGlicmkiLCJJc0JvbGQiOnRydWUsIklzSXRhbGljIjpmYWxzZSwiSXNVbmRlcmxpbmVkIjpmYWxzZSwiUGFyZW50U3R5bGUiOm51bGx9LCJBdXRvU2l6ZSI6MCwiRm9yZWdyb3VuZCI6eyIkaWQiOiI2NyIsIkNvbG9yIjp7IiRpZCI6IjY4IiwiQSI6MjU1LCJSIjowLCJHIjowLCJCIjowfX0sIk1heFdpZHRoIjoyMDAuMCwiTWF4SGVpZ2h0IjoiSW5maW5pdHkiLCJTbWFydEZvcmVncm91bmRJc0FjdGl2ZSI6ZmFsc2UsIkhvcml6b250YWxBbGlnbm1lbnQiOjAsIlZlcnRpY2FsQWxpZ25tZW50IjowLCJTbWFydEZvcmVncm91bmQiOm51bGwsIk1hcmdpbiI6eyIkaWQiOiI2OSIsIlRvcCI6MCwiTGVmdCI6MCwiUmlnaHQiOjAsIkJvdHRvbSI6MH0sIlBhZGRpbmciOnsiJGlkIjoiNzAiLCJUb3AiOjAsIkxlZnQiOjAsIlJpZ2h0IjowLCJCb3R0b20iOjB9LCJCYWNrZ3JvdW5kIjp7IiRpZCI6IjcxIiwiQ29sb3IiOnsiJHJlZiI6IjIwIn19LCJJc1Zpc2libGUiOnRydWUsIldpZHRoIjowLjAsIkhlaWdodCI6MC4wLCJCb3JkZXJTdHlsZSI6bnVsbCwiUGFyZW50U3R5bGUiOm51bGx9LCJEYXRlU3R5bGUiOnsiJGlkIjoiNzIiLCJGb250U2V0dGluZ3MiOnsiJGlkIjoiNzMiLCJGb250U2l6ZSI6MTAsIkZvbnROYW1lIjoiQ2FsaWJyaSIsIklzQm9sZCI6ZmFsc2UsIklzSXRhbGljIjpmYWxzZSwiSXNVbmRlcmxpbmVkIjpmYWxzZSwiUGFyZW50U3R5bGUiOm51bGx9LCJBdXRvU2l6ZSI6MCwiRm9yZWdyb3VuZCI6eyIkaWQiOiI3NCIsIkNvbG9yIjp7IiRpZCI6Ijc1IiwiQSI6MjU1LCJSIjozMSwiRyI6NzMsIkIiOjEyNn19LCJNYXhXaWR0aCI6MjAwLjAsIk1heEhlaWdodCI6IkluZmluaXR5IiwiU21hcnRGb3JlZ3JvdW5kSXNBY3RpdmUiOmZhbHNlLCJIb3Jpem9udGFsQWxpZ25tZW50IjowLCJWZXJ0aWNhbEFsaWdubWVudCI6MCwiU21hcnRGb3JlZ3JvdW5kIjpudWxsLCJNYXJnaW4iOnsiJGlkIjoiNzYiLCJUb3AiOjAsIkxlZnQiOjAsIlJpZ2h0IjowLCJCb3R0b20iOjB9LCJQYWRkaW5nIjp7IiRpZCI6Ijc3IiwiVG9wIjowLCJMZWZ0IjowLCJSaWdodCI6MCwiQm90dG9tIjowfSwiQmFja2dyb3VuZCI6eyIkaWQiOiI3OCIsIkNvbG9yIjp7IiRyZWYiOiIyMCJ9fSwiSXNWaXNpYmxlIjp0cnVlLCJXaWR0aCI6MC4wLCJIZWlnaHQiOjAuMCwiQm9yZGVyU3R5bGUiOm51bGwsIlBhcmVudFN0eWxlIjpudWxsfSwiRGF0ZUZvcm1hdCI6eyIkaWQiOiI3OSIsIkZvcm1hdFN0cmluZyI6Ik0vZC95eXl5IiwiU2VwYXJhdG9yIjoiLyIsIlVzZUludGVybmF0aW9uYWxEYXRlRm9ybWF0IjpmYWxzZX0sIklzVmlzaWJsZSI6dHJ1ZSwiUGFyZW50U3R5bGUiOm51bGx9LCJEZWZhdWx0VGFza1N0eWxlIjp7IiRpZCI6IjgwIiwiU2hhcGUiOjAsIlNoYXBlVGhpY2tuZXNzIjoxLCJEdXJhdGlvbkZvcm1hdCI6MCwiSW5jbHVkZU5vbldvcmtpbmdEYXlzSW5EdXJhdGlvbiI6dHJ1ZSwiUGVyY2VudGFnZUNvbXBsZXRlU3R5bGUiOnsiJGlkIjoiODEiLCJGb250U2V0dGluZ3MiOnsiJGlkIjoiODIiLCJGb250U2l6ZSI6MTAsIkZvbnROYW1lIjoiQ2FsaWJyaSIsIklzQm9sZCI6ZmFsc2UsIklzSXRhbGljIjpmYWxzZSwiSXNVbmRlcmxpbmVkIjpmYWxzZSwiUGFyZW50U3R5bGUiOm51bGx9LCJBdXRvU2l6ZSI6MCwiRm9yZWdyb3VuZCI6eyIkaWQiOiI4MyIsIkNvbG9yIjp7IiRpZCI6Ijg0IiwiQSI6MjU1LCJSIjoxOTIsIkciOjgwLCJCIjo3N319LCJNYXhXaWR0aCI6MjAwLjAsIk1heEhlaWdodCI6IkluZmluaXR5IiwiU21hcnRGb3JlZ3JvdW5kSXNBY3RpdmUiOmZhbHNlLCJIb3Jpem9udGFsQWxpZ25tZW50IjowLCJWZXJ0aWNhbEFsaWdubWVudCI6MCwiU21hcnRGb3JlZ3JvdW5kIjpudWxsLCJNYXJnaW4iOnsiJGlkIjoiODUiLCJUb3AiOjAsIkxlZnQiOjAsIlJpZ2h0IjowLCJCb3R0b20iOjB9LCJQYWRkaW5nIjp7IiRpZCI6Ijg2IiwiVG9wIjowLCJMZWZ0IjowLCJSaWdodCI6MCwiQm90dG9tIjowfSwiQmFja2dyb3VuZCI6eyIkaWQiOiI4NyIsIkNvbG9yIjp7IiRyZWYiOiIyMCJ9fSwiSXNWaXNpYmxlIjp0cnVlLCJXaWR0aCI6MC4wLCJIZWlnaHQiOjAuMCwiQm9yZGVyU3R5bGUiOm51bGwsIlBhcmVudFN0eWxlIjpudWxsfSwiRHVyYXRpb25TdHlsZSI6eyIkaWQiOiI4OCIsIkZvbnRTZXR0aW5ncyI6eyIkaWQiOiI4OSIsIkZvbnRTaXplIjoxMCwiRm9udE5hbWUiOiJDYWxpYnJpIiwiSXNCb2xkIjpmYWxzZSwiSXNJdGFsaWMiOmZhbHNlLCJJc1VuZGVybGluZWQiOmZhbHNlLCJQYXJlbnRTdHlsZSI6bnVsbH0sIkF1dG9TaXplIjowLCJGb3JlZ3JvdW5kIjp7IiRpZCI6IjkwIiwiQ29sb3IiOnsiJGlkIjoiOTEiLCJBIjoyNTUsIlIiOjE5MiwiRyI6ODAsIkIiOjc3fX0sIk1heFdpZHRoIjoyMDAuMCwiTWF4SGVpZ2h0IjoiSW5maW5pdHkiLCJTbWFydEZvcmVncm91bmRJc0FjdGl2ZSI6ZmFsc2UsIkhvcml6b250YWxBbGlnbm1lbnQiOjAsIlZlcnRpY2FsQWxpZ25tZW50IjowLCJTbWFydEZvcmVncm91bmQiOm51bGwsIk1hcmdpbiI6eyIkaWQiOiI5MiIsIlRvcCI6MCwiTGVmdCI6MCwiUmlnaHQiOjAsIkJvdHRvbSI6MH0sIlBhZGRpbmciOnsiJGlkIjoiOTMiLCJUb3AiOjAsIkxlZnQiOjAsIlJpZ2h0IjowLCJCb3R0b20iOjB9LCJCYWNrZ3JvdW5kIjp7IiRpZCI6Ijk0IiwiQ29sb3IiOnsiJHJlZiI6IjIwIn19LCJJc1Zpc2libGUiOnRydWUsIldpZHRoIjowLjAsIkhlaWdodCI6MC4wLCJCb3JkZXJTdHlsZSI6bnVsbCwiUGFyZW50U3R5bGUiOm51bGx9LCJIb3Jpem9udGFsQ29ubmVjdG9yU3R5bGUiOnsiJGlkIjoiOTUiLCJMaW5lQ29sb3IiOnsiJGlkIjoiOTYiLCIkdHlwZSI6Ik5MUkUuQ29tbW9uLkRvbS5Tb2xpZENvbG9yQnJ1c2gsIE5MUkUuQ29tbW9uIiwiQ29sb3IiOnsiJGlkIjoiOTciLCJBIjoyNTUsIlIiOjIwNCwiRyI6MjA0LCJCIjoyMDR9fSwiTGluZVdlaWdodCI6MS4wLCJMaW5lVHlwZSI6MCwiUGFyZW50U3R5bGUiOm51bGx9LCJWZXJ0aWNhbENvbm5lY3RvclN0eWxlIjp7IiRpZCI6Ijk4IiwiTGluZUNvbG9yIjp7IiRpZCI6Ijk5IiwiJHR5cGUiOiJOTFJFLkNvbW1vbi5Eb20uU29saWRDb2xvckJydXNoLCBOTFJFLkNvbW1vbiIsIkNvbG9yIjp7IiRpZCI6IjEwMCIsIkEiOjI1NSwiUiI6MjA0LCJHIjoyMDQsIkIiOjIwNH19LCJMaW5lV2VpZ2h0IjowLjAsIkxpbmVUeXBlIjowLCJQYXJlbnRTdHlsZSI6bnVsbH0sIk1hcmdpbiI6bnVsbCwiU3RhcnREYXRlUG9zaXRpb24iOjQsIkVuZERhdGVQb3NpdGlvbiI6NCwiVGl0bGVQb3NpdGlvbiI6NSwiRHVyYXRpb25Qb3NpdGlvbiI6NiwiUGVyY2VudGFnZUNvbXBsZXRlZFBvc2l0aW9uIjo2LCJTcGFjaW5nIjo1LCJJc0JlbG93VGltZWJhbmQiOnRydWUsIlBlcmNlbnRhZ2VDb21wbGV0ZVNoYXBlT3BhY2l0eSI6MzUsIlNoYXBlU3R5bGUiOnsiJGlkIjoiMTAxIiwiTWFyZ2luIjp7IiRpZCI6IjEwMiIsIlRvcCI6MCwiTGVmdCI6NCwiUmlnaHQiOjQsIkJvdHRvbSI6MH0sIlBhZGRpbmciOnsiJGlkIjoiMTAzIiwiVG9wIjowLCJMZWZ0IjowLCJSaWdodCI6MCwiQm90dG9tIjowfSwiQmFja2dyb3VuZCI6bnVsbCwiSXNWaXNpYmxlIjp0cnVlLCJXaWR0aCI6MC4wLCJIZWlnaHQiOjE2LjAsIkJvcmRlclN0eWxlIjp7IiRpZCI6IjEwNCIsIkxpbmVDb2xvciI6eyIkaWQiOiIxMDUiLCIkdHlwZSI6Ik5MUkUuQ29tbW9uLkRvbS5Tb2xpZENvbG9yQnJ1c2gsIE5MUkUuQ29tbW9uIiwiQ29sb3IiOnsiJGlkIjoiMTA2IiwiQSI6MjU1LCJSIjoyNTUsIkciOjAsIkIiOjB9fSwiTGluZVdlaWdodCI6MC4wLCJMaW5lVHlwZSI6MCwiUGFyZW50U3R5bGUiOm51bGx9LCJQYXJlbnRTdHlsZSI6bnVsbH0sIlRpdGxlU3R5bGUiOnsiJGlkIjoiMTA3IiwiRm9udFNldHRpbmdzIjp7IiRpZCI6IjEwOCIsIkZvbnRTaXplIjoxMSwiRm9udE5hbWUiOiJDYWxpYnJpIiwiSXNCb2xkIjp0cnVlLCJJc0l0YWxpYyI6ZmFsc2UsIklzVW5kZXJsaW5lZCI6ZmFsc2UsIlBhcmVudFN0eWxlIjpudWxsfSwiQXV0b1NpemUiOjAsIkZvcmVncm91bmQiOnsiJGlkIjoiMTA5IiwiQ29sb3IiOnsiJGlkIjoiMTEwIiwiQSI6MjU1LCJSIjowLCJHIjowLCJCIjowfX0sIk1heFdpZHRoIjo5NjAuMCwiTWF4SGVpZ2h0IjoiSW5maW5pdHkiLCJTbWFydEZvcmVncm91bmRJc0FjdGl2ZSI6ZmFsc2UsIkhvcml6b250YWxBbGlnbm1lbnQiOjAsIlZlcnRpY2FsQWxpZ25tZW50IjowLCJTbWFydEZvcmVncm91bmQiOm51bGwsIk1hcmdpbiI6eyIkaWQiOiIxMTEiLCJUb3AiOjAsIkxlZnQiOjAsIlJpZ2h0IjowLCJCb3R0b20iOjB9LCJQYWRkaW5nIjp7IiRpZCI6IjExMiIsIlRvcCI6MCwiTGVmdCI6MCwiUmlnaHQiOjAsIkJvdHRvbSI6MH0sIkJhY2tncm91bmQiOnsiJGlkIjoiMTEzIiwiQ29sb3IiOnsiJHJlZiI6IjIwIn19LCJJc1Zpc2libGUiOnRydWUsIldpZHRoIjowLjAsIkhlaWdodCI6MC4wLCJCb3JkZXJTdHlsZSI6bnVsbCwiUGFyZW50U3R5bGUiOm51bGx9LCJEYXRlU3R5bGUiOnsiJGlkIjoiMTE0IiwiRm9udFNldHRpbmdzIjp7IiRpZCI6IjExNSIsIkZvbnRTaXplIjoxMCwiRm9udE5hbWUiOiJDYWxpYnJpIiwiSXNCb2xkIjpmYWxzZSwiSXNJdGFsaWMiOmZhbHNlLCJJc1VuZGVybGluZWQiOmZhbHNlLCJQYXJlbnRTdHlsZSI6bnVsbH0sIkF1dG9TaXplIjowLCJGb3JlZ3JvdW5kIjp7IiRpZCI6IjExNiIsIkNvbG9yIjp7IiRpZCI6IjExNyIsIkEiOjI1NSwiUiI6MzEsIkciOjczLCJCIjoxMjZ9fSwiTWF4V2lkdGgiOjIwMC4wLCJNYXhIZWlnaHQiOiJJbmZpbml0eSIsIlNtYXJ0Rm9yZWdyb3VuZElzQWN0aXZlIjpmYWxzZSwiSG9yaXpvbnRhbEFsaWdubWVudCI6MCwiVmVydGljYWxBbGlnbm1lbnQiOjAsIlNtYXJ0Rm9yZWdyb3VuZCI6bnVsbCwiTWFyZ2luIjp7IiRpZCI6IjExOCIsIlRvcCI6MCwiTGVmdCI6MCwiUmlnaHQiOjAsIkJvdHRvbSI6MH0sIlBhZGRpbmciOnsiJGlkIjoiMTE5IiwiVG9wIjowLCJMZWZ0IjowLCJSaWdodCI6MCwiQm90dG9tIjowfSwiQmFja2dyb3VuZCI6eyIkaWQiOiIxMjAiLCJDb2xvciI6eyIkcmVmIjoiMjAifX0sIklzVmlzaWJsZSI6dHJ1ZSwiV2lkdGgiOjAuMCwiSGVpZ2h0IjowLjAsIkJvcmRlclN0eWxlIjpudWxsLCJQYXJlbnRTdHlsZSI6bnVsbH0sIkRhdGVGb3JtYXQiOnsiJGlkIjoiMTIxIiwiRm9ybWF0U3RyaW5nIjoiTS9kL3l5eXkiLCJTZXBhcmF0b3IiOiIvIiwiVXNlSW50ZXJuYXRpb25hbERhdGVGb3JtYXQiOmZhbHNlfSwiSXNWaXNpYmxlIjp0cnVlLCJQYXJlbnRTdHlsZSI6bnVsbH0sIlNob3dFbGFwc2VkVGltZUdyYWRpZW50U3R5bGUiOmZhbHNlfSwiU2NhbGUiOnsiJGlkIjoiMTIyIiwiU3RhcnREYXRlIjoiMjAxNy0wMS0yMFQwMDowMDowMFoiLCJFbmREYXRlIjoiMjAxNy0wMy0wOVQyMzo1OTo1OS45OTlaIiwiRm9ybWF0IjoidyIsIlR5cGUiOjEsIkF1dG9EYXRlUmFuZ2UiOnRydWUsIldvcmtpbmdEYXlzIjozMSwiVG9kYXlNYXJrZXJUZXh0IjoiQXVqb3VyZCdodWkiLCJBdXRvU2NhbGVUeXBlIjp0cnVlfSwiTWlsZXN0b25lcyI6W3siJGlkIjoiMTIzIiwiRGF0ZSI6IjIwMTctMDMtMDlUMjM6NTk6NTkuOTk5WiIsIlN0eWxlIjp7IiRpZCI6IjEyNCIsIlNoYXBlIjoyLCJDb25uZWN0b3JNYXJnaW4iOnsiJHJlZiI6IjU0In0sIkNvbm5lY3RvclN0eWxlIjp7IiRpZCI6IjEyNSIsIkxpbmVDb2xvciI6eyIkaWQiOiIxMjYiLCIkdHlwZSI6Ik5MUkUuQ29tbW9uLkRvbS5Tb2xpZENvbG9yQnJ1c2gsIE5MUkUuQ29tbW9uIiwiQ29sb3IiOnsiJGlkIjoiMTI3IiwiQSI6MTI3LCJSIjowLCJHIjoxMTQsIkIiOjE4OH19LCJMaW5lV2VpZ2h0IjoxLjAsIkxpbmVUeXBlIjowLCJQYXJlbnRTdHlsZSI6eyIkcmVmIjoiNTUifX0sIklzQmVsb3dUaW1lYmFuZCI6ZmFsc2UsIkhpZGVEYXRlIjpmYWxzZSwiU2hhcGVTaXplIjoxLCJTcGFjaW5nIjoxLjAsIlBhZGRpbmciOnsiJHJlZiI6IjU4In0sIlNoYXBlU3R5bGUiOnsiJGlkIjoiMTI4IiwiTWFyZ2luIjp7IiRyZWYiOiI2MCJ9LCJQYWRkaW5nIjp7IiRyZWYiOiI2MSJ9LCJCYWNrZ3JvdW5kIjp7IiRpZCI6IjEyOSIsIkNvbG9yIjp7IiRpZCI6IjEzMCIsIkEiOjI1NSwiUiI6MCwiRyI6MTE0LCJCIjoxODh9fSwiSXNWaXNpYmxlIjp0cnVlLCJXaWR0aCI6MTguMCwiSGVpZ2h0IjoyMC4wLCJCb3JkZXJTdHlsZSI6eyIkaWQiOiIxMzEiLCJMaW5lQ29sb3IiOnsiJHJlZiI6IjYzIn0sIkxpbmVXZWlnaHQiOjAuMCwiTGluZVR5cGUiOjAsIlBhcmVudFN0eWxlIjp7IiRyZWYiOiI2MiJ9fSwiUGFyZW50U3R5bGUiOnsiJHJlZiI6IjU5In19LCJUaXRsZVN0eWxlIjp7IiRpZCI6IjEzMiIsIkZvbnRTZXR0aW5ncyI6eyIkaWQiOiIxMzMiLCJGb250U2l6ZSI6MTEsIkZvbnROYW1lIjoiQ2FsaWJyaSIsIklzQm9sZCI6dHJ1ZSwiSXNJdGFsaWMiOmZhbHNlLCJJc1VuZGVybGluZWQiOmZhbHNlLCJQYXJlbnRTdHlsZSI6eyIkcmVmIjoiNjYifX0sIkF1dG9TaXplIjowLCJGb3JlZ3JvdW5kIjp7IiRyZWYiOiI2NyJ9LCJNYXhXaWR0aCI6MjAwLjAsIk1heEhlaWdodCI6IkluZmluaXR5IiwiU21hcnRGb3JlZ3JvdW5kSXNBY3RpdmUiOmZhbHNlLCJIb3Jpem9udGFsQWxpZ25tZW50IjowLCJWZXJ0aWNhbEFsaWdubWVudCI6MCwiU21hcnRGb3JlZ3JvdW5kIjpudWxsLCJNYXJnaW4iOnsiJHJlZiI6IjY5In0sIlBhZGRpbmciOnsiJHJlZiI6IjcwIn0sIkJhY2tncm91bmQiOnsiJHJlZiI6IjcxIn0sIklzVmlzaWJsZSI6dHJ1ZSwiV2lkdGgiOjAuMCwiSGVpZ2h0IjowLjAsIkJvcmRlclN0eWxlIjp7IiRpZCI6IjEzNCIsIkxpbmVDb2xvciI6bnVsbCwiTGluZVdlaWdodCI6MC4wLCJMaW5lVHlwZSI6MCwiUGFyZW50U3R5bGUiOm51bGx9LCJQYXJlbnRTdHlsZSI6eyIkcmVmIjoiNjUifX0sIkRhdGVTdHlsZSI6eyIkaWQiOiIxMzUiLCJGb250U2V0dGluZ3MiOnsiJGlkIjoiMTM2IiwiRm9udFNpemUiOjEwLCJGb250TmFtZSI6IkNhbGlicmkiLCJJc0JvbGQiOmZhbHNlLCJJc0l0YWxpYyI6ZmFsc2UsIklzVW5kZXJsaW5lZCI6ZmFsc2UsIlBhcmVudFN0eWxlIjp7IiRyZWYiOiI3MyJ9fSwiQXV0b1NpemUiOjAsIkZvcmVncm91bmQiOnsiJHJlZiI6Ijc0In0sIk1heFdpZHRoIjoyMDAuMCwiTWF4SGVpZ2h0IjoiSW5maW5pdHkiLCJTbWFydEZvcmVncm91bmRJc0FjdGl2ZSI6ZmFsc2UsIkhvcml6b250YWxBbGlnbm1lbnQiOjAsIlZlcnRpY2FsQWxpZ25tZW50IjowLCJTbWFydEZvcmVncm91bmQiOm51bGwsIk1hcmdpbiI6eyIkcmVmIjoiNzYifSwiUGFkZGluZyI6eyIkcmVmIjoiNzcifSwiQmFja2dyb3VuZCI6eyIkcmVmIjoiNzgifSwiSXNWaXNpYmxlIjp0cnVlLCJXaWR0aCI6MC4wLCJIZWlnaHQiOjAuMCwiQm9yZGVyU3R5bGUiOnsiJGlkIjoiMTM3IiwiTGluZUNvbG9yIjpudWxsLCJMaW5lV2VpZ2h0IjowLjAsIkxpbmVUeXBlIjowLCJQYXJlbnRTdHlsZSI6bnVsbH0sIlBhcmVudFN0eWxlIjp7IiRyZWYiOiI3MiJ9fSwiRGF0ZUZvcm1hdCI6eyIkcmVmIjoiNzkifSwiSXNWaXNpYmxlIjp0cnVlLCJQYXJlbnRTdHlsZSI6eyIkcmVmIjoiNTMifX0sIlBvc2l0aW9uIjp7IlJhdGlvIjowLjAsIklzQ3VzdG9tIjpmYWxzZX0sIklkIjoiYTE5YzViZjUtMWM5ZS00NTQ5LWEzZWYtYTRjZmYzYWZiY2FlIiwiSW1wb3J0SWQiOm51bGwsIlRpdGxlIjoiUHLDqXNlbnRhdGlvbiBvcmFsZSIsIk5vdGUiOm51bGwsIkh5cGVybGluayI6bnVsbCwiSXNDaGFuZ2VkIjpmYWxzZSwiSXNOZXciOmZhbHNlfV0sIlRhc2tzIjpbeyIkaWQiOiIxMzgiLCJHcm91cE5hbWUiOm51bGwsIlN0YXJ0RGF0ZSI6IjIwMTctMDEtMjBUMDA6MDA6MDBaIiwiRW5kRGF0ZSI6IjIwMTctMDEtMzBUMjM6NTk6NTkuOTk5WiIsIlBlcmNlbnRhZ2VDb21wbGV0ZSI6bnVsbCwiU3R5bGUiOnsiJGlkIjoiMTM5IiwiU2hhcGUiOjAsIlNoYXBlVGhpY2tuZXNzIjoxLCJEdXJhdGlvbkZvcm1hdCI6MCwiSW5jbHVkZU5vbldvcmtpbmdEYXlzSW5EdXJhdGlvbiI6dHJ1ZSwiUGVyY2VudGFnZUNvbXBsZXRlU3R5bGUiOnsiJGlkIjoiMTQwIiwiRm9udFNldHRpbmdzIjp7IiRpZCI6IjE0MSIsIkZvbnRTaXplIjoxMCwiRm9udE5hbWUiOiJDYWxpYnJpIiwiSXNCb2xkIjpmYWxzZSwiSXNJdGFsaWMiOmZhbHNlLCJJc1VuZGVybGluZWQiOmZhbHNlLCJQYXJlbnRTdHlsZSI6eyIkcmVmIjoiODIifX0sIkF1dG9TaXplIjowLCJGb3JlZ3JvdW5kIjp7IiRyZWYiOiI4MyJ9LCJNYXhXaWR0aCI6MjAwLjAsIk1heEhlaWdodCI6IkluZmluaXR5IiwiU21hcnRGb3JlZ3JvdW5kSXNBY3RpdmUiOmZhbHNlLCJIb3Jpem9udGFsQWxpZ25tZW50IjowLCJWZXJ0aWNhbEFsaWdubWVudCI6MCwiU21hcnRGb3JlZ3JvdW5kIjpudWxsLCJNYXJnaW4iOnsiJHJlZiI6Ijg1In0sIlBhZGRpbmciOnsiJHJlZiI6Ijg2In0sIkJhY2tncm91bmQiOnsiJHJlZiI6Ijg3In0sIklzVmlzaWJsZSI6dHJ1ZSwiV2lkdGgiOjAuMCwiSGVpZ2h0IjowLjAsIkJvcmRlclN0eWxlIjp7IiRpZCI6IjE0MiIsIkxpbmVDb2xvciI6bnVsbCwiTGluZVdlaWdodCI6MC4wLCJMaW5lVHlwZSI6MCwiUGFyZW50U3R5bGUiOm51bGx9LCJQYXJlbnRTdHlsZSI6eyIkcmVmIjoiODEifX0sIkR1cmF0aW9uU3R5bGUiOnsiJGlkIjoiMTQzIiwiRm9udFNldHRpbmdzIjp7IiRpZCI6IjE0NCIsIkZvbnRTaXplIjoxMCwiRm9udE5hbWUiOiJDYWxpYnJpIiwiSXNCb2xkIjpmYWxzZSwiSXNJdGFsaWMiOmZhbHNlLCJJc1VuZGVybGluZWQiOmZhbHNlLCJQYXJlbnRTdHlsZSI6eyIkcmVmIjoiODkifX0sIkF1dG9TaXplIjowLCJGb3JlZ3JvdW5kIjp7IiRyZWYiOiI5MCJ9LCJNYXhXaWR0aCI6MjAwLjAsIk1heEhlaWdodCI6IkluZmluaXR5IiwiU21hcnRGb3JlZ3JvdW5kSXNBY3RpdmUiOmZhbHNlLCJIb3Jpem9udGFsQWxpZ25tZW50IjowLCJWZXJ0aWNhbEFsaWdubWVudCI6MCwiU21hcnRGb3JlZ3JvdW5kIjpudWxsLCJNYXJnaW4iOnsiJHJlZiI6IjkyIn0sIlBhZGRpbmciOnsiJHJlZiI6IjkzIn0sIkJhY2tncm91bmQiOnsiJHJlZiI6Ijk0In0sIklzVmlzaWJsZSI6dHJ1ZSwiV2lkdGgiOjAuMCwiSGVpZ2h0IjowLjAsIkJvcmRlclN0eWxlIjp7IiRpZCI6IjE0NSIsIkxpbmVDb2xvciI6bnVsbCwiTGluZVdlaWdodCI6MC4wLCJMaW5lVHlwZSI6MCwiUGFyZW50U3R5bGUiOm51bGx9LCJQYXJlbnRTdHlsZSI6eyIkcmVmIjoiODgifX0sIkhvcml6b250YWxDb25uZWN0b3JTdHlsZSI6eyIkaWQiOiIxNDYiLCJMaW5lQ29sb3IiOnsiJHJlZiI6Ijk2In0sIkxpbmVXZWlnaHQiOjEuMCwiTGluZVR5cGUiOjAsIlBhcmVudFN0eWxlIjp7IiRyZWYiOiI5NSJ9fSwiVmVydGljYWxDb25uZWN0b3JTdHlsZSI6eyIkaWQiOiIxNDciLCJMaW5lQ29sb3IiOnsiJHJlZiI6Ijk5In0sIkxpbmVXZWlnaHQiOjAuMCwiTGluZVR5cGUiOjAsIlBhcmVudFN0eWxlIjp7IiRyZWYiOiI5OCJ9fSwiTWFyZ2luIjpudWxsLCJTdGFydERhdGVQb3NpdGlvbiI6NCwiRW5kRGF0ZVBvc2l0aW9uIjo0LCJUaXRsZVBvc2l0aW9uIjo1LCJEdXJhdGlvblBvc2l0aW9uIjo2LCJQZXJjZW50YWdlQ29tcGxldGVkUG9zaXRpb24iOjYsIlNwYWNpbmciOjUsIklzQmVsb3dUaW1lYmFuZCI6dHJ1ZSwiUGVyY2VudGFnZUNvbXBsZXRlU2hhcGVPcGFjaXR5IjozNSwiU2hhcGVTdHlsZSI6eyIkaWQiOiIxNDgiLCJNYXJnaW4iOnsiJHJlZiI6IjEwMiJ9LCJQYWRkaW5nIjp7IiRyZWYiOiIxMDMifSwiQmFja2dyb3VuZCI6eyIkaWQiOiIxNDkiLCJDb2xvciI6eyIkaWQiOiIxNTAiLCJBIjoyNTUsIlIiOjAsIkciOjExNCwiQiI6MTg4fX0sIklzVmlzaWJsZSI6dHJ1ZSwiV2lkdGgiOjAuMCwiSGVpZ2h0IjoxNi4wLCJCb3JkZXJTdHlsZSI6eyIkaWQiOiIxNTEiLCJMaW5lQ29sb3IiOnsiJHJlZiI6IjEwNSJ9LCJMaW5lV2VpZ2h0IjowLjAsIkxpbmVUeXBlIjowLCJQYXJlbnRTdHlsZSI6eyIkcmVmIjoiMTA0In19LCJQYXJlbnRTdHlsZSI6eyIkcmVmIjoiMTAxIn19LCJUaXRsZVN0eWxlIjp7IiRpZCI6IjE1MiIsIkZvbnRTZXR0aW5ncyI6eyIkaWQiOiIxNTMiLCJGb250U2l6ZSI6MTEsIkZvbnROYW1lIjoiQ2FsaWJyaSIsIklzQm9sZCI6dHJ1ZSwiSXNJdGFsaWMiOmZhbHNlLCJJc1VuZGVybGluZWQiOmZhbHNlLCJQYXJlbnRTdHlsZSI6eyIkcmVmIjoiMTA4In19LCJBdXRvU2l6ZSI6MCwiRm9yZWdyb3VuZCI6eyIkcmVmIjoiMTA5In0sIk1heFdpZHRoIjo3MjAuMCwiTWF4SGVpZ2h0IjoiSW5maW5pdHkiLCJTbWFydEZvcmVncm91bmRJc0FjdGl2ZSI6ZmFsc2UsIkhvcml6b250YWxBbGlnbm1lbnQiOjAsIlZlcnRpY2FsQWxpZ25tZW50IjowLCJTbWFydEZvcmVncm91bmQiOm51bGwsIk1hcmdpbiI6eyIkcmVmIjoiMTExIn0sIlBhZGRpbmciOnsiJHJlZiI6IjExMiJ9LCJCYWNrZ3JvdW5kIjp7IiRyZWYiOiIxMTMifSwiSXNWaXNpYmxlIjp0cnVlLCJXaWR0aCI6MC4wLCJIZWlnaHQiOjAuMCwiQm9yZGVyU3R5bGUiOnsiJGlkIjoiMTU0IiwiTGluZUNvbG9yIjpudWxsLCJMaW5lV2VpZ2h0IjowLjAsIkxpbmVUeXBlIjowLCJQYXJlbnRTdHlsZSI6bnVsbH0sIlBhcmVudFN0eWxlIjp7IiRyZWYiOiIxMDcifX0sIkRhdGVTdHlsZSI6eyIkaWQiOiIxNTUiLCJGb250U2V0dGluZ3MiOnsiJGlkIjoiMTU2IiwiRm9udFNpemUiOjEwLCJGb250TmFtZSI6IkNhbGlicmkiLCJJc0JvbGQiOmZhbHNlLCJJc0l0YWxpYyI6ZmFsc2UsIklzVW5kZXJsaW5lZCI6ZmFsc2UsIlBhcmVudFN0eWxlIjp7IiRyZWYiOiIxMTUifX0sIkF1dG9TaXplIjowLCJGb3JlZ3JvdW5kIjp7IiRyZWYiOiIxMTYifSwiTWF4V2lkdGgiOjIwMC4wLCJNYXhIZWlnaHQiOiJJbmZpbml0eSIsIlNtYXJ0Rm9yZWdyb3VuZElzQWN0aXZlIjpmYWxzZSwiSG9yaXpvbnRhbEFsaWdubWVudCI6MCwiVmVydGljYWxBbGlnbm1lbnQiOjAsIlNtYXJ0Rm9yZWdyb3VuZCI6bnVsbCwiTWFyZ2luIjp7IiRyZWYiOiIxMTgifSwiUGFkZGluZyI6eyIkcmVmIjoiMTE5In0sIkJhY2tncm91bmQiOnsiJHJlZiI6IjEyMCJ9LCJJc1Zpc2libGUiOnRydWUsIldpZHRoIjowLjAsIkhlaWdodCI6MC4wLCJCb3JkZXJTdHlsZSI6eyIkaWQiOiIxNTciLCJMaW5lQ29sb3IiOm51bGwsIkxpbmVXZWlnaHQiOjAuMCwiTGluZVR5cGUiOjAsIlBhcmVudFN0eWxlIjpudWxsfSwiUGFyZW50U3R5bGUiOnsiJHJlZiI6IjExNCJ9fSwiRGF0ZUZvcm1hdCI6eyIkcmVmIjoiMTIxIn0sIklzVmlzaWJsZSI6dHJ1ZSwiUGFyZW50U3R5bGUiOnsiJHJlZiI6IjgwIn19LCJJbmRleCI6MSwiSWQiOiJkYjU5N2NjOS0xMmYyLTRiNmUtYWJiZi1lYTgzOGY4ODA3YjciLCJJbXBvcnRJZCI6bnVsbCwiVGl0bGUiOiJDcsOpYXRpb24gZHUgaVB5dGhvbiBOb3RlYm9vayBldCAxw6hyZSBhbmFseXNlIGRlcyBkb25uw6llcyIsIk5vdGUiOm51bGwsIkh5cGVybGluayI6bnVsbCwiSXNDaGFuZ2VkIjpmYWxzZSwiSXNOZXciOmZhbHNlfSx7IiRpZCI6IjE1OCIsIkdyb3VwTmFtZSI6bnVsbCwiU3RhcnREYXRlIjoiMjAxNy0wMS0zMVQwMDowMDowMFoiLCJFbmREYXRlIjoiMjAxNy0wMi0xMFQyMzo1OTo1OS45OTlaIiwiUGVyY2VudGFnZUNvbXBsZXRlIjpudWxsLCJTdHlsZSI6eyIkaWQiOiIxNTkiLCJTaGFwZSI6MCwiU2hhcGVUaGlja25lc3MiOjEsIkR1cmF0aW9uRm9ybWF0IjowLCJJbmNsdWRlTm9uV29ya2luZ0RheXNJbkR1cmF0aW9uIjp0cnVlLCJQZXJjZW50YWdlQ29tcGxldGVTdHlsZSI6eyIkaWQiOiIxNjAiLCJGb250U2V0dGluZ3MiOnsiJGlkIjoiMTYxIiwiRm9udFNpemUiOjEwLCJGb250TmFtZSI6IkNhbGlicmkiLCJJc0JvbGQiOmZhbHNlLCJJc0l0YWxpYyI6ZmFsc2UsIklzVW5kZXJsaW5lZCI6ZmFsc2UsIlBhcmVudFN0eWxlIjp7IiRyZWYiOiI4MiJ9fSwiQXV0b1NpemUiOjAsIkZvcmVncm91bmQiOnsiJHJlZiI6IjgzIn0sIk1heFdpZHRoIjoyMDAuMCwiTWF4SGVpZ2h0IjoiSW5maW5pdHkiLCJTbWFydEZvcmVncm91bmRJc0FjdGl2ZSI6ZmFsc2UsIkhvcml6b250YWxBbGlnbm1lbnQiOjAsIlZlcnRpY2FsQWxpZ25tZW50IjowLCJTbWFydEZvcmVncm91bmQiOm51bGwsIk1hcmdpbiI6eyIkcmVmIjoiODUifSwiUGFkZGluZyI6eyIkcmVmIjoiODYifSwiQmFja2dyb3VuZCI6eyIkcmVmIjoiODcifSwiSXNWaXNpYmxlIjp0cnVlLCJXaWR0aCI6MC4wLCJIZWlnaHQiOjAuMCwiQm9yZGVyU3R5bGUiOnsiJGlkIjoiMTYyIiwiTGluZUNvbG9yIjpudWxsLCJMaW5lV2VpZ2h0IjowLjAsIkxpbmVUeXBlIjowLCJQYXJlbnRTdHlsZSI6bnVsbH0sIlBhcmVudFN0eWxlIjp7IiRyZWYiOiI4MSJ9fSwiRHVyYXRpb25TdHlsZSI6eyIkaWQiOiIxNjMiLCJGb250U2V0dGluZ3MiOnsiJGlkIjoiMTY0IiwiRm9udFNpemUiOjEwLCJGb250TmFtZSI6IkNhbGlicmkiLCJJc0JvbGQiOmZhbHNlLCJJc0l0YWxpYyI6ZmFsc2UsIklzVW5kZXJsaW5lZCI6ZmFsc2UsIlBhcmVudFN0eWxlIjp7IiRyZWYiOiI4OSJ9fSwiQXV0b1NpemUiOjAsIkZvcmVncm91bmQiOnsiJHJlZiI6IjkwIn0sIk1heFdpZHRoIjoyMDAuMCwiTWF4SGVpZ2h0IjoiSW5maW5pdHkiLCJTbWFydEZvcmVncm91bmRJc0FjdGl2ZSI6ZmFsc2UsIkhvcml6b250YWxBbGlnbm1lbnQiOjAsIlZlcnRpY2FsQWxpZ25tZW50IjowLCJTbWFydEZvcmVncm91bmQiOm51bGwsIk1hcmdpbiI6eyIkcmVmIjoiOTIifSwiUGFkZGluZyI6eyIkcmVmIjoiOTMifSwiQmFja2dyb3VuZCI6eyIkcmVmIjoiOTQifSwiSXNWaXNpYmxlIjp0cnVlLCJXaWR0aCI6MC4wLCJIZWlnaHQiOjAuMCwiQm9yZGVyU3R5bGUiOnsiJGlkIjoiMTY1IiwiTGluZUNvbG9yIjpudWxsLCJMaW5lV2VpZ2h0IjowLjAsIkxpbmVUeXBlIjowLCJQYXJlbnRTdHlsZSI6bnVsbH0sIlBhcmVudFN0eWxlIjp7IiRyZWYiOiI4OCJ9fSwiSG9yaXpvbnRhbENvbm5lY3RvclN0eWxlIjp7IiRpZCI6IjE2NiIsIkxpbmVDb2xvciI6eyIkcmVmIjoiOTYifSwiTGluZVdlaWdodCI6MS4wLCJMaW5lVHlwZSI6MCwiUGFyZW50U3R5bGUiOnsiJHJlZiI6Ijk1In19LCJWZXJ0aWNhbENvbm5lY3RvclN0eWxlIjp7IiRpZCI6IjE2NyIsIkxpbmVDb2xvciI6eyIkcmVmIjoiOTkifSwiTGluZVdlaWdodCI6MC4wLCJMaW5lVHlwZSI6MCwiUGFyZW50U3R5bGUiOnsiJHJlZiI6Ijk4In19LCJNYXJnaW4iOm51bGwsIlN0YXJ0RGF0ZVBvc2l0aW9uIjo0LCJFbmREYXRlUG9zaXRpb24iOjQsIlRpdGxlUG9zaXRpb24iOjUsIkR1cmF0aW9uUG9zaXRpb24iOjYsIlBlcmNlbnRhZ2VDb21wbGV0ZWRQb3NpdGlvbiI6NiwiU3BhY2luZyI6NSwiSXNCZWxvd1RpbWViYW5kIjp0cnVlLCJQZXJjZW50YWdlQ29tcGxldGVTaGFwZU9wYWNpdHkiOjM1LCJTaGFwZVN0eWxlIjp7IiRpZCI6IjE2OCIsIk1hcmdpbiI6eyIkcmVmIjoiMTAyIn0sIlBhZGRpbmciOnsiJHJlZiI6IjEwMyJ9LCJCYWNrZ3JvdW5kIjp7IiRpZCI6IjE2OSIsIkNvbG9yIjp7IiRpZCI6IjE3MCIsIkEiOjI1NSwiUiI6OTEsIkciOjE1NSwiQiI6MjEzfX0sIklzVmlzaWJsZSI6dHJ1ZSwiV2lkdGgiOjAuMCwiSGVpZ2h0IjoxNi4wLCJCb3JkZXJTdHlsZSI6eyIkaWQiOiIxNzEiLCJMaW5lQ29sb3IiOnsiJHJlZiI6IjEwNSJ9LCJMaW5lV2VpZ2h0IjowLjAsIkxpbmVUeXBlIjowLCJQYXJlbnRTdHlsZSI6eyIkcmVmIjoiMTA0In19LCJQYXJlbnRTdHlsZSI6eyIkcmVmIjoiMTAxIn19LCJUaXRsZVN0eWxlIjp7IiRpZCI6IjE3MiIsIkZvbnRTZXR0aW5ncyI6eyIkaWQiOiIxNzMiLCJGb250U2l6ZSI6MTEsIkZvbnROYW1lIjoiQ2FsaWJyaSIsIklzQm9sZCI6dHJ1ZSwiSXNJdGFsaWMiOmZhbHNlLCJJc1VuZGVybGluZWQiOmZhbHNlLCJQYXJlbnRTdHlsZSI6eyIkcmVmIjoiMTA4In19LCJBdXRvU2l6ZSI6MCwiRm9yZWdyb3VuZCI6eyIkcmVmIjoiMTA5In0sIk1heFdpZHRoIjo3MjAuMCwiTWF4SGVpZ2h0IjoiSW5maW5pdHkiLCJTbWFydEZvcmVncm91bmRJc0FjdGl2ZSI6ZmFsc2UsIkhvcml6b250YWxBbGlnbm1lbnQiOjAsIlZlcnRpY2FsQWxpZ25tZW50IjowLCJTbWFydEZvcmVncm91bmQiOm51bGwsIk1hcmdpbiI6eyIkcmVmIjoiMTExIn0sIlBhZGRpbmciOnsiJHJlZiI6IjExMiJ9LCJCYWNrZ3JvdW5kIjp7IiRyZWYiOiIxMTMifSwiSXNWaXNpYmxlIjp0cnVlLCJXaWR0aCI6MC4wLCJIZWlnaHQiOjAuMCwiQm9yZGVyU3R5bGUiOnsiJGlkIjoiMTc0IiwiTGluZUNvbG9yIjpudWxsLCJMaW5lV2VpZ2h0IjowLjAsIkxpbmVUeXBlIjowLCJQYXJlbnRTdHlsZSI6bnVsbH0sIlBhcmVudFN0eWxlIjp7IiRyZWYiOiIxMDcifX0sIkRhdGVTdHlsZSI6eyIkaWQiOiIxNzUiLCJGb250U2V0dGluZ3MiOnsiJGlkIjoiMTc2IiwiRm9udFNpemUiOjEwLCJGb250TmFtZSI6IkNhbGlicmkiLCJJc0JvbGQiOmZhbHNlLCJJc0l0YWxpYyI6ZmFsc2UsIklzVW5kZXJsaW5lZCI6ZmFsc2UsIlBhcmVudFN0eWxlIjp7IiRyZWYiOiIxMTUifX0sIkF1dG9TaXplIjowLCJGb3JlZ3JvdW5kIjp7IiRyZWYiOiIxMTYifSwiTWF4V2lkdGgiOjIwMC4wLCJNYXhIZWlnaHQiOiJJbmZpbml0eSIsIlNtYXJ0Rm9yZWdyb3VuZElzQWN0aXZlIjpmYWxzZSwiSG9yaXpvbnRhbEFsaWdubWVudCI6MCwiVmVydGljYWxBbGlnbm1lbnQiOjAsIlNtYXJ0Rm9yZWdyb3VuZCI6bnVsbCwiTWFyZ2luIjp7IiRyZWYiOiIxMTgifSwiUGFkZGluZyI6eyIkcmVmIjoiMTE5In0sIkJhY2tncm91bmQiOnsiJHJlZiI6IjEyMCJ9LCJJc1Zpc2libGUiOnRydWUsIldpZHRoIjowLjAsIkhlaWdodCI6MC4wLCJCb3JkZXJTdHlsZSI6eyIkaWQiOiIxNzciLCJMaW5lQ29sb3IiOm51bGwsIkxpbmVXZWlnaHQiOjAuMCwiTGluZVR5cGUiOjAsIlBhcmVudFN0eWxlIjpudWxsfSwiUGFyZW50U3R5bGUiOnsiJHJlZiI6IjExNCJ9fSwiRGF0ZUZvcm1hdCI6eyIkcmVmIjoiMTIxIn0sIklzVmlzaWJsZSI6dHJ1ZSwiUGFyZW50U3R5bGUiOnsiJHJlZiI6IjgwIn19LCJJbmRleCI6MiwiSWQiOiI5NTE2NWNlOS02ZDcyLTRjMzktYTE4Yi00MzAzNTY5YTQ4MTEiLCJJbXBvcnRJZCI6bnVsbCwiVGl0bGUiOiJGaW5hbGlzYXRpb24gZGUgbGEgMcOocmUgcGFydGllIGF2ZWMgY2FsY3VsIGRlIGxhIHLDqWdyZXNzaW9uIGxpbsOpYWlyZSIsIk5vdGUiOm51bGwsIkh5cGVybGluayI6bnVsbCwiSXNDaGFuZ2VkIjpmYWxzZSwiSXNOZXciOmZhbHNlfSx7IiRpZCI6IjE3OCIsIkdyb3VwTmFtZSI6bnVsbCwiU3RhcnREYXRlIjoiMjAxNy0wMi0xMVQwMDowMDowMFoiLCJFbmREYXRlIjoiMjAxNy0wMi0yMFQyMzo1OTo1OS45OTlaIiwiUGVyY2VudGFnZUNvbXBsZXRlIjpudWxsLCJTdHlsZSI6eyIkaWQiOiIxNzkiLCJTaGFwZSI6MCwiU2hhcGVUaGlja25lc3MiOjEsIkR1cmF0aW9uRm9ybWF0IjowLCJJbmNsdWRlTm9uV29ya2luZ0RheXNJbkR1cmF0aW9uIjp0cnVlLCJQZXJjZW50YWdlQ29tcGxldGVTdHlsZSI6eyIkaWQiOiIxODAiLCJGb250U2V0dGluZ3MiOnsiJGlkIjoiMTgxIiwiRm9udFNpemUiOjEwLCJGb250TmFtZSI6IkNhbGlicmkiLCJJc0JvbGQiOmZhbHNlLCJJc0l0YWxpYyI6ZmFsc2UsIklzVW5kZXJsaW5lZCI6ZmFsc2UsIlBhcmVudFN0eWxlIjp7IiRyZWYiOiI4MiJ9fSwiQXV0b1NpemUiOjAsIkZvcmVncm91bmQiOnsiJHJlZiI6IjgzIn0sIk1heFdpZHRoIjoyMDAuMCwiTWF4SGVpZ2h0IjoiSW5maW5pdHkiLCJTbWFydEZvcmVncm91bmRJc0FjdGl2ZSI6ZmFsc2UsIkhvcml6b250YWxBbGlnbm1lbnQiOjAsIlZlcnRpY2FsQWxpZ25tZW50IjowLCJTbWFydEZvcmVncm91bmQiOm51bGwsIk1hcmdpbiI6eyIkcmVmIjoiODUifSwiUGFkZGluZyI6eyIkcmVmIjoiODYifSwiQmFja2dyb3VuZCI6eyIkcmVmIjoiODcifSwiSXNWaXNpYmxlIjp0cnVlLCJXaWR0aCI6MC4wLCJIZWlnaHQiOjAuMCwiQm9yZGVyU3R5bGUiOnsiJGlkIjoiMTgyIiwiTGluZUNvbG9yIjpudWxsLCJMaW5lV2VpZ2h0IjowLjAsIkxpbmVUeXBlIjowLCJQYXJlbnRTdHlsZSI6bnVsbH0sIlBhcmVudFN0eWxlIjp7IiRyZWYiOiI4MSJ9fSwiRHVyYXRpb25TdHlsZSI6eyIkaWQiOiIxODMiLCJGb250U2V0dGluZ3MiOnsiJGlkIjoiMTg0IiwiRm9udFNpemUiOjEwLCJGb250TmFtZSI6IkNhbGlicmkiLCJJc0JvbGQiOmZhbHNlLCJJc0l0YWxpYyI6ZmFsc2UsIklzVW5kZXJsaW5lZCI6ZmFsc2UsIlBhcmVudFN0eWxlIjp7IiRyZWYiOiI4OSJ9fSwiQXV0b1NpemUiOjAsIkZvcmVncm91bmQiOnsiJHJlZiI6IjkwIn0sIk1heFdpZHRoIjoyMDAuMCwiTWF4SGVpZ2h0IjoiSW5maW5pdHkiLCJTbWFydEZvcmVncm91bmRJc0FjdGl2ZSI6ZmFsc2UsIkhvcml6b250YWxBbGlnbm1lbnQiOjAsIlZlcnRpY2FsQWxpZ25tZW50IjowLCJTbWFydEZvcmVncm91bmQiOm51bGwsIk1hcmdpbiI6eyIkcmVmIjoiOTIifSwiUGFkZGluZyI6eyIkcmVmIjoiOTMifSwiQmFja2dyb3VuZCI6eyIkcmVmIjoiOTQifSwiSXNWaXNpYmxlIjp0cnVlLCJXaWR0aCI6MC4wLCJIZWlnaHQiOjAuMCwiQm9yZGVyU3R5bGUiOnsiJGlkIjoiMTg1IiwiTGluZUNvbG9yIjpudWxsLCJMaW5lV2VpZ2h0IjowLjAsIkxpbmVUeXBlIjowLCJQYXJlbnRTdHlsZSI6bnVsbH0sIlBhcmVudFN0eWxlIjp7IiRyZWYiOiI4OCJ9fSwiSG9yaXpvbnRhbENvbm5lY3RvclN0eWxlIjp7IiRpZCI6IjE4NiIsIkxpbmVDb2xvciI6eyIkcmVmIjoiOTYifSwiTGluZVdlaWdodCI6MS4wLCJMaW5lVHlwZSI6MCwiUGFyZW50U3R5bGUiOnsiJHJlZiI6Ijk1In19LCJWZXJ0aWNhbENvbm5lY3RvclN0eWxlIjp7IiRpZCI6IjE4NyIsIkxpbmVDb2xvciI6eyIkcmVmIjoiOTkifSwiTGluZVdlaWdodCI6MC4wLCJMaW5lVHlwZSI6MCwiUGFyZW50U3R5bGUiOnsiJHJlZiI6Ijk4In19LCJNYXJnaW4iOm51bGwsIlN0YXJ0RGF0ZVBvc2l0aW9uIjo0LCJFbmREYXRlUG9zaXRpb24iOjQsIlRpdGxlUG9zaXRpb24iOjUsIkR1cmF0aW9uUG9zaXRpb24iOjYsIlBlcmNlbnRhZ2VDb21wbGV0ZWRQb3NpdGlvbiI6NiwiU3BhY2luZyI6NSwiSXNCZWxvd1RpbWViYW5kIjp0cnVlLCJQZXJjZW50YWdlQ29tcGxldGVTaGFwZU9wYWNpdHkiOjM1LCJTaGFwZVN0eWxlIjp7IiRpZCI6IjE4OCIsIk1hcmdpbiI6eyIkcmVmIjoiMTAyIn0sIlBhZGRpbmciOnsiJHJlZiI6IjEwMyJ9LCJCYWNrZ3JvdW5kIjp7IiRpZCI6IjE4OSIsIkNvbG9yIjp7IiRpZCI6IjE5MCIsIkEiOjI1NSwiUiI6MjM3LCJHIjoxMjUsIkIiOjQ5fX0sIklzVmlzaWJsZSI6dHJ1ZSwiV2lkdGgiOjAuMCwiSGVpZ2h0IjoxNi4wLCJCb3JkZXJTdHlsZSI6eyIkaWQiOiIxOTEiLCJMaW5lQ29sb3IiOnsiJHJlZiI6IjEwNSJ9LCJMaW5lV2VpZ2h0IjowLjAsIkxpbmVUeXBlIjowLCJQYXJlbnRTdHlsZSI6eyIkcmVmIjoiMTA0In19LCJQYXJlbnRTdHlsZSI6eyIkcmVmIjoiMTAxIn19LCJUaXRsZVN0eWxlIjp7IiRpZCI6IjE5MiIsIkZvbnRTZXR0aW5ncyI6eyIkaWQiOiIxOTMiLCJGb250U2l6ZSI6MTEsIkZvbnROYW1lIjoiQ2FsaWJyaSIsIklzQm9sZCI6dHJ1ZSwiSXNJdGFsaWMiOmZhbHNlLCJJc1VuZGVybGluZWQiOmZhbHNlLCJQYXJlbnRTdHlsZSI6eyIkcmVmIjoiMTA4In19LCJBdXRvU2l6ZSI6MCwiRm9yZWdyb3VuZCI6eyIkcmVmIjoiMTA5In0sIk1heFdpZHRoIjo3MjAuMCwiTWF4SGVpZ2h0IjoiSW5maW5pdHkiLCJTbWFydEZvcmVncm91bmRJc0FjdGl2ZSI6ZmFsc2UsIkhvcml6b250YWxBbGlnbm1lbnQiOjAsIlZlcnRpY2FsQWxpZ25tZW50IjowLCJTbWFydEZvcmVncm91bmQiOm51bGwsIk1hcmdpbiI6eyIkcmVmIjoiMTExIn0sIlBhZGRpbmciOnsiJHJlZiI6IjExMiJ9LCJCYWNrZ3JvdW5kIjp7IiRyZWYiOiIxMTMifSwiSXNWaXNpYmxlIjp0cnVlLCJXaWR0aCI6MC4wLCJIZWlnaHQiOjAuMCwiQm9yZGVyU3R5bGUiOnsiJGlkIjoiMTk0IiwiTGluZUNvbG9yIjpudWxsLCJMaW5lV2VpZ2h0IjowLjAsIkxpbmVUeXBlIjowLCJQYXJlbnRTdHlsZSI6bnVsbH0sIlBhcmVudFN0eWxlIjp7IiRyZWYiOiIxMDcifX0sIkRhdGVTdHlsZSI6eyIkaWQiOiIxOTUiLCJGb250U2V0dGluZ3MiOnsiJGlkIjoiMTk2IiwiRm9udFNpemUiOjEwLCJGb250TmFtZSI6IkNhbGlicmkiLCJJc0JvbGQiOmZhbHNlLCJJc0l0YWxpYyI6ZmFsc2UsIklzVW5kZXJsaW5lZCI6ZmFsc2UsIlBhcmVudFN0eWxlIjp7IiRyZWYiOiIxMTUifX0sIkF1dG9TaXplIjowLCJGb3JlZ3JvdW5kIjp7IiRyZWYiOiIxMTYifSwiTWF4V2lkdGgiOjIwMC4wLCJNYXhIZWlnaHQiOiJJbmZpbml0eSIsIlNtYXJ0Rm9yZWdyb3VuZElzQWN0aXZlIjpmYWxzZSwiSG9yaXpvbnRhbEFsaWdubWVudCI6MCwiVmVydGljYWxBbGlnbm1lbnQiOjAsIlNtYXJ0Rm9yZWdyb3VuZCI6bnVsbCwiTWFyZ2luIjp7IiRyZWYiOiIxMTgifSwiUGFkZGluZyI6eyIkcmVmIjoiMTE5In0sIkJhY2tncm91bmQiOnsiJHJlZiI6IjEyMCJ9LCJJc1Zpc2libGUiOnRydWUsIldpZHRoIjowLjAsIkhlaWdodCI6MC4wLCJCb3JkZXJTdHlsZSI6eyIkaWQiOiIxOTciLCJMaW5lQ29sb3IiOm51bGwsIkxpbmVXZWlnaHQiOjAuMCwiTGluZVR5cGUiOjAsIlBhcmVudFN0eWxlIjpudWxsfSwiUGFyZW50U3R5bGUiOnsiJHJlZiI6IjExNCJ9fSwiRGF0ZUZvcm1hdCI6eyIkcmVmIjoiMTIxIn0sIklzVmlzaWJsZSI6dHJ1ZSwiUGFyZW50U3R5bGUiOnsiJHJlZiI6IjgwIn19LCJJbmRleCI6MywiSWQiOiJmYmFjOWE0My1iNTVmLTQ2OTctODVjZC1lODA2MjIzYWNhYTciLCJJbXBvcnRJZCI6bnVsbCwiVGl0bGUiOiJBam91dCBkZXMgZG9ubsOpZXMgSW50ZXJ2ZW50aW9ucyBUcmF2YWlsbGV1cnMgc29jaWF1eCIsIk5vdGUiOm51bGwsIkh5cGVybGluayI6bnVsbCwiSXNDaGFuZ2VkIjpmYWxzZSwiSXNOZXciOmZhbHNlfSx7IiRpZCI6IjE5OCIsIkdyb3VwTmFtZSI6bnVsbCwiU3RhcnREYXRlIjoiMjAxNy0wMi0yMVQwMDowMDowMFoiLCJFbmREYXRlIjoiMjAxNy0wMy0wMVQyMzo1OTo1OS45OTlaIiwiUGVyY2VudGFnZUNvbXBsZXRlIjpudWxsLCJTdHlsZSI6eyIkaWQiOiIxOTkiLCJTaGFwZSI6MCwiU2hhcGVUaGlja25lc3MiOjEsIkR1cmF0aW9uRm9ybWF0IjowLCJJbmNsdWRlTm9uV29ya2luZ0RheXNJbkR1cmF0aW9uIjp0cnVlLCJQZXJjZW50YWdlQ29tcGxldGVTdHlsZSI6eyIkaWQiOiIyMDAiLCJGb250U2V0dGluZ3MiOnsiJGlkIjoiMjAxIiwiRm9udFNpemUiOjEwLCJGb250TmFtZSI6IkNhbGlicmkiLCJJc0JvbGQiOmZhbHNlLCJJc0l0YWxpYyI6ZmFsc2UsIklzVW5kZXJsaW5lZCI6ZmFsc2UsIlBhcmVudFN0eWxlIjp7IiRyZWYiOiI4MiJ9fSwiQXV0b1NpemUiOjAsIkZvcmVncm91bmQiOnsiJHJlZiI6IjgzIn0sIk1heFdpZHRoIjoyMDAuMCwiTWF4SGVpZ2h0IjoiSW5maW5pdHkiLCJTbWFydEZvcmVncm91bmRJc0FjdGl2ZSI6ZmFsc2UsIkhvcml6b250YWxBbGlnbm1lbnQiOjAsIlZlcnRpY2FsQWxpZ25tZW50IjowLCJTbWFydEZvcmVncm91bmQiOm51bGwsIk1hcmdpbiI6eyIkcmVmIjoiODUifSwiUGFkZGluZyI6eyIkcmVmIjoiODYifSwiQmFja2dyb3VuZCI6eyIkcmVmIjoiODcifSwiSXNWaXNpYmxlIjp0cnVlLCJXaWR0aCI6MC4wLCJIZWlnaHQiOjAuMCwiQm9yZGVyU3R5bGUiOnsiJGlkIjoiMjAyIiwiTGluZUNvbG9yIjpudWxsLCJMaW5lV2VpZ2h0IjowLjAsIkxpbmVUeXBlIjowLCJQYXJlbnRTdHlsZSI6bnVsbH0sIlBhcmVudFN0eWxlIjp7IiRyZWYiOiI4MSJ9fSwiRHVyYXRpb25TdHlsZSI6eyIkaWQiOiIyMDMiLCJGb250U2V0dGluZ3MiOnsiJGlkIjoiMjA0IiwiRm9udFNpemUiOjEwLCJGb250TmFtZSI6IkNhbGlicmkiLCJJc0JvbGQiOmZhbHNlLCJJc0l0YWxpYyI6ZmFsc2UsIklzVW5kZXJsaW5lZCI6ZmFsc2UsIlBhcmVudFN0eWxlIjp7IiRyZWYiOiI4OSJ9fSwiQXV0b1NpemUiOjAsIkZvcmVncm91bmQiOnsiJHJlZiI6IjkwIn0sIk1heFdpZHRoIjoyMDAuMCwiTWF4SGVpZ2h0IjoiSW5maW5pdHkiLCJTbWFydEZvcmVncm91bmRJc0FjdGl2ZSI6ZmFsc2UsIkhvcml6b250YWxBbGlnbm1lbnQiOjAsIlZlcnRpY2FsQWxpZ25tZW50IjowLCJTbWFydEZvcmVncm91bmQiOm51bGwsIk1hcmdpbiI6eyIkcmVmIjoiOTIifSwiUGFkZGluZyI6eyIkcmVmIjoiOTMifSwiQmFja2dyb3VuZCI6eyIkcmVmIjoiOTQifSwiSXNWaXNpYmxlIjp0cnVlLCJXaWR0aCI6MC4wLCJIZWlnaHQiOjAuMCwiQm9yZGVyU3R5bGUiOnsiJGlkIjoiMjA1IiwiTGluZUNvbG9yIjpudWxsLCJMaW5lV2VpZ2h0IjowLjAsIkxpbmVUeXBlIjowLCJQYXJlbnRTdHlsZSI6bnVsbH0sIlBhcmVudFN0eWxlIjp7IiRyZWYiOiI4OCJ9fSwiSG9yaXpvbnRhbENvbm5lY3RvclN0eWxlIjp7IiRpZCI6IjIwNiIsIkxpbmVDb2xvciI6eyIkcmVmIjoiOTYifSwiTGluZVdlaWdodCI6MS4wLCJMaW5lVHlwZSI6MCwiUGFyZW50U3R5bGUiOnsiJHJlZiI6Ijk1In19LCJWZXJ0aWNhbENvbm5lY3RvclN0eWxlIjp7IiRpZCI6IjIwNyIsIkxpbmVDb2xvciI6eyIkcmVmIjoiOTkifSwiTGluZVdlaWdodCI6MC4wLCJMaW5lVHlwZSI6MCwiUGFyZW50U3R5bGUiOnsiJHJlZiI6Ijk4In19LCJNYXJnaW4iOm51bGwsIlN0YXJ0RGF0ZVBvc2l0aW9uIjo0LCJFbmREYXRlUG9zaXRpb24iOjQsIlRpdGxlUG9zaXRpb24iOjUsIkR1cmF0aW9uUG9zaXRpb24iOjYsIlBlcmNlbnRhZ2VDb21wbGV0ZWRQb3NpdGlvbiI6NiwiU3BhY2luZyI6NSwiSXNCZWxvd1RpbWViYW5kIjp0cnVlLCJQZXJjZW50YWdlQ29tcGxldGVTaGFwZU9wYWNpdHkiOjM1LCJTaGFwZVN0eWxlIjp7IiRpZCI6IjIwOCIsIk1hcmdpbiI6eyIkcmVmIjoiMTAyIn0sIlBhZGRpbmciOnsiJHJlZiI6IjEwMyJ9LCJCYWNrZ3JvdW5kIjp7IiRpZCI6IjIwOSIsIkNvbG9yIjp7IiRpZCI6IjIxMCIsIkEiOjI1NSwiUiI6MTY1LCJHIjoxNjUsIkIiOjE2NX19LCJJc1Zpc2libGUiOnRydWUsIldpZHRoIjowLjAsIkhlaWdodCI6MTYuMCwiQm9yZGVyU3R5bGUiOnsiJGlkIjoiMjExIiwiTGluZUNvbG9yIjp7IiRyZWYiOiIxMDUifSwiTGluZVdlaWdodCI6MC4wLCJMaW5lVHlwZSI6MCwiUGFyZW50U3R5bGUiOnsiJHJlZiI6IjEwNCJ9fSwiUGFyZW50U3R5bGUiOnsiJHJlZiI6IjEwMSJ9fSwiVGl0bGVTdHlsZSI6eyIkaWQiOiIyMTIiLCJGb250U2V0dGluZ3MiOnsiJGlkIjoiMjEzIiwiRm9udFNpemUiOjExLCJGb250TmFtZSI6IkNhbGlicmkiLCJJc0JvbGQiOnRydWUsIklzSXRhbGljIjpmYWxzZSwiSXNVbmRlcmxpbmVkIjpmYWxzZSwiUGFyZW50U3R5bGUiOnsiJHJlZiI6IjEwOCJ9fSwiQXV0b1NpemUiOjAsIkZvcmVncm91bmQiOnsiJHJlZiI6IjEwOSJ9LCJNYXhXaWR0aCI6NzIwLjAsIk1heEhlaWdodCI6IkluZmluaXR5IiwiU21hcnRGb3JlZ3JvdW5kSXNBY3RpdmUiOmZhbHNlLCJIb3Jpem9udGFsQWxpZ25tZW50IjowLCJWZXJ0aWNhbEFsaWdubWVudCI6MCwiU21hcnRGb3JlZ3JvdW5kIjpudWxsLCJNYXJnaW4iOnsiJHJlZiI6IjExMSJ9LCJQYWRkaW5nIjp7IiRyZWYiOiIxMTIifSwiQmFja2dyb3VuZCI6eyIkcmVmIjoiMTEzIn0sIklzVmlzaWJsZSI6dHJ1ZSwiV2lkdGgiOjAuMCwiSGVpZ2h0IjowLjAsIkJvcmRlclN0eWxlIjp7IiRpZCI6IjIxNCIsIkxpbmVDb2xvciI6bnVsbCwiTGluZVdlaWdodCI6MC4wLCJMaW5lVHlwZSI6MCwiUGFyZW50U3R5bGUiOm51bGx9LCJQYXJlbnRTdHlsZSI6eyIkcmVmIjoiMTA3In19LCJEYXRlU3R5bGUiOnsiJGlkIjoiMjE1IiwiRm9udFNldHRpbmdzIjp7IiRpZCI6IjIxNiIsIkZvbnRTaXplIjoxMCwiRm9udE5hbWUiOiJDYWxpYnJpIiwiSXNCb2xkIjpmYWxzZSwiSXNJdGFsaWMiOmZhbHNlLCJJc1VuZGVybGluZWQiOmZhbHNlLCJQYXJlbnRTdHlsZSI6eyIkcmVmIjoiMTE1In19LCJBdXRvU2l6ZSI6MCwiRm9yZWdyb3VuZCI6eyIkcmVmIjoiMTE2In0sIk1heFdpZHRoIjoyMDAuMCwiTWF4SGVpZ2h0IjoiSW5maW5pdHkiLCJTbWFydEZvcmVncm91bmRJc0FjdGl2ZSI6ZmFsc2UsIkhvcml6b250YWxBbGlnbm1lbnQiOjAsIlZlcnRpY2FsQWxpZ25tZW50IjowLCJTbWFydEZvcmVncm91bmQiOm51bGwsIk1hcmdpbiI6eyIkcmVmIjoiMTE4In0sIlBhZGRpbmciOnsiJHJlZiI6IjExOSJ9LCJCYWNrZ3JvdW5kIjp7IiRyZWYiOiIxMjAifSwiSXNWaXNpYmxlIjp0cnVlLCJXaWR0aCI6MC4wLCJIZWlnaHQiOjAuMCwiQm9yZGVyU3R5bGUiOnsiJGlkIjoiMjE3IiwiTGluZUNvbG9yIjpudWxsLCJMaW5lV2VpZ2h0IjowLjAsIkxpbmVUeXBlIjowLCJQYXJlbnRTdHlsZSI6bnVsbH0sIlBhcmVudFN0eWxlIjp7IiRyZWYiOiIxMTQifX0sIkRhdGVGb3JtYXQiOnsiJHJlZiI6IjEyMSJ9LCJJc1Zpc2libGUiOnRydWUsIlBhcmVudFN0eWxlIjp7IiRyZWYiOiI4MCJ9fSwiSW5kZXgiOjQsIklkIjoiNjM5ZWI0MjUtNTk0OS00OWRlLTg5MTUtMmQzNGMyZjUzZmE1IiwiSW1wb3J0SWQiOm51bGwsIlRpdGxlIjoiQWpvdXQgZGVzIGRvbm7DqWVzIGRlIGwnZW5zZWlnbmVtZW50IiwiTm90ZSI6bnVsbCwiSHlwZXJsaW5rIjpudWxsLCJJc0NoYW5nZWQiOmZhbHNlLCJJc05ldyI6ZmFsc2V9XSwiTXNQcm9qZWN0SXRlbXNUcmVlIjp7IiRpZCI6IjIxOCIsIlJvb3QiOnsiSW1wb3J0SWQiOm51bGwsIklzSW1wb3J0ZWQiOmZhbHNlLCJDaGlsZHJlbiI6W119fSwiTWV0YWRhdGEiOnsiJGlkIjoiMjE5In0sIlNldHRpbmdzIjp7IiRpZCI6IjIyMCIsIkltcGFPcHRpb25zIjp7IiRpZCI6IjIyMSIsIkxlZnRUb1JpZ2h0IjpmYWxzZSwiUGF5bG9hZE9wdGlvbnMiOjJ9LCJVc2VDb21wcmVzc2lvbiI6ZmFsc2UsIkNvbXByZXNpb25QZXJjZW50YWdlIjowLjAsIkluYWN0aXZlSW50ZXJ2YWxXaWR0aFRocmVzaG9sZCI6MC4wLCJJbmFjdGl2ZUludGVydmFsV2lkdGgiOjAuMCwiU3BsaXRUYXNrcyI6ZmFsc2UsIlVzZUNsdXN0ZXIiOmZhbHNlLCJFcHNpbG9uIjowLjAsIk1pblBvaW50c1RvRm9ybUFDbHVzdGVyIjowLCJHZW5lcmF0ZUludmlzaWJsZVNoYXBlcyI6ZmFsc2UsIlNtYXJ0VGltZWxpbmVUYXNrUGVyY2VudGFnZUZpdCI6ZmFsc2V9LCJJc05ldyI6dHJ1ZSwiSW1wb3J0VHlwZSI6MCwiRmlsZVBhdGgiOm51bGwsIlRpbWVsaW5lSW1wb3J0ZWQiOmZhbHNlLCJUaW1lbGluZUltcG9ydGVkRnJvbUV4Y2VsIjpmYWxzZX0="/>
+  <p:tag name="__PART_0" val="eyIkaWQiOiIxIiwiQ3VsdHVyZUluZm9OYW1lIjoiZnItRlIiLCJTdHlsZU5hbWUiOiJTdGFuZGFyZCIsIklzVGVtcGxhdGUiOmZhbHNlLCJWZXJzaW9uIjp7IiRpZCI6IjIiLCJWZXJzaW9uIjoiMy4wLjEiLCJPcmlnaW5hbEFzc2VtYmx5VmVyc2lvbiI6IjMuMDkuMDUuMDAiLCJFZGl0aW9uIjoiQmFzaWMiLCJJc1BsdXNFZGl0aW9uIjpmYWxzZX0sIkVmZmVjdCI6MSwiU3R5bGUiOnsiJGlkIjoiMyIsIlRpbWViYW5kU3R5bGUiOnsiJGlkIjoiNCIsIlNjYWxlTWFya2luZyI6MCwiU2hhcGUiOjAsIlNoYXBlU3R5bGUiOnsiJGlkIjoiNSIsIk1hcmdpbiI6eyIkaWQiOiI2IiwiVG9wIjowLCJMZWZ0IjoxMiwiUmlnaHQiOjEyLCJCb3R0b20iOjB9LCJQYWRkaW5nIjp7IiRpZCI6IjciLCJUb3AiOjUsIkxlZnQiOjAsIlJpZ2h0IjowLCJCb3R0b20iOjV9LCJCYWNrZ3JvdW5kIjp7IiRpZCI6IjgiLCJDb2xvciI6eyIkaWQiOiI5IiwiQSI6MjU1LCJSIjo2OCwiRyI6ODQsIkIiOjEwNn19LCJJc1Zpc2libGUiOnRydWUsIldpZHRoIjo4NTguMCwiSGVpZ2h0IjozMC4wLCJCb3JkZXJTdHlsZSI6eyIkaWQiOiIxMCIsIkxpbmVDb2xvciI6eyIkaWQiOiIxMSIsIiR0eXBlIjoiTkxSRS5Db21tb24uRG9tLlNvbGlkQ29sb3JCcnVzaCwgTkxSRS5Db21tb24iLCJDb2xvciI6eyIkaWQiOiIxMiIsIkEiOjI1NSwiUiI6MjU1LCJHIjowLCJCIjowfX0sIkxpbmVXZWlnaHQiOjAuMCwiTGluZVR5cGUiOjAsIlBhcmVudFN0eWxlIjpudWxsfSwiUGFyZW50U3R5bGUiOm51bGx9LCJSaWdodEVuZENhcHNTdHlsZSI6eyIkaWQiOiIxMyIsIkZvbnRTZXR0aW5ncyI6eyIkaWQiOiIxNCIsIkZvbnRTaXplIjoxOCwiRm9udE5hbWUiOiJDYWxpYnJpIiwiSXNCb2xkIjp0cnVlLCJJc0l0YWxpYyI6ZmFsc2UsIklzVW5kZXJsaW5lZCI6ZmFsc2UsIlBhcmVudFN0eWxlIjpudWxsfSwiQXV0b1NpemUiOjAsIkZvcmVncm91bmQiOnsiJGlkIjoiMTUiLCJDb2xvciI6eyIkaWQiOiIxNiIsIkEiOjI1NSwiUiI6MTkyLCJHIjo4MCwiQiI6Nzd9fSwiTWF4V2lkdGgiOiJJbmZpbml0eSIsIk1heEhlaWdodCI6IkluZmluaXR5IiwiU21hcnRGb3JlZ3JvdW5kSXNBY3RpdmUiOmZhbHNlLCJIb3Jpem9udGFsQWxpZ25tZW50IjowLCJWZXJ0aWNhbEFsaWdubWVudCI6MCwiU21hcnRGb3JlZ3JvdW5kIjpudWxsLCJNYXJnaW4iOnsiJGlkIjoiMTciLCJUb3AiOjAsIkxlZnQiOjAsIlJpZ2h0IjoyNSwiQm90dG9tIjowfSwiUGFkZGluZyI6eyIkaWQiOiIxOCIsIlRvcCI6MCwiTGVmdCI6MCwiUmlnaHQiOjAsIkJvdHRvbSI6MH0sIkJhY2tncm91bmQiOnsiJGlkIjoiMTkiLCJDb2xvciI6eyIkaWQiOiIyMCIsIkEiOjg5LCJSIjowLCJHIjowLCJCIjowfX0sIklzVmlzaWJsZSI6dHJ1ZSwiV2lkdGgiOjAuMCwiSGVpZ2h0IjowLjAsIkJvcmRlclN0eWxlIjpudWxsLCJQYXJlbnRTdHlsZSI6bnVsbH0sIkxlZnRFbmRDYXBzU3R5bGUiOnsiJGlkIjoiMjEiLCJGb250U2V0dGluZ3MiOnsiJGlkIjoiMjIiLCJGb250U2l6ZSI6MTgsIkZvbnROYW1lIjoiQ2FsaWJyaSIsIklzQm9sZCI6dHJ1ZSwiSXNJdGFsaWMiOmZhbHNlLCJJc1VuZGVybGluZWQiOmZhbHNlLCJQYXJlbnRTdHlsZSI6bnVsbH0sIkF1dG9TaXplIjowLCJGb3JlZ3JvdW5kIjp7IiRpZCI6IjIzIiwiQ29sb3IiOnsiJGlkIjoiMjQiLCJBIjoyNTUsIlIiOjE5MiwiRyI6ODAsIkIiOjc3fX0sIk1heFdpZHRoIjoiSW5maW5pdHkiLCJNYXhIZWlnaHQiOiJJbmZpbml0eSIsIlNtYXJ0Rm9yZWdyb3VuZElzQWN0aXZlIjpmYWxzZSwiSG9yaXpvbnRhbEFsaWdubWVudCI6MCwiVmVydGljYWxBbGlnbm1lbnQiOjAsIlNtYXJ0Rm9yZWdyb3VuZCI6bnVsbCwiTWFyZ2luIjp7IiRpZCI6IjI1IiwiVG9wIjowLCJMZWZ0IjoyNSwiUmlnaHQiOjAsIkJvdHRvbSI6MH0sIlBhZGRpbmciOnsiJGlkIjoiMjYiLCJUb3AiOjAsIkxlZnQiOjAsIlJpZ2h0IjowLCJCb3R0b20iOjB9LCJCYWNrZ3JvdW5kIjp7IiRpZCI6IjI3IiwiQ29sb3IiOnsiJHJlZiI6IjIwIn19LCJJc1Zpc2libGUiOnRydWUsIldpZHRoIjowLjAsIkhlaWdodCI6MC4wLCJCb3JkZXJTdHlsZSI6bnVsbCwiUGFyZW50U3R5bGUiOm51bGx9LCJUb2RheVRleHRTdHlsZSI6eyIkaWQiOiIyOCIsIkZvbnRTZXR0aW5ncyI6eyIkaWQiOiIyOSIsIkZvbnRTaXplIjoxMiwiRm9udE5hbWUiOiJDYWxpYnJpIiwiSXNCb2xkIjpmYWxzZSwiSXNJdGFsaWMiOmZhbHNlLCJJc1VuZGVybGluZWQiOmZhbHNlLCJQYXJlbnRTdHlsZSI6bnVsbH0sIkF1dG9TaXplIjowLCJGb3JlZ3JvdW5kIjp7IiRpZCI6IjMwIiwiQ29sb3IiOnsiJGlkIjoiMzEiLCJBIjoyNTUsIlIiOjAsIkciOjAsIkIiOjB9fSwiTWF4V2lkdGgiOjIwMC4wLCJNYXhIZWlnaHQiOiJJbmZpbml0eSIsIlNtYXJ0Rm9yZWdyb3VuZElzQWN0aXZlIjpmYWxzZSwiSG9yaXpvbnRhbEFsaWdubWVudCI6MCwiVmVydGljYWxBbGlnbm1lbnQiOjAsIlNtYXJ0Rm9yZWdyb3VuZCI6bnVsbCwiTWFyZ2luIjp7IiRpZCI6IjMyIiwiVG9wIjowLCJMZWZ0IjowLCJSaWdodCI6MCwiQm90dG9tIjowfSwiUGFkZGluZyI6eyIkaWQiOiIzMyIsIlRvcCI6MCwiTGVmdCI6MCwiUmlnaHQiOjAsIkJvdHRvbSI6MH0sIkJhY2tncm91bmQiOnsiJGlkIjoiMzQiLCJDb2xvciI6eyIkcmVmIjoiMjAifX0sIklzVmlzaWJsZSI6dHJ1ZSwiV2lkdGgiOjAuMCwiSGVpZ2h0IjowLjAsIkJvcmRlclN0eWxlIjpudWxsLCJQYXJlbnRTdHlsZSI6bnVsbH0sIlRvZGF5TWFya2VyU3R5bGUiOnsiJGlkIjoiMzUiLCJNYXJnaW4iOnsiJGlkIjoiMzYiLCJUb3AiOjAsIkxlZnQiOjAsIlJpZ2h0IjowLCJCb3R0b20iOjB9LCJQYWRkaW5nIjp7IiRpZCI6IjM3IiwiVG9wIjowLCJMZWZ0IjowLCJSaWdodCI6MCwiQm90dG9tIjowfSwiQmFja2dyb3VuZCI6eyIkaWQiOiIzOCIsIkNvbG9yIjp7IiRpZCI6IjM5IiwiQSI6MjU1LCJSIjoyNTUsIkciOjAsIkIiOjB9fSwiSXNWaXNpYmxlIjp0cnVlLCJXaWR0aCI6MC4wLCJIZWlnaHQiOjAuMCwiQm9yZGVyU3R5bGUiOm51bGwsIlBhcmVudFN0eWxlIjpudWxsfSwiU2NhbGVTdHlsZSI6eyIkaWQiOiI0MCIsIlNob3dTZWdtZW50U2VwYXJhdG9ycyI6dHJ1ZSwiU2VnbWVudFNlcGFyYXRvck9wYWNpdHkiOjMwLCJGb250U2V0dGluZ3MiOnsiJGlkIjoiNDEiLCJGb250U2l6ZSI6MTIsIkZvbnROYW1lIjoiQ2FsaWJyaSIsIklzQm9sZCI6ZmFsc2UsIklzSXRhbGljIjpmYWxzZSwiSXNVbmRlcmxpbmVkIjpmYWxzZSwiUGFyZW50U3R5bGUiOm51bGx9LCJBdXRvU2l6ZSI6MCwiRm9yZWdyb3VuZCI6eyIkaWQiOiI0MiIsIkNvbG9yIjp7IiRpZCI6IjQzIiwiQSI6MjU1LCJSIjoyNTUsIkciOjI1NSwiQiI6MjU1fX0sIk1heFdpZHRoIjoyMDAuMCwiTWF4SGVpZ2h0IjoiSW5maW5pdHkiLCJTbWFydEZvcmVncm91bmRJc0FjdGl2ZSI6ZmFsc2UsIkhvcml6b250YWxBbGlnbm1lbnQiOjAsIlZlcnRpY2FsQWxpZ25tZW50IjoxLCJTbWFydEZvcmVncm91bmQiOm51bGwsIk1hcmdpbiI6eyIkaWQiOiI0NCIsIlRvcCI6MCwiTGVmdCI6NSwiUmlnaHQiOjAsIkJvdHRvbSI6MH0sIlBhZGRpbmciOnsiJGlkIjoiNDUiLCJUb3AiOjAsIkxlZnQiOjAsIlJpZ2h0IjowLCJCb3R0b20iOjB9LCJCYWNrZ3JvdW5kIjp7IiRpZCI6IjQ2IiwiQ29sb3IiOnsiJHJlZiI6IjIwIn19LCJJc1Zpc2libGUiOnRydWUsIldpZHRoIjowLjAsIkhlaWdodCI6MC4wLCJCb3JkZXJTdHlsZSI6bnVsbCwiUGFyZW50U3R5bGUiOm51bGx9LCJFbGFwc2VkVGltZUJhY2tncm91bmQiOnsiJGlkIjoiNDciLCJDb2xvciI6eyIkaWQiOiI0OCIsIkEiOjE5MSwiUiI6MjU1LCJHIjowLCJCIjowfX0sIkFwcGVuZFllYXJPblllYXJDaGFuZ2UiOnRydWUsIkVsYXBzZWRUaW1lRm9ybWF0IjoyLCJUb2RheU1hcmtlclBvc2l0aW9uIjozLCJRdWlja1Bvc2l0aW9uIjoxLCJBYnNvbHV0ZVBvc2l0aW9uIjoyNDAuMCwiTWFyZ2luIjp7IiRpZCI6IjQ5IiwiVG9wIjowLCJMZWZ0IjoxMCwiUmlnaHQiOjEwLCJCb3R0b20iOjB9LCJQYWRkaW5nIjp7IiRpZCI6IjUwIiwiVG9wIjowLCJMZWZ0IjowLCJSaWdodCI6MCwiQm90dG9tIjowfSwiQmFja2dyb3VuZCI6eyIkaWQiOiI1MSIsIkNvbG9yIjp7IiRpZCI6IjUyIiwiQSI6MjU1LCJSIjozMSwiRyI6NzMsIkIiOjEyNX19LCJJc1Zpc2libGUiOnRydWUsIldpZHRoIjowLjAsIkhlaWdodCI6MC4wLCJCb3JkZXJTdHlsZSI6bnVsbCwiUGFyZW50U3R5bGUiOm51bGx9LCJEZWZhdWx0TWlsZXN0b25lU3R5bGUiOnsiJGlkIjoiNTMiLCJTaGFwZSI6MiwiQ29ubmVjdG9yTWFyZ2luIjp7IiRpZCI6IjU0IiwiVG9wIjowLCJMZWZ0IjoyLCJSaWdodCI6MiwiQm90dG9tIjowfSwiQ29ubmVjdG9yU3R5bGUiOnsiJGlkIjoiNTUiLCJMaW5lQ29sb3IiOnsiJGlkIjoiNTYiLCIkdHlwZSI6Ik5MUkUuQ29tbW9uLkRvbS5Tb2xpZENvbG9yQnJ1c2gsIE5MUkUuQ29tbW9uIiwiQ29sb3IiOnsiJGlkIjoiNTciLCJBIjoyNTUsIlIiOjMxLCJHIjo3MywiQiI6MTI2fX0sIkxpbmVXZWlnaHQiOjEuMCwiTGluZVR5cGUiOjAsIlBhcmVudFN0eWxlIjpudWxsfSwiSXNCZWxvd1RpbWViYW5kIjpmYWxzZSwiSGlkZURhdGUiOmZhbHNlLCJTaGFwZVNpemUiOjEsIlNwYWNpbmciOjEuMCwiUGFkZGluZyI6eyIkaWQiOiI1OCIsIlRvcCI6NywiTGVmdCI6MywiUmlnaHQiOjAsIkJvdHRvbSI6Mn0sIlNoYXBlU3R5bGUiOnsiJGlkIjoiNTkiLCJNYXJnaW4iOnsiJGlkIjoiNjAiLCJUb3AiOjAsIkxlZnQiOjAsIlJpZ2h0IjowLCJCb3R0b20iOjB9LCJQYWRkaW5nIjp7IiRpZCI6IjYxIiwiVG9wIjowLCJMZWZ0IjowLCJSaWdodCI6MCwiQm90dG9tIjowfSwiQmFja2dyb3VuZCI6bnVsbCwiSXNWaXNpYmxlIjp0cnVlLCJXaWR0aCI6MTguMCwiSGVpZ2h0IjoyMC4wLCJCb3JkZXJTdHlsZSI6eyIkaWQiOiI2MiIsIkxpbmVDb2xvciI6eyIkaWQiOiI2MyIsIiR0eXBlIjoiTkxSRS5Db21tb24uRG9tLlNvbGlkQ29sb3JCcnVzaCwgTkxSRS5Db21tb24iLCJDb2xvciI6eyIkaWQiOiI2NCIsIkEiOjI1NSwiUiI6MjU1LCJHIjowLCJCIjowfX0sIkxpbmVXZWlnaHQiOjAuMCwiTGluZVR5cGUiOjAsIlBhcmVudFN0eWxlIjpudWxsfSwiUGFyZW50U3R5bGUiOm51bGx9LCJUaXRsZVN0eWxlIjp7IiRpZCI6IjY1IiwiRm9udFNldHRpbmdzIjp7IiRpZCI6IjY2IiwiRm9udFNpemUiOjExLCJGb250TmFtZSI6IkNhbGlicmkiLCJJc0JvbGQiOnRydWUsIklzSXRhbGljIjpmYWxzZSwiSXNVbmRlcmxpbmVkIjpmYWxzZSwiUGFyZW50U3R5bGUiOm51bGx9LCJBdXRvU2l6ZSI6MCwiRm9yZWdyb3VuZCI6eyIkaWQiOiI2NyIsIkNvbG9yIjp7IiRpZCI6IjY4IiwiQSI6MjU1LCJSIjowLCJHIjowLCJCIjowfX0sIk1heFdpZHRoIjoyMDAuMCwiTWF4SGVpZ2h0IjoiSW5maW5pdHkiLCJTbWFydEZvcmVncm91bmRJc0FjdGl2ZSI6ZmFsc2UsIkhvcml6b250YWxBbGlnbm1lbnQiOjAsIlZlcnRpY2FsQWxpZ25tZW50IjowLCJTbWFydEZvcmVncm91bmQiOm51bGwsIk1hcmdpbiI6eyIkaWQiOiI2OSIsIlRvcCI6MCwiTGVmdCI6MCwiUmlnaHQiOjAsIkJvdHRvbSI6MH0sIlBhZGRpbmciOnsiJGlkIjoiNzAiLCJUb3AiOjAsIkxlZnQiOjAsIlJpZ2h0IjowLCJCb3R0b20iOjB9LCJCYWNrZ3JvdW5kIjp7IiRpZCI6IjcxIiwiQ29sb3IiOnsiJHJlZiI6IjIwIn19LCJJc1Zpc2libGUiOnRydWUsIldpZHRoIjowLjAsIkhlaWdodCI6MC4wLCJCb3JkZXJTdHlsZSI6bnVsbCwiUGFyZW50U3R5bGUiOm51bGx9LCJEYXRlU3R5bGUiOnsiJGlkIjoiNzIiLCJGb250U2V0dGluZ3MiOnsiJGlkIjoiNzMiLCJGb250U2l6ZSI6MTAsIkZvbnROYW1lIjoiQ2FsaWJyaSIsIklzQm9sZCI6ZmFsc2UsIklzSXRhbGljIjpmYWxzZSwiSXNVbmRlcmxpbmVkIjpmYWxzZSwiUGFyZW50U3R5bGUiOm51bGx9LCJBdXRvU2l6ZSI6MCwiRm9yZWdyb3VuZCI6eyIkaWQiOiI3NCIsIkNvbG9yIjp7IiRpZCI6Ijc1IiwiQSI6MjU1LCJSIjozMSwiRyI6NzMsIkIiOjEyNn19LCJNYXhXaWR0aCI6MjAwLjAsIk1heEhlaWdodCI6IkluZmluaXR5IiwiU21hcnRGb3JlZ3JvdW5kSXNBY3RpdmUiOmZhbHNlLCJIb3Jpem9udGFsQWxpZ25tZW50IjowLCJWZXJ0aWNhbEFsaWdubWVudCI6MCwiU21hcnRGb3JlZ3JvdW5kIjpudWxsLCJNYXJnaW4iOnsiJGlkIjoiNzYiLCJUb3AiOjAsIkxlZnQiOjAsIlJpZ2h0IjowLCJCb3R0b20iOjB9LCJQYWRkaW5nIjp7IiRpZCI6Ijc3IiwiVG9wIjowLCJMZWZ0IjowLCJSaWdodCI6MCwiQm90dG9tIjowfSwiQmFja2dyb3VuZCI6eyIkaWQiOiI3OCIsIkNvbG9yIjp7IiRyZWYiOiIyMCJ9fSwiSXNWaXNpYmxlIjp0cnVlLCJXaWR0aCI6MC4wLCJIZWlnaHQiOjAuMCwiQm9yZGVyU3R5bGUiOm51bGwsIlBhcmVudFN0eWxlIjpudWxsfSwiRGF0ZUZvcm1hdCI6eyIkaWQiOiI3OSIsIkZvcm1hdFN0cmluZyI6Ik0vZC95eXl5IiwiU2VwYXJhdG9yIjoiLyIsIlVzZUludGVybmF0aW9uYWxEYXRlRm9ybWF0IjpmYWxzZX0sIklzVmlzaWJsZSI6dHJ1ZSwiUGFyZW50U3R5bGUiOm51bGx9LCJEZWZhdWx0VGFza1N0eWxlIjp7IiRpZCI6IjgwIiwiU2hhcGUiOjAsIlNoYXBlVGhpY2tuZXNzIjoxLCJEdXJhdGlvbkZvcm1hdCI6MCwiSW5jbHVkZU5vbldvcmtpbmdEYXlzSW5EdXJhdGlvbiI6dHJ1ZSwiUGVyY2VudGFnZUNvbXBsZXRlU3R5bGUiOnsiJGlkIjoiODEiLCJGb250U2V0dGluZ3MiOnsiJGlkIjoiODIiLCJGb250U2l6ZSI6MTAsIkZvbnROYW1lIjoiQ2FsaWJyaSIsIklzQm9sZCI6ZmFsc2UsIklzSXRhbGljIjpmYWxzZSwiSXNVbmRlcmxpbmVkIjpmYWxzZSwiUGFyZW50U3R5bGUiOm51bGx9LCJBdXRvU2l6ZSI6MCwiRm9yZWdyb3VuZCI6eyIkaWQiOiI4MyIsIkNvbG9yIjp7IiRpZCI6Ijg0IiwiQSI6MjU1LCJSIjoxOTIsIkciOjgwLCJCIjo3N319LCJNYXhXaWR0aCI6MjAwLjAsIk1heEhlaWdodCI6IkluZmluaXR5IiwiU21hcnRGb3JlZ3JvdW5kSXNBY3RpdmUiOmZhbHNlLCJIb3Jpem9udGFsQWxpZ25tZW50IjowLCJWZXJ0aWNhbEFsaWdubWVudCI6MCwiU21hcnRGb3JlZ3JvdW5kIjpudWxsLCJNYXJnaW4iOnsiJGlkIjoiODUiLCJUb3AiOjAsIkxlZnQiOjAsIlJpZ2h0IjowLCJCb3R0b20iOjB9LCJQYWRkaW5nIjp7IiRpZCI6Ijg2IiwiVG9wIjowLCJMZWZ0IjowLCJSaWdodCI6MCwiQm90dG9tIjowfSwiQmFja2dyb3VuZCI6eyIkaWQiOiI4NyIsIkNvbG9yIjp7IiRyZWYiOiIyMCJ9fSwiSXNWaXNpYmxlIjp0cnVlLCJXaWR0aCI6MC4wLCJIZWlnaHQiOjAuMCwiQm9yZGVyU3R5bGUiOm51bGwsIlBhcmVudFN0eWxlIjpudWxsfSwiRHVyYXRpb25TdHlsZSI6eyIkaWQiOiI4OCIsIkZvbnRTZXR0aW5ncyI6eyIkaWQiOiI4OSIsIkZvbnRTaXplIjoxMCwiRm9udE5hbWUiOiJDYWxpYnJpIiwiSXNCb2xkIjpmYWxzZSwiSXNJdGFsaWMiOmZhbHNlLCJJc1VuZGVybGluZWQiOmZhbHNlLCJQYXJlbnRTdHlsZSI6bnVsbH0sIkF1dG9TaXplIjowLCJGb3JlZ3JvdW5kIjp7IiRpZCI6IjkwIiwiQ29sb3IiOnsiJGlkIjoiOTEiLCJBIjoyNTUsIlIiOjE5MiwiRyI6ODAsIkIiOjc3fX0sIk1heFdpZHRoIjoyMDAuMCwiTWF4SGVpZ2h0IjoiSW5maW5pdHkiLCJTbWFydEZvcmVncm91bmRJc0FjdGl2ZSI6ZmFsc2UsIkhvcml6b250YWxBbGlnbm1lbnQiOjAsIlZlcnRpY2FsQWxpZ25tZW50IjowLCJTbWFydEZvcmVncm91bmQiOm51bGwsIk1hcmdpbiI6eyIkaWQiOiI5MiIsIlRvcCI6MCwiTGVmdCI6MCwiUmlnaHQiOjAsIkJvdHRvbSI6MH0sIlBhZGRpbmciOnsiJGlkIjoiOTMiLCJUb3AiOjAsIkxlZnQiOjAsIlJpZ2h0IjowLCJCb3R0b20iOjB9LCJCYWNrZ3JvdW5kIjp7IiRpZCI6Ijk0IiwiQ29sb3IiOnsiJHJlZiI6IjIwIn19LCJJc1Zpc2libGUiOnRydWUsIldpZHRoIjowLjAsIkhlaWdodCI6MC4wLCJCb3JkZXJTdHlsZSI6bnVsbCwiUGFyZW50U3R5bGUiOm51bGx9LCJIb3Jpem9udGFsQ29ubmVjdG9yU3R5bGUiOnsiJGlkIjoiOTUiLCJMaW5lQ29sb3IiOnsiJGlkIjoiOTYiLCIkdHlwZSI6Ik5MUkUuQ29tbW9uLkRvbS5Tb2xpZENvbG9yQnJ1c2gsIE5MUkUuQ29tbW9uIiwiQ29sb3IiOnsiJGlkIjoiOTciLCJBIjoyNTUsIlIiOjIwNCwiRyI6MjA0LCJCIjoyMDR9fSwiTGluZVdlaWdodCI6MS4wLCJMaW5lVHlwZSI6MCwiUGFyZW50U3R5bGUiOm51bGx9LCJWZXJ0aWNhbENvbm5lY3RvclN0eWxlIjp7IiRpZCI6Ijk4IiwiTGluZUNvbG9yIjp7IiRpZCI6Ijk5IiwiJHR5cGUiOiJOTFJFLkNvbW1vbi5Eb20uU29saWRDb2xvckJydXNoLCBOTFJFLkNvbW1vbiIsIkNvbG9yIjp7IiRpZCI6IjEwMCIsIkEiOjI1NSwiUiI6MjA0LCJHIjoyMDQsIkIiOjIwNH19LCJMaW5lV2VpZ2h0IjowLjAsIkxpbmVUeXBlIjowLCJQYXJlbnRTdHlsZSI6bnVsbH0sIk1hcmdpbiI6bnVsbCwiU3RhcnREYXRlUG9zaXRpb24iOjQsIkVuZERhdGVQb3NpdGlvbiI6NCwiVGl0bGVQb3NpdGlvbiI6NSwiRHVyYXRpb25Qb3NpdGlvbiI6NiwiUGVyY2VudGFnZUNvbXBsZXRlZFBvc2l0aW9uIjo2LCJTcGFjaW5nIjo1LCJJc0JlbG93VGltZWJhbmQiOnRydWUsIlBlcmNlbnRhZ2VDb21wbGV0ZVNoYXBlT3BhY2l0eSI6MzUsIlNoYXBlU3R5bGUiOnsiJGlkIjoiMTAxIiwiTWFyZ2luIjp7IiRpZCI6IjEwMiIsIlRvcCI6MCwiTGVmdCI6NCwiUmlnaHQiOjQsIkJvdHRvbSI6MH0sIlBhZGRpbmciOnsiJGlkIjoiMTAzIiwiVG9wIjowLCJMZWZ0IjowLCJSaWdodCI6MCwiQm90dG9tIjowfSwiQmFja2dyb3VuZCI6bnVsbCwiSXNWaXNpYmxlIjp0cnVlLCJXaWR0aCI6MC4wLCJIZWlnaHQiOjE2LjAsIkJvcmRlclN0eWxlIjp7IiRpZCI6IjEwNCIsIkxpbmVDb2xvciI6eyIkaWQiOiIxMDUiLCIkdHlwZSI6Ik5MUkUuQ29tbW9uLkRvbS5Tb2xpZENvbG9yQnJ1c2gsIE5MUkUuQ29tbW9uIiwiQ29sb3IiOnsiJGlkIjoiMTA2IiwiQSI6MjU1LCJSIjoyNTUsIkciOjAsIkIiOjB9fSwiTGluZVdlaWdodCI6MC4wLCJMaW5lVHlwZSI6MCwiUGFyZW50U3R5bGUiOm51bGx9LCJQYXJlbnRTdHlsZSI6bnVsbH0sIlRpdGxlU3R5bGUiOnsiJGlkIjoiMTA3IiwiRm9udFNldHRpbmdzIjp7IiRpZCI6IjEwOCIsIkZvbnRTaXplIjoxMSwiRm9udE5hbWUiOiJDYWxpYnJpIiwiSXNCb2xkIjp0cnVlLCJJc0l0YWxpYyI6ZmFsc2UsIklzVW5kZXJsaW5lZCI6ZmFsc2UsIlBhcmVudFN0eWxlIjpudWxsfSwiQXV0b1NpemUiOjAsIkZvcmVncm91bmQiOnsiJGlkIjoiMTA5IiwiQ29sb3IiOnsiJGlkIjoiMTEwIiwiQSI6MjU1LCJSIjowLCJHIjowLCJCIjowfX0sIk1heFdpZHRoIjo5NjAuMCwiTWF4SGVpZ2h0IjoiSW5maW5pdHkiLCJTbWFydEZvcmVncm91bmRJc0FjdGl2ZSI6ZmFsc2UsIkhvcml6b250YWxBbGlnbm1lbnQiOjAsIlZlcnRpY2FsQWxpZ25tZW50IjowLCJTbWFydEZvcmVncm91bmQiOm51bGwsIk1hcmdpbiI6eyIkaWQiOiIxMTEiLCJUb3AiOjAsIkxlZnQiOjAsIlJpZ2h0IjowLCJCb3R0b20iOjB9LCJQYWRkaW5nIjp7IiRpZCI6IjExMiIsIlRvcCI6MCwiTGVmdCI6MCwiUmlnaHQiOjAsIkJvdHRvbSI6MH0sIkJhY2tncm91bmQiOnsiJGlkIjoiMTEzIiwiQ29sb3IiOnsiJHJlZiI6IjIwIn19LCJJc1Zpc2libGUiOnRydWUsIldpZHRoIjowLjAsIkhlaWdodCI6MC4wLCJCb3JkZXJTdHlsZSI6bnVsbCwiUGFyZW50U3R5bGUiOm51bGx9LCJEYXRlU3R5bGUiOnsiJGlkIjoiMTE0IiwiRm9udFNldHRpbmdzIjp7IiRpZCI6IjExNSIsIkZvbnRTaXplIjoxMCwiRm9udE5hbWUiOiJDYWxpYnJpIiwiSXNCb2xkIjpmYWxzZSwiSXNJdGFsaWMiOmZhbHNlLCJJc1VuZGVybGluZWQiOmZhbHNlLCJQYXJlbnRTdHlsZSI6bnVsbH0sIkF1dG9TaXplIjowLCJGb3JlZ3JvdW5kIjp7IiRpZCI6IjExNiIsIkNvbG9yIjp7IiRpZCI6IjExNyIsIkEiOjI1NSwiUiI6MzEsIkciOjczLCJCIjoxMjZ9fSwiTWF4V2lkdGgiOjIwMC4wLCJNYXhIZWlnaHQiOiJJbmZpbml0eSIsIlNtYXJ0Rm9yZWdyb3VuZElzQWN0aXZlIjpmYWxzZSwiSG9yaXpvbnRhbEFsaWdubWVudCI6MCwiVmVydGljYWxBbGlnbm1lbnQiOjAsIlNtYXJ0Rm9yZWdyb3VuZCI6bnVsbCwiTWFyZ2luIjp7IiRpZCI6IjExOCIsIlRvcCI6MCwiTGVmdCI6MCwiUmlnaHQiOjAsIkJvdHRvbSI6MH0sIlBhZGRpbmciOnsiJGlkIjoiMTE5IiwiVG9wIjowLCJMZWZ0IjowLCJSaWdodCI6MCwiQm90dG9tIjowfSwiQmFja2dyb3VuZCI6eyIkaWQiOiIxMjAiLCJDb2xvciI6eyIkcmVmIjoiMjAifX0sIklzVmlzaWJsZSI6dHJ1ZSwiV2lkdGgiOjAuMCwiSGVpZ2h0IjowLjAsIkJvcmRlclN0eWxlIjpudWxsLCJQYXJlbnRTdHlsZSI6bnVsbH0sIkRhdGVGb3JtYXQiOnsiJGlkIjoiMTIxIiwiRm9ybWF0U3RyaW5nIjoiTS9kL3l5eXkiLCJTZXBhcmF0b3IiOiIvIiwiVXNlSW50ZXJuYXRpb25hbERhdGVGb3JtYXQiOmZhbHNlfSwiSXNWaXNpYmxlIjp0cnVlLCJQYXJlbnRTdHlsZSI6bnVsbH0sIlNob3dFbGFwc2VkVGltZUdyYWRpZW50U3R5bGUiOmZhbHNlfSwiU2NhbGUiOnsiJGlkIjoiMTIyIiwiU3RhcnREYXRlIjoiMjAxNy0wMS0yMFQwMDowMDowMFoiLCJFbmREYXRlIjoiMjAxNy0wMy0wMVQyMzo1OTo1OS45OTlaIiwiRm9ybWF0IjoidyIsIlR5cGUiOjEsIkF1dG9EYXRlUmFuZ2UiOnRydWUsIldvcmtpbmdEYXlzIjozMSwiVG9kYXlNYXJrZXJUZXh0IjoiQXVqb3VyZCdodWkiLCJBdXRvU2NhbGVUeXBlIjp0cnVlfSwiTWlsZXN0b25lcyI6W3siJGlkIjoiMTIzIiwiRGF0ZSI6IjIwMTctMDEtMjZUMjM6NTk6NTkuOTk5WiIsIlN0eWxlIjp7IiRpZCI6IjEyNCIsIlNoYXBlIjoyLCJDb25uZWN0b3JNYXJnaW4iOnsiJHJlZiI6IjU0In0sIkNvbm5lY3RvclN0eWxlIjp7IiRpZCI6IjEyNSIsIkxpbmVDb2xvciI6eyIkaWQiOiIxMjYiLCIkdHlwZSI6Ik5MUkUuQ29tbW9uLkRvbS5Tb2xpZENvbG9yQnJ1c2gsIE5MUkUuQ29tbW9uIiwiQ29sb3IiOnsiJGlkIjoiMTI3IiwiQSI6MTI3LCJSIjowLCJHIjoxMTQsIkIiOjE4OH19LCJMaW5lV2VpZ2h0IjoxLjAsIkxpbmVUeXBlIjowLCJQYXJlbnRTdHlsZSI6eyIkcmVmIjoiNTUifX0sIklzQmVsb3dUaW1lYmFuZCI6ZmFsc2UsIkhpZGVEYXRlIjpmYWxzZSwiU2hhcGVTaXplIjoxLCJTcGFjaW5nIjoxLjAsIlBhZGRpbmciOnsiJHJlZiI6IjU4In0sIlNoYXBlU3R5bGUiOnsiJGlkIjoiMTI4IiwiTWFyZ2luIjp7IiRyZWYiOiI2MCJ9LCJQYWRkaW5nIjp7IiRyZWYiOiI2MSJ9LCJCYWNrZ3JvdW5kIjp7IiRpZCI6IjEyOSIsIkNvbG9yIjp7IiRpZCI6IjEzMCIsIkEiOjI1NSwiUiI6MCwiRyI6MTE0LCJCIjoxODh9fSwiSXNWaXNpYmxlIjp0cnVlLCJXaWR0aCI6MTguMCwiSGVpZ2h0IjoyMC4wLCJCb3JkZXJTdHlsZSI6eyIkaWQiOiIxMzEiLCJMaW5lQ29sb3IiOnsiJHJlZiI6IjYzIn0sIkxpbmVXZWlnaHQiOjAuMCwiTGluZVR5cGUiOjAsIlBhcmVudFN0eWxlIjp7IiRyZWYiOiI2MiJ9fSwiUGFyZW50U3R5bGUiOnsiJHJlZiI6IjU5In19LCJUaXRsZVN0eWxlIjp7IiRpZCI6IjEzMiIsIkZvbnRTZXR0aW5ncyI6eyIkaWQiOiIxMzMiLCJGb250U2l6ZSI6MTEsIkZvbnROYW1lIjoiQ2FsaWJyaSIsIklzQm9sZCI6dHJ1ZSwiSXNJdGFsaWMiOmZhbHNlLCJJc1VuZGVybGluZWQiOmZhbHNlLCJQYXJlbnRTdHlsZSI6eyIkcmVmIjoiNjYifX0sIkF1dG9TaXplIjowLCJGb3JlZ3JvdW5kIjp7IiRyZWYiOiI2NyJ9LCJNYXhXaWR0aCI6MjAwLjAsIk1heEhlaWdodCI6IkluZmluaXR5IiwiU21hcnRGb3JlZ3JvdW5kSXNBY3RpdmUiOmZhbHNlLCJIb3Jpem9udGFsQWxpZ25tZW50IjowLCJWZXJ0aWNhbEFsaWdubWVudCI6MCwiU21hcnRGb3JlZ3JvdW5kIjpudWxsLCJNYXJnaW4iOnsiJHJlZiI6IjY5In0sIlBhZGRpbmciOnsiJHJlZiI6IjcwIn0sIkJhY2tncm91bmQiOnsiJHJlZiI6IjcxIn0sIklzVmlzaWJsZSI6dHJ1ZSwiV2lkdGgiOjAuMCwiSGVpZ2h0IjowLjAsIkJvcmRlclN0eWxlIjp7IiRpZCI6IjEzNCIsIkxpbmVDb2xvciI6bnVsbCwiTGluZVdlaWdodCI6MC4wLCJMaW5lVHlwZSI6MCwiUGFyZW50U3R5bGUiOm51bGx9LCJQYXJlbnRTdHlsZSI6eyIkcmVmIjoiNjUifX0sIkRhdGVTdHlsZSI6eyIkaWQiOiIxMzUiLCJGb250U2V0dGluZ3MiOnsiJGlkIjoiMTM2IiwiRm9udFNpemUiOjEwLCJGb250TmFtZSI6IkNhbGlicmkiLCJJc0JvbGQiOmZhbHNlLCJJc0l0YWxpYyI6ZmFsc2UsIklzVW5kZXJsaW5lZCI6ZmFsc2UsIlBhcmVudFN0eWxlIjp7IiRyZWYiOiI3MyJ9fSwiQXV0b1NpemUiOjAsIkZvcmVncm91bmQiOnsiJHJlZiI6Ijc0In0sIk1heFdpZHRoIjoyMDAuMCwiTWF4SGVpZ2h0IjoiSW5maW5pdHkiLCJTbWFydEZvcmVncm91bmRJc0FjdGl2ZSI6ZmFsc2UsIkhvcml6b250YWxBbGlnbm1lbnQiOjAsIlZlcnRpY2FsQWxpZ25tZW50IjowLCJTbWFydEZvcmVncm91bmQiOm51bGwsIk1hcmdpbiI6eyIkcmVmIjoiNzYifSwiUGFkZGluZyI6eyIkcmVmIjoiNzcifSwiQmFja2dyb3VuZCI6eyIkcmVmIjoiNzgifSwiSXNWaXNpYmxlIjp0cnVlLCJXaWR0aCI6MC4wLCJIZWlnaHQiOjAuMCwiQm9yZGVyU3R5bGUiOnsiJGlkIjoiMTM3IiwiTGluZUNvbG9yIjpudWxsLCJMaW5lV2VpZ2h0IjowLjAsIkxpbmVUeXBlIjowLCJQYXJlbnRTdHlsZSI6bnVsbH0sIlBhcmVudFN0eWxlIjp7IiRyZWYiOiI3MiJ9fSwiRGF0ZUZvcm1hdCI6eyIkcmVmIjoiNzkifSwiSXNWaXNpYmxlIjp0cnVlLCJQYXJlbnRTdHlsZSI6eyIkcmVmIjoiNTMifX0sIlBvc2l0aW9uIjp7IlJhdGlvIjowLjAsIklzQ3VzdG9tIjpmYWxzZX0sIklkIjoiYTE5YzViZjUtMWM5ZS00NTQ5LWEzZWYtYTRjZmYzYWZiY2FlIiwiSW1wb3J0SWQiOm51bGwsIlRpdGxlIjoiTGlyZSBldCBhZ2dyZWdlciBsZXMgZGlmZsOpcmVudGVzIGRvbm7DqWVzLiAiLCJOb3RlIjpudWxsLCJIeXBlcmxpbmsiOm51bGwsIklzQ2hhbmdlZCI6ZmFsc2UsIklzTmV3IjpmYWxzZX0seyIkaWQiOiIxMzgiLCJEYXRlIjoiMjAxNy0wMi0wMlQyMzo1OTo1OS45OTlaIiwiU3R5bGUiOnsiJGlkIjoiMTM5IiwiU2hhcGUiOjIsIkNvbm5lY3Rvck1hcmdpbiI6eyIkcmVmIjoiNTQifSwiQ29ubmVjdG9yU3R5bGUiOnsiJGlkIjoiMTQwIiwiTGluZUNvbG9yIjp7IiRpZCI6IjE0MSIsIiR0eXBlIjoiTkxSRS5Db21tb24uRG9tLlNvbGlkQ29sb3JCcnVzaCwgTkxSRS5Db21tb24iLCJDb2xvciI6eyIkaWQiOiIxNDIiLCJBIjoxMjcsIlIiOjIzNywiRyI6MTI1LCJCIjo0OX19LCJMaW5lV2VpZ2h0IjoxLjAsIkxpbmVUeXBlIjowLCJQYXJlbnRTdHlsZSI6eyIkcmVmIjoiNTUifX0sIklzQmVsb3dUaW1lYmFuZCI6ZmFsc2UsIkhpZGVEYXRlIjpmYWxzZSwiU2hhcGVTaXplIjoxLCJTcGFjaW5nIjoxLjAsIlBhZGRpbmciOnsiJHJlZiI6IjU4In0sIlNoYXBlU3R5bGUiOnsiJGlkIjoiMTQzIiwiTWFyZ2luIjp7IiRyZWYiOiI2MCJ9LCJQYWRkaW5nIjp7IiRyZWYiOiI2MSJ9LCJCYWNrZ3JvdW5kIjp7IiRpZCI6IjE0NCIsIkNvbG9yIjp7IiRpZCI6IjE0NSIsIkEiOjI1NSwiUiI6MjM3LCJHIjoxMjUsIkIiOjQ5fX0sIklzVmlzaWJsZSI6dHJ1ZSwiV2lkdGgiOjE4LjAsIkhlaWdodCI6MjAuMCwiQm9yZGVyU3R5bGUiOnsiJGlkIjoiMTQ2IiwiTGluZUNvbG9yIjp7IiRyZWYiOiI2MyJ9LCJMaW5lV2VpZ2h0IjowLjAsIkxpbmVUeXBlIjowLCJQYXJlbnRTdHlsZSI6eyIkcmVmIjoiNjIifX0sIlBhcmVudFN0eWxlIjp7IiRyZWYiOiI1OSJ9fSwiVGl0bGVTdHlsZSI6eyIkaWQiOiIxNDciLCJGb250U2V0dGluZ3MiOnsiJGlkIjoiMTQ4IiwiRm9udFNpemUiOjExLCJGb250TmFtZSI6IkNhbGlicmkiLCJJc0JvbGQiOnRydWUsIklzSXRhbGljIjpmYWxzZSwiSXNVbmRlcmxpbmVkIjpmYWxzZSwiUGFyZW50U3R5bGUiOnsiJHJlZiI6IjY2In19LCJBdXRvU2l6ZSI6MCwiRm9yZWdyb3VuZCI6eyIkcmVmIjoiNjcifSwiTWF4V2lkdGgiOjIwMC4wLCJNYXhIZWlnaHQiOiJJbmZpbml0eSIsIlNtYXJ0Rm9yZWdyb3VuZElzQWN0aXZlIjpmYWxzZSwiSG9yaXpvbnRhbEFsaWdubWVudCI6MCwiVmVydGljYWxBbGlnbm1lbnQiOjAsIlNtYXJ0Rm9yZWdyb3VuZCI6bnVsbCwiTWFyZ2luIjp7IiRyZWYiOiI2OSJ9LCJQYWRkaW5nIjp7IiRyZWYiOiI3MCJ9LCJCYWNrZ3JvdW5kIjp7IiRyZWYiOiI3MSJ9LCJJc1Zpc2libGUiOnRydWUsIldpZHRoIjowLjAsIkhlaWdodCI6MC4wLCJCb3JkZXJTdHlsZSI6eyIkaWQiOiIxNDkiLCJMaW5lQ29sb3IiOm51bGwsIkxpbmVXZWlnaHQiOjAuMCwiTGluZVR5cGUiOjAsIlBhcmVudFN0eWxlIjpudWxsfSwiUGFyZW50U3R5bGUiOnsiJHJlZiI6IjY1In19LCJEYXRlU3R5bGUiOnsiJGlkIjoiMTUwIiwiRm9udFNldHRpbmdzIjp7IiRpZCI6IjE1MSIsIkZvbnRTaXplIjoxMCwiRm9udE5hbWUiOiJDYWxpYnJpIiwiSXNCb2xkIjpmYWxzZSwiSXNJdGFsaWMiOmZhbHNlLCJJc1VuZGVybGluZWQiOmZhbHNlLCJQYXJlbnRTdHlsZSI6eyIkcmVmIjoiNzMifX0sIkF1dG9TaXplIjowLCJGb3JlZ3JvdW5kIjp7IiRyZWYiOiI3NCJ9LCJNYXhXaWR0aCI6MjAwLjAsIk1heEhlaWdodCI6IkluZmluaXR5IiwiU21hcnRGb3JlZ3JvdW5kSXNBY3RpdmUiOmZhbHNlLCJIb3Jpem9udGFsQWxpZ25tZW50IjowLCJWZXJ0aWNhbEFsaWdubWVudCI6MCwiU21hcnRGb3JlZ3JvdW5kIjpudWxsLCJNYXJnaW4iOnsiJHJlZiI6Ijc2In0sIlBhZGRpbmciOnsiJHJlZiI6Ijc3In0sIkJhY2tncm91bmQiOnsiJHJlZiI6Ijc4In0sIklzVmlzaWJsZSI6dHJ1ZSwiV2lkdGgiOjAuMCwiSGVpZ2h0IjowLjAsIkJvcmRlclN0eWxlIjp7IiRpZCI6IjE1MiIsIkxpbmVDb2xvciI6bnVsbCwiTGluZVdlaWdodCI6MC4wLCJMaW5lVHlwZSI6MCwiUGFyZW50U3R5bGUiOm51bGx9LCJQYXJlbnRTdHlsZSI6eyIkcmVmIjoiNzIifX0sIkRhdGVGb3JtYXQiOnsiJHJlZiI6Ijc5In0sIklzVmlzaWJsZSI6dHJ1ZSwiUGFyZW50U3R5bGUiOnsiJHJlZiI6IjUzIn19LCJQb3NpdGlvbiI6eyJSYXRpbyI6MC4wLCJJc0N1c3RvbSI6ZmFsc2V9LCJJZCI6ImYxZGQ1YzNmLTdhMTEtNGI0NC1hOWUyLWQwOTliZjYzMmE0NiIsIkltcG9ydElkIjpudWxsLCJUaXRsZSI6ImNvZWZmaWNpZW50IGRlIGNvcnLDqWxhdGlvbiBzdXIgbGUgMWVyIGpldSBkZSBkb25uw6llcyIsIk5vdGUiOm51bGwsIkh5cGVybGluayI6bnVsbCwiSXNDaGFuZ2VkIjpmYWxzZSwiSXNOZXciOmZhbHNlfSx7IiRpZCI6IjE1MyIsIkRhdGUiOiIyMDE3LTAyLTA5VDIzOjU5OjU5Ljk5OVoiLCJTdHlsZSI6eyIkaWQiOiIxNTQiLCJTaGFwZSI6MiwiQ29ubmVjdG9yTWFyZ2luIjp7IiRyZWYiOiI1NCJ9LCJDb25uZWN0b3JTdHlsZSI6eyIkaWQiOiIxNTUiLCJMaW5lQ29sb3IiOnsiJGlkIjoiMTU2IiwiJHR5cGUiOiJOTFJFLkNvbW1vbi5Eb20uU29saWRDb2xvckJydXNoLCBOTFJFLkNvbW1vbiIsIkNvbG9yIjp7IiRpZCI6IjE1NyIsIkEiOjEyNywiUiI6MTY1LCJHIjoxNjUsIkIiOjE2NX19LCJMaW5lV2VpZ2h0IjoxLjAsIkxpbmVUeXBlIjowLCJQYXJlbnRTdHlsZSI6eyIkcmVmIjoiNTUifX0sIklzQmVsb3dUaW1lYmFuZCI6ZmFsc2UsIkhpZGVEYXRlIjpmYWxzZSwiU2hhcGVTaXplIjoxLCJTcGFjaW5nIjoxLjAsIlBhZGRpbmciOnsiJHJlZiI6IjU4In0sIlNoYXBlU3R5bGUiOnsiJGlkIjoiMTU4IiwiTWFyZ2luIjp7IiRyZWYiOiI2MCJ9LCJQYWRkaW5nIjp7IiRyZWYiOiI2MSJ9LCJCYWNrZ3JvdW5kIjp7IiRpZCI6IjE1OSIsIkNvbG9yIjp7IiRpZCI6IjE2MCIsIkEiOjI1NSwiUiI6MTY1LCJHIjoxNjUsIkIiOjE2NX19LCJJc1Zpc2libGUiOnRydWUsIldpZHRoIjoxOC4wLCJIZWlnaHQiOjIwLjAsIkJvcmRlclN0eWxlIjp7IiRpZCI6IjE2MSIsIkxpbmVDb2xvciI6eyIkcmVmIjoiNjMifSwiTGluZVdlaWdodCI6MC4wLCJMaW5lVHlwZSI6MCwiUGFyZW50U3R5bGUiOnsiJHJlZiI6IjYyIn19LCJQYXJlbnRTdHlsZSI6eyIkcmVmIjoiNTkifX0sIlRpdGxlU3R5bGUiOnsiJGlkIjoiMTYyIiwiRm9udFNldHRpbmdzIjp7IiRpZCI6IjE2MyIsIkZvbnRTaXplIjoxMSwiRm9udE5hbWUiOiJDYWxpYnJpIiwiSXNCb2xkIjp0cnVlLCJJc0l0YWxpYyI6ZmFsc2UsIklzVW5kZXJsaW5lZCI6ZmFsc2UsIlBhcmVudFN0eWxlIjp7IiRyZWYiOiI2NiJ9fSwiQXV0b1NpemUiOjAsIkZvcmVncm91bmQiOnsiJHJlZiI6IjY3In0sIk1heFdpZHRoIjoyMDAuMCwiTWF4SGVpZ2h0IjoiSW5maW5pdHkiLCJTbWFydEZvcmVncm91bmRJc0FjdGl2ZSI6ZmFsc2UsIkhvcml6b250YWxBbGlnbm1lbnQiOjAsIlZlcnRpY2FsQWxpZ25tZW50IjowLCJTbWFydEZvcmVncm91bmQiOm51bGwsIk1hcmdpbiI6eyIkcmVmIjoiNjkifSwiUGFkZGluZyI6eyIkcmVmIjoiNzAifSwiQmFja2dyb3VuZCI6eyIkcmVmIjoiNzEifSwiSXNWaXNpYmxlIjp0cnVlLCJXaWR0aCI6MC4wLCJIZWlnaHQiOjAuMCwiQm9yZGVyU3R5bGUiOnsiJGlkIjoiMTY0IiwiTGluZUNvbG9yIjpudWxsLCJMaW5lV2VpZ2h0IjowLjAsIkxpbmVUeXBlIjowLCJQYXJlbnRTdHlsZSI6bnVsbH0sIlBhcmVudFN0eWxlIjp7IiRyZWYiOiI2NSJ9fSwiRGF0ZVN0eWxlIjp7IiRpZCI6IjE2NSIsIkZvbnRTZXR0aW5ncyI6eyIkaWQiOiIxNjYiLCJGb250U2l6ZSI6MTAsIkZvbnROYW1lIjoiQ2FsaWJyaSIsIklzQm9sZCI6ZmFsc2UsIklzSXRhbGljIjpmYWxzZSwiSXNVbmRlcmxpbmVkIjpmYWxzZSwiUGFyZW50U3R5bGUiOnsiJHJlZiI6IjczIn19LCJBdXRvU2l6ZSI6MCwiRm9yZWdyb3VuZCI6eyIkcmVmIjoiNzQifSwiTWF4V2lkdGgiOjIwMC4wLCJNYXhIZWlnaHQiOiJJbmZpbml0eSIsIlNtYXJ0Rm9yZWdyb3VuZElzQWN0aXZlIjpmYWxzZSwiSG9yaXpvbnRhbEFsaWdubWVudCI6MCwiVmVydGljYWxBbGlnbm1lbnQiOjAsIlNtYXJ0Rm9yZWdyb3VuZCI6bnVsbCwiTWFyZ2luIjp7IiRyZWYiOiI3NiJ9LCJQYWRkaW5nIjp7IiRyZWYiOiI3NyJ9LCJCYWNrZ3JvdW5kIjp7IiRyZWYiOiI3OCJ9LCJJc1Zpc2libGUiOnRydWUsIldpZHRoIjowLjAsIkhlaWdodCI6MC4wLCJCb3JkZXJTdHlsZSI6eyIkaWQiOiIxNjciLCJMaW5lQ29sb3IiOm51bGwsIkxpbmVXZWlnaHQiOjAuMCwiTGluZVR5cGUiOjAsIlBhcmVudFN0eWxlIjpudWxsfSwiUGFyZW50U3R5bGUiOnsiJHJlZiI6IjcyIn19LCJEYXRlRm9ybWF0Ijp7IiRyZWYiOiI3OSJ9LCJJc1Zpc2libGUiOnRydWUsIlBhcmVudFN0eWxlIjp7IiRyZWYiOiI1MyJ9fSwiUG9zaXRpb24iOnsiUmF0aW8iOjAuMCwiSXNDdXN0b20iOmZhbHNlfSwiSWQiOiIzNTRjZmNmNS02MzYzLTQ1NmMtYjkxZC0wZmU2YTdhYTJmM2EiLCJJbXBvcnRJZCI6bnVsbCwiVGl0bGUiOiJSZWdyZXNzaW9uIGxpbsOpYWlyZSIsIk5vdGUiOm51bGwsIkh5cGVybGluayI6bnVsbCwiSXNDaGFuZ2VkIjpmYWxzZSwiSXNOZXciOmZhbHNlfSx7IiRpZCI6IjE2OCIsIkRhdGUiOiIyMDE3LTAyLTE2VDIzOjU5OjU5Ljk5OVoiLCJTdHlsZSI6eyIkaWQiOiIxNjkiLCJTaGFwZSI6MiwiQ29ubmVjdG9yTWFyZ2luIjp7IiRyZWYiOiI1NCJ9LCJDb25uZWN0b3JTdHlsZSI6eyIkaWQiOiIxNzAiLCJMaW5lQ29sb3IiOnsiJGlkIjoiMTcxIiwiJHR5cGUiOiJOTFJFLkNvbW1vbi5Eb20uU29saWRDb2xvckJydXNoLCBOTFJFLkNvbW1vbiIsIkNvbG9yIjp7IiRpZCI6IjE3MiIsIkEiOjEyNywiUiI6MjU1LCJHIjoxOTIsIkIiOjB9fSwiTGluZVdlaWdodCI6MS4wLCJMaW5lVHlwZSI6MCwiUGFyZW50U3R5bGUiOnsiJHJlZiI6IjU1In19LCJJc0JlbG93VGltZWJhbmQiOmZhbHNlLCJIaWRlRGF0ZSI6ZmFsc2UsIlNoYXBlU2l6ZSI6MSwiU3BhY2luZyI6MS4wLCJQYWRkaW5nIjp7IiRyZWYiOiI1OCJ9LCJTaGFwZVN0eWxlIjp7IiRpZCI6IjE3MyIsIk1hcmdpbiI6eyIkcmVmIjoiNjAifSwiUGFkZGluZyI6eyIkcmVmIjoiNjEifSwiQmFja2dyb3VuZCI6eyIkaWQiOiIxNzQiLCJDb2xvciI6eyIkaWQiOiIxNzUiLCJBIjoyNTUsIlIiOjI1NSwiRyI6MTkyLCJCIjowfX0sIklzVmlzaWJsZSI6dHJ1ZSwiV2lkdGgiOjE4LjAsIkhlaWdodCI6MjAuMCwiQm9yZGVyU3R5bGUiOnsiJGlkIjoiMTc2IiwiTGluZUNvbG9yIjp7IiRyZWYiOiI2MyJ9LCJMaW5lV2VpZ2h0IjowLjAsIkxpbmVUeXBlIjowLCJQYXJlbnRTdHlsZSI6eyIkcmVmIjoiNjIifX0sIlBhcmVudFN0eWxlIjp7IiRyZWYiOiI1OSJ9fSwiVGl0bGVTdHlsZSI6eyIkaWQiOiIxNzciLCJGb250U2V0dGluZ3MiOnsiJGlkIjoiMTc4IiwiRm9udFNpemUiOjExLCJGb250TmFtZSI6IkNhbGlicmkiLCJJc0JvbGQiOnRydWUsIklzSXRhbGljIjpmYWxzZSwiSXNVbmRlcmxpbmVkIjpmYWxzZSwiUGFyZW50U3R5bGUiOnsiJHJlZiI6IjY2In19LCJBdXRvU2l6ZSI6MCwiRm9yZWdyb3VuZCI6eyIkcmVmIjoiNjcifSwiTWF4V2lkdGgiOjIwMC4wLCJNYXhIZWlnaHQiOiJJbmZpbml0eSIsIlNtYXJ0Rm9yZWdyb3VuZElzQWN0aXZlIjpmYWxzZSwiSG9yaXpvbnRhbEFsaWdubWVudCI6MCwiVmVydGljYWxBbGlnbm1lbnQiOjAsIlNtYXJ0Rm9yZWdyb3VuZCI6bnVsbCwiTWFyZ2luIjp7IiRyZWYiOiI2OSJ9LCJQYWRkaW5nIjp7IiRyZWYiOiI3MCJ9LCJCYWNrZ3JvdW5kIjp7IiRyZWYiOiI3MSJ9LCJJc1Zpc2libGUiOnRydWUsIldpZHRoIjowLjAsIkhlaWdodCI6MC4wLCJCb3JkZXJTdHlsZSI6eyIkaWQiOiIxNzkiLCJMaW5lQ29sb3IiOm51bGwsIkxpbmVXZWlnaHQiOjAuMCwiTGluZVR5cGUiOjAsIlBhcmVudFN0eWxlIjpudWxsfSwiUGFyZW50U3R5bGUiOnsiJHJlZiI6IjY1In19LCJEYXRlU3R5bGUiOnsiJGlkIjoiMTgwIiwiRm9udFNldHRpbmdzIjp7IiRpZCI6IjE4MSIsIkZvbnRTaXplIjoxMCwiRm9udE5hbWUiOiJDYWxpYnJpIiwiSXNCb2xkIjpmYWxzZSwiSXNJdGFsaWMiOmZhbHNlLCJJc1VuZGVybGluZWQiOmZhbHNlLCJQYXJlbnRTdHlsZSI6eyIkcmVmIjoiNzMifX0sIkF1dG9TaXplIjowLCJGb3JlZ3JvdW5kIjp7IiRyZWYiOiI3NCJ9LCJNYXhXaWR0aCI6MjAwLjAsIk1heEhlaWdodCI6IkluZmluaXR5IiwiU21hcnRGb3JlZ3JvdW5kSXNBY3RpdmUiOmZhbHNlLCJIb3Jpem9udGFsQWxpZ25tZW50IjowLCJWZXJ0aWNhbEFsaWdubWVudCI6MCwiU21hcnRGb3JlZ3JvdW5kIjpudWxsLCJNYXJnaW4iOnsiJHJlZiI6Ijc2In0sIlBhZGRpbmciOnsiJHJlZiI6Ijc3In0sIkJhY2tncm91bmQiOnsiJHJlZiI6Ijc4In0sIklzVmlzaWJsZSI6dHJ1ZSwiV2lkdGgiOjAuMCwiSGVpZ2h0IjowLjAsIkJvcmRlclN0eWxlIjp7IiRpZCI6IjE4MiIsIkxpbmVDb2xvciI6bnVsbCwiTGluZVdlaWdodCI6MC4wLCJMaW5lVHlwZSI6MCwiUGFyZW50U3R5bGUiOm51bGx9LCJQYXJlbnRTdHlsZSI6eyIkcmVmIjoiNzIifX0sIkRhdGVGb3JtYXQiOnsiJHJlZiI6Ijc5In0sIklzVmlzaWJsZSI6dHJ1ZSwiUGFyZW50U3R5bGUiOnsiJHJlZiI6IjUzIn19LCJQb3NpdGlvbiI6eyJSYXRpbyI6MC4wLCJJc0N1c3RvbSI6ZmFsc2V9LCJJZCI6IjA1YjMzODk4LTY1NzUtNDhlZS1iYjNkLWRkMWQyYTlkYThjMyIsIkltcG9ydElkIjpudWxsLCJUaXRsZSI6IkNvZWZmaWNpZW50IGRlIGNvcnLDqWxhdGlvbiBldCByw6lncmVzc2lvbiBsaW7DqWFpcmUgc3VyIGxlIDLDqG1lIGpldSBkZSBkb25uw6llcyIsIk5vdGUiOm51bGwsIkh5cGVybGluayI6bnVsbCwiSXNDaGFuZ2VkIjpmYWxzZSwiSXNOZXciOmZhbHNlfSx7IiRpZCI6IjE4MyIsIkRhdGUiOiIyMDE3LTAyLTIzVDIzOjU5OjU5Ljk5OVoiLCJTdHlsZSI6eyIkaWQiOiIxODQiLCJTaGFwZSI6MiwiQ29ubmVjdG9yTWFyZ2luIjp7IiRyZWYiOiI1NCJ9LCJDb25uZWN0b3JTdHlsZSI6eyIkaWQiOiIxODUiLCJMaW5lQ29sb3IiOnsiJGlkIjoiMTg2IiwiJHR5cGUiOiJOTFJFLkNvbW1vbi5Eb20uU29saWRDb2xvckJydXNoLCBOTFJFLkNvbW1vbiIsIkNvbG9yIjp7IiRpZCI6IjE4NyIsIkEiOjEyNywiUiI6NjgsIkciOjExNCwiQiI6MTk2fX0sIkxpbmVXZWlnaHQiOjEuMCwiTGluZVR5cGUiOjAsIlBhcmVudFN0eWxlIjp7IiRyZWYiOiI1NSJ9fSwiSXNCZWxvd1RpbWViYW5kIjpmYWxzZSwiSGlkZURhdGUiOmZhbHNlLCJTaGFwZVNpemUiOjEsIlNwYWNpbmciOjEuMCwiUGFkZGluZyI6eyIkcmVmIjoiNTgifSwiU2hhcGVTdHlsZSI6eyIkaWQiOiIxODgiLCJNYXJnaW4iOnsiJHJlZiI6IjYwIn0sIlBhZGRpbmciOnsiJHJlZiI6IjYxIn0sIkJhY2tncm91bmQiOnsiJGlkIjoiMTg5IiwiQ29sb3IiOnsiJGlkIjoiMTkwIiwiQSI6MjU1LCJSIjo2OCwiRyI6MTE0LCJCIjoxOTZ9fSwiSXNWaXNpYmxlIjp0cnVlLCJXaWR0aCI6MTguMCwiSGVpZ2h0IjoyMC4wLCJCb3JkZXJTdHlsZSI6eyIkaWQiOiIxOTEiLCJMaW5lQ29sb3IiOnsiJHJlZiI6IjYzIn0sIkxpbmVXZWlnaHQiOjAuMCwiTGluZVR5cGUiOjAsIlBhcmVudFN0eWxlIjp7IiRyZWYiOiI2MiJ9fSwiUGFyZW50U3R5bGUiOnsiJHJlZiI6IjU5In19LCJUaXRsZVN0eWxlIjp7IiRpZCI6IjE5MiIsIkZvbnRTZXR0aW5ncyI6eyIkaWQiOiIxOTMiLCJGb250U2l6ZSI6MTEsIkZvbnROYW1lIjoiQ2FsaWJyaSIsIklzQm9sZCI6dHJ1ZSwiSXNJdGFsaWMiOmZhbHNlLCJJc1VuZGVybGluZWQiOmZhbHNlLCJQYXJlbnRTdHlsZSI6eyIkcmVmIjoiNjYifX0sIkF1dG9TaXplIjowLCJGb3JlZ3JvdW5kIjp7IiRyZWYiOiI2NyJ9LCJNYXhXaWR0aCI6MjAwLjAsIk1heEhlaWdodCI6IkluZmluaXR5IiwiU21hcnRGb3JlZ3JvdW5kSXNBY3RpdmUiOmZhbHNlLCJIb3Jpem9udGFsQWxpZ25tZW50IjowLCJWZXJ0aWNhbEFsaWdubWVudCI6MCwiU21hcnRGb3JlZ3JvdW5kIjpudWxsLCJNYXJnaW4iOnsiJHJlZiI6IjY5In0sIlBhZGRpbmciOnsiJHJlZiI6IjcwIn0sIkJhY2tncm91bmQiOnsiJHJlZiI6IjcxIn0sIklzVmlzaWJsZSI6dHJ1ZSwiV2lkdGgiOjAuMCwiSGVpZ2h0IjowLjAsIkJvcmRlclN0eWxlIjp7IiRpZCI6IjE5NCIsIkxpbmVDb2xvciI6bnVsbCwiTGluZVdlaWdodCI6MC4wLCJMaW5lVHlwZSI6MCwiUGFyZW50U3R5bGUiOm51bGx9LCJQYXJlbnRTdHlsZSI6eyIkcmVmIjoiNjUifX0sIkRhdGVTdHlsZSI6eyIkaWQiOiIxOTUiLCJGb250U2V0dGluZ3MiOnsiJGlkIjoiMTk2IiwiRm9udFNpemUiOjEwLCJGb250TmFtZSI6IkNhbGlicmkiLCJJc0JvbGQiOmZhbHNlLCJJc0l0YWxpYyI6ZmFsc2UsIklzVW5kZXJsaW5lZCI6ZmFsc2UsIlBhcmVudFN0eWxlIjp7IiRyZWYiOiI3MyJ9fSwiQXV0b1NpemUiOjAsIkZvcmVncm91bmQiOnsiJHJlZiI6Ijc0In0sIk1heFdpZHRoIjoyMDAuMCwiTWF4SGVpZ2h0IjoiSW5maW5pdHkiLCJTbWFydEZvcmVncm91bmRJc0FjdGl2ZSI6ZmFsc2UsIkhvcml6b250YWxBbGlnbm1lbnQiOjAsIlZlcnRpY2FsQWxpZ25tZW50IjowLCJTbWFydEZvcmVncm91bmQiOm51bGwsIk1hcmdpbiI6eyIkcmVmIjoiNzYifSwiUGFkZGluZyI6eyIkcmVmIjoiNzcifSwiQmFja2dyb3VuZCI6eyIkcmVmIjoiNzgifSwiSXNWaXNpYmxlIjp0cnVlLCJXaWR0aCI6MC4wLCJIZWlnaHQiOjAuMCwiQm9yZGVyU3R5bGUiOnsiJGlkIjoiMTk3IiwiTGluZUNvbG9yIjpudWxsLCJMaW5lV2VpZ2h0IjowLjAsIkxpbmVUeXBlIjowLCJQYXJlbnRTdHlsZSI6bnVsbH0sIlBhcmVudFN0eWxlIjp7IiRyZWYiOiI3MiJ9fSwiRGF0ZUZvcm1hdCI6eyIkcmVmIjoiNzkifSwiSXNWaXNpYmxlIjp0cnVlLCJQYXJlbnRTdHlsZSI6eyIkcmVmIjoiNTMifX0sIlBvc2l0aW9uIjp7IlJhdGlvIjowLjAsIklzQ3VzdG9tIjpmYWxzZX0sIklkIjoiNjEzODlmNWItMzViMy00M2FhLWE1ZjYtMTY5MTRhNDA2N2IwIiwiSW1wb3J0SWQiOm51bGwsIlRpdGxlIjoicGFyZWlsIHBvdXIgbCfDqWR1Y2F0aW9uIiwiTm90ZSI6bnVsbCwiSHlwZXJsaW5rIjpudWxsLCJJc0NoYW5nZWQiOmZhbHNlLCJJc05ldyI6ZmFsc2V9XSwiVGFza3MiOlt7IiRpZCI6IjE5OCIsIkdyb3VwTmFtZSI6bnVsbCwiU3RhcnREYXRlIjoiMjAxNy0wMS0yMFQwMDowMDowMFoiLCJFbmREYXRlIjoiMjAxNy0wMS0zMFQyMzo1OTo1OS45OTlaIiwiUGVyY2VudGFnZUNvbXBsZXRlIjpudWxsLCJTdHlsZSI6eyIkaWQiOiIxOTkiLCJTaGFwZSI6MCwiU2hhcGVUaGlja25lc3MiOjEsIkR1cmF0aW9uRm9ybWF0IjowLCJJbmNsdWRlTm9uV29ya2luZ0RheXNJbkR1cmF0aW9uIjp0cnVlLCJQZXJjZW50YWdlQ29tcGxldGVTdHlsZSI6eyIkaWQiOiIyMDAiLCJGb250U2V0dGluZ3MiOnsiJGlkIjoiMjAxIiwiRm9udFNpemUiOjEwLCJGb250TmFtZSI6IkNhbGlicmkiLCJJc0JvbGQiOmZhbHNlLCJJc0l0YWxpYyI6ZmFsc2UsIklzVW5kZXJsaW5lZCI6ZmFsc2UsIlBhcmVudFN0eWxlIjp7IiRyZWYiOiI4MiJ9fSwiQXV0b1NpemUiOjAsIkZvcmVncm91bmQiOnsiJHJlZiI6IjgzIn0sIk1heFdpZHRoIjoyMDAuMCwiTWF4SGVpZ2h0IjoiSW5maW5pdHkiLCJTbWFydEZvcmVncm91bmRJc0FjdGl2ZSI6ZmFsc2UsIkhvcml6b250YWxBbGlnbm1lbnQiOjAsIlZlcnRpY2FsQWxpZ25tZW50IjowLCJTbWFydEZvcmVncm91bmQiOm51bGwsIk1hcmdpbiI6eyIkcmVmIjoiODUifSwiUGFkZGluZyI6eyIkcmVmIjoiODYifSwiQmFja2dyb3VuZCI6eyIkcmVmIjoiODcifSwiSXNWaXNpYmxlIjp0cnVlLCJXaWR0aCI6MC4wLCJIZWlnaHQiOjAuMCwiQm9yZGVyU3R5bGUiOnsiJGlkIjoiMjAyIiwiTGluZUNvbG9yIjpudWxsLCJMaW5lV2VpZ2h0IjowLjAsIkxpbmVUeXBlIjowLCJQYXJlbnRTdHlsZSI6bnVsbH0sIlBhcmVudFN0eWxlIjp7IiRyZWYiOiI4MSJ9fSwiRHVyYXRpb25TdHlsZSI6eyIkaWQiOiIyMDMiLCJGb250U2V0dGluZ3MiOnsiJGlkIjoiMjA0IiwiRm9udFNpemUiOjEwLCJGb250TmFtZSI6IkNhbGlicmkiLCJJc0JvbGQiOmZhbHNlLCJJc0l0YWxpYyI6ZmFsc2UsIklzVW5kZXJsaW5lZCI6ZmFsc2UsIlBhcmVudFN0eWxlIjp7IiRyZWYiOiI4OSJ9fSwiQXV0b1NpemUiOjAsIkZvcmVncm91bmQiOnsiJHJlZiI6IjkwIn0sIk1heFdpZHRoIjoyMDAuMCwiTWF4SGVpZ2h0IjoiSW5maW5pdHkiLCJTbWFydEZvcmVncm91bmRJc0FjdGl2ZSI6ZmFsc2UsIkhvcml6b250YWxBbGlnbm1lbnQiOjAsIlZlcnRpY2FsQWxpZ25tZW50IjowLCJTbWFydEZvcmVncm91bmQiOm51bGwsIk1hcmdpbiI6eyIkcmVmIjoiOTIifSwiUGFkZGluZyI6eyIkcmVmIjoiOTMifSwiQmFja2dyb3VuZCI6eyIkcmVmIjoiOTQifSwiSXNWaXNpYmxlIjp0cnVlLCJXaWR0aCI6MC4wLCJIZWlnaHQiOjAuMCwiQm9yZGVyU3R5bGUiOnsiJGlkIjoiMjA1IiwiTGluZUNvbG9yIjpudWxsLCJMaW5lV2VpZ2h0IjowLjAsIkxpbmVUeXBlIjowLCJQYXJlbnRTdHlsZSI6bnVsbH0sIlBhcmVudFN0eWxlIjp7IiRyZWYiOiI4OCJ9fSwiSG9yaXpvbnRhbENvbm5lY3RvclN0eWxlIjp7IiRpZCI6IjIwNiIsIkxpbmVDb2xvciI6eyIkcmVmIjoiOTYifSwiTGluZVdlaWdodCI6MS4wLCJMaW5lVHlwZSI6MCwiUGFyZW50U3R5bGUiOnsiJHJlZiI6Ijk1In19LCJWZXJ0aWNhbENvbm5lY3RvclN0eWxlIjp7IiRpZCI6IjIwNyIsIkxpbmVDb2xvciI6eyIkcmVmIjoiOTkifSwiTGluZVdlaWdodCI6MC4wLCJMaW5lVHlwZSI6MCwiUGFyZW50U3R5bGUiOnsiJHJlZiI6Ijk4In19LCJNYXJnaW4iOm51bGwsIlN0YXJ0RGF0ZVBvc2l0aW9uIjo0LCJFbmREYXRlUG9zaXRpb24iOjQsIlRpdGxlUG9zaXRpb24iOjUsIkR1cmF0aW9uUG9zaXRpb24iOjYsIlBlcmNlbnRhZ2VDb21wbGV0ZWRQb3NpdGlvbiI6NiwiU3BhY2luZyI6NSwiSXNCZWxvd1RpbWViYW5kIjp0cnVlLCJQZXJjZW50YWdlQ29tcGxldGVTaGFwZU9wYWNpdHkiOjM1LCJTaGFwZVN0eWxlIjp7IiRpZCI6IjIwOCIsIk1hcmdpbiI6eyIkcmVmIjoiMTAyIn0sIlBhZGRpbmciOnsiJHJlZiI6IjEwMyJ9LCJCYWNrZ3JvdW5kIjp7IiRpZCI6IjIwOSIsIkNvbG9yIjp7IiRpZCI6IjIxMCIsIkEiOjI1NSwiUiI6MCwiRyI6MTE0LCJCIjoxODh9fSwiSXNWaXNpYmxlIjp0cnVlLCJXaWR0aCI6MC4wLCJIZWlnaHQiOjE2LjAsIkJvcmRlclN0eWxlIjp7IiRpZCI6IjIxMSIsIkxpbmVDb2xvciI6eyIkcmVmIjoiMTA1In0sIkxpbmVXZWlnaHQiOjAuMCwiTGluZVR5cGUiOjAsIlBhcmVudFN0eWxlIjp7IiRyZWYiOiIxMDQifX0sIlBhcmVudFN0eWxlIjp7IiRyZWYiOiIxMDEifX0sIlRpdGxlU3R5bGUiOnsiJGlkIjoiMjEyIiwiRm9udFNldHRpbmdzIjp7IiRpZCI6IjIxMyIsIkZvbnRTaXplIjoxMSwiRm9udE5hbWUiOiJDYWxpYnJpIiwiSXNCb2xkIjp0cnVlLCJJc0l0YWxpYyI6ZmFsc2UsIklzVW5kZXJsaW5lZCI6ZmFsc2UsIlBhcmVudFN0eWxlIjp7IiRyZWYiOiIxMDgifX0sIkF1dG9TaXplIjowLCJGb3JlZ3JvdW5kIjp7IiRyZWYiOiIxMDkifSwiTWF4V2lkdGgiOjcyMC4wLCJNYXhIZWlnaHQiOiJJbmZpbml0eSIsIlNtYXJ0Rm9yZWdyb3VuZElzQWN0aXZlIjpmYWxzZSwiSG9yaXpvbnRhbEFsaWdubWVudCI6MCwiVmVydGljYWxBbGlnbm1lbnQiOjAsIlNtYXJ0Rm9yZWdyb3VuZCI6bnVsbCwiTWFyZ2luIjp7IiRyZWYiOiIxMTEifSwiUGFkZGluZyI6eyIkcmVmIjoiMTEyIn0sIkJhY2tncm91bmQiOnsiJHJlZiI6IjExMyJ9LCJJc1Zpc2libGUiOnRydWUsIldpZHRoIjowLjAsIkhlaWdodCI6MC4wLCJCb3JkZXJTdHlsZSI6eyIkaWQiOiIyMTQiLCJMaW5lQ29sb3IiOm51bGwsIkxpbmVXZWlnaHQiOjAuMCwiTGluZVR5cGUiOjAsIlBhcmVudFN0eWxlIjpudWxsfSwiUGFyZW50U3R5bGUiOnsiJHJlZiI6IjEwNyJ9fSwiRGF0ZVN0eWxlIjp7IiRpZCI6IjIxNSIsIkZvbnRTZXR0aW5ncyI6eyIkaWQiOiIyMTYiLCJGb250U2l6ZSI6MTAsIkZvbnROYW1lIjoiQ2FsaWJyaSIsIklzQm9sZCI6ZmFsc2UsIklzSXRhbGljIjpmYWxzZSwiSXNVbmRlcmxpbmVkIjpmYWxzZSwiUGFyZW50U3R5bGUiOnsiJHJlZiI6IjExNSJ9fSwiQXV0b1NpemUiOjAsIkZvcmVncm91bmQiOnsiJHJlZiI6IjExNiJ9LCJNYXhXaWR0aCI6MjAwLjAsIk1heEhlaWdodCI6IkluZmluaXR5IiwiU21hcnRGb3JlZ3JvdW5kSXNBY3RpdmUiOmZhbHNlLCJIb3Jpem9udGFsQWxpZ25tZW50IjowLCJWZXJ0aWNhbEFsaWdubWVudCI6MCwiU21hcnRGb3JlZ3JvdW5kIjpudWxsLCJNYXJnaW4iOnsiJHJlZiI6IjExOCJ9LCJQYWRkaW5nIjp7IiRyZWYiOiIxMTkifSwiQmFja2dyb3VuZCI6eyIkcmVmIjoiMTIwIn0sIklzVmlzaWJsZSI6dHJ1ZSwiV2lkdGgiOjAuMCwiSGVpZ2h0IjowLjAsIkJvcmRlclN0eWxlIjp7IiRpZCI6IjIxNyIsIkxpbmVDb2xvciI6bnVsbCwiTGluZVdlaWdodCI6MC4wLCJMaW5lVHlwZSI6MCwiUGFyZW50U3R5bGUiOm51bGx9LCJQYXJlbnRTdHlsZSI6eyIkcmVmIjoiMTE0In19LCJEYXRlRm9ybWF0Ijp7IiRyZWYiOiIxMjEifSwiSXNWaXNpYmxlIjp0cnVlLCJQYXJlbnRTdHlsZSI6eyIkcmVmIjoiODAifX0sIkluZGV4IjoxLCJJZCI6ImRiNTk3Y2M5LTEyZjItNGI2ZS1hYmJmLWVhODM4Zjg4MDdiNyIsIkltcG9ydElkIjpudWxsLCJUaXRsZSI6IkNyw6lhdGlvbiBkdSBpUHl0aG9uIE5vdGVib29rIGV0IDHDqHJlIGFuYWx5c2UgZGVzIGRvbm7DqWVzIiwiTm90ZSI6bnVsbCwiSHlwZXJsaW5rIjpudWxsLCJJc0NoYW5nZWQiOmZhbHNlLCJJc05ldyI6ZmFsc2V9LHsiJGlkIjoiMjE4IiwiR3JvdXBOYW1lIjpudWxsLCJTdGFydERhdGUiOiIyMDE3LTAxLTMxVDAwOjAwOjAwWiIsIkVuZERhdGUiOiIyMDE3LTAyLTEwVDIzOjU5OjU5Ljk5OVoiLCJQZXJjZW50YWdlQ29tcGxldGUiOm51bGwsIlN0eWxlIjp7IiRpZCI6IjIxOSIsIlNoYXBlIjowLCJTaGFwZVRoaWNrbmVzcyI6MSwiRHVyYXRpb25Gb3JtYXQiOjAsIkluY2x1ZGVOb25Xb3JraW5nRGF5c0luRHVyYXRpb24iOnRydWUsIlBlcmNlbnRhZ2VDb21wbGV0ZVN0eWxlIjp7IiRpZCI6IjIyMCIsIkZvbnRTZXR0aW5ncyI6eyIkaWQiOiIyMjEiLCJGb250U2l6ZSI6MTAsIkZvbnROYW1lIjoiQ2FsaWJyaSIsIklzQm9sZCI6ZmFsc2UsIklzSXRhbGljIjpmYWxzZSwiSXNVbmRlcmxpbmVkIjpmYWxzZSwiUGFyZW50U3R5bGUiOnsiJHJlZiI6IjgyIn19LCJBdXRvU2l6ZSI6MCwiRm9yZWdyb3VuZCI6eyIkcmVmIjoiODMifSwiTWF4V2lkdGgiOjIwMC4wLCJNYXhIZWlnaHQiOiJJbmZpbml0eSIsIlNtYXJ0Rm9yZWdyb3VuZElzQWN0aXZlIjpmYWxzZSwiSG9yaXpvbnRhbEFsaWdubWVudCI6MCwiVmVydGljYWxBbGlnbm1lbnQiOjAsIlNtYXJ0Rm9yZWdyb3VuZCI6bnVsbCwiTWFyZ2luIjp7IiRyZWYiOiI4NSJ9LCJQYWRkaW5nIjp7IiRyZWYiOiI4NiJ9LCJCYWNrZ3JvdW5kIjp7IiRyZWYiOiI4NyJ9LCJJc1Zpc2libGUiOnRydWUsIldpZHRoIjowLjAsIkhlaWdodCI6MC4wLCJCb3JkZXJTdHlsZSI6eyIkaWQiOiIyMjIiLCJMaW5lQ29sb3IiOm51bGwsIkxpbmVXZWlnaHQiOjAuMCwiTGluZVR5cGUiOjAsIlBhcmVudFN0eWxlIjpudWxsfSwiUGFyZW50U3R5bGUiOnsiJHJlZiI6IjgxIn19LCJEdXJhdGlvblN0eWxlIjp7IiRpZCI6IjIyMyIsIkZvbnRTZXR0aW5ncyI6eyIkaWQiOiIyMjQiLCJGb250U2l6ZSI6MTAsIkZvbnROYW1lIjoiQ2FsaWJyaSIsIklzQm9sZCI6ZmFsc2UsIklzSXRhbGljIjpmYWxzZSwiSXNVbmRlcmxpbmVkIjpmYWxzZSwiUGFyZW50U3R5bGUiOnsiJHJlZiI6Ijg5In19LCJBdXRvU2l6ZSI6MCwiRm9yZWdyb3VuZCI6eyIkcmVmIjoiOTAifSwiTWF4V2lkdGgiOjIwMC4wLCJNYXhIZWlnaHQiOiJJbmZpbml0eSIsIlNtYXJ0Rm9yZWdyb3VuZElzQWN0aXZlIjpmYWxzZSwiSG9yaXpvbnRhbEFsaWdubWVudCI6MCwiVmVydGljYWxBbGlnbm1lbnQiOjAsIlNtYXJ0Rm9yZWdyb3VuZCI6bnVsbCwiTWFyZ2luIjp7IiRyZWYiOiI5MiJ9LCJQYWRkaW5nIjp7IiRyZWYiOiI5MyJ9LCJCYWNrZ3JvdW5kIjp7IiRyZWYiOiI5NCJ9LCJJc1Zpc2libGUiOnRydWUsIldpZHRoIjowLjAsIkhlaWdodCI6MC4wLCJCb3JkZXJTdHlsZSI6eyIkaWQiOiIyMjUiLCJMaW5lQ29sb3IiOm51bGwsIkxpbmVXZWlnaHQiOjAuMCwiTGluZVR5cGUiOjAsIlBhcmVudFN0eWxlIjpudWxsfSwiUGFyZW50U3R5bGUiOnsiJHJlZiI6Ijg4In19LCJIb3Jpem9udGFsQ29ubmVjdG9yU3R5bGUiOnsiJGlkIjoiMjI2IiwiTGluZUNvbG9yIjp7IiRyZWYiOiI5NiJ9LCJMaW5lV2VpZ2h0IjoxLjAsIkxpbmVUeXBlIjowLCJQYXJlbnRTdHlsZSI6eyIkcmVmIjoiOTUifX0sIlZlcnRpY2FsQ29ubmVjdG9yU3R5bGUiOnsiJGlkIjoiMjI3IiwiTGluZUNvbG9yIjp7IiRyZWYiOiI5OSJ9LCJMaW5lV2VpZ2h0IjowLjAsIkxpbmVUeXBlIjowLCJQYXJlbnRTdHlsZSI6eyIkcmVmIjoiOTgifX0sIk1hcmdpbiI6bnVsbCwiU3RhcnREYXRlUG9zaXRpb24iOjQsIkVuZERhdGVQb3NpdGlvbiI6NCwiVGl0bGVQb3NpdGlvbiI6NSwiRHVyYXRpb25Qb3NpdGlvbiI6NiwiUGVyY2VudGFnZUNvbXBsZXRlZFBvc2l0aW9uIjo2LCJTcGFjaW5nIjo1LCJJc0JlbG93VGltZWJhbmQiOnRydWUsIlBlcmNlbnRhZ2VDb21wbGV0ZVNoYXBlT3BhY2l0eSI6MzUsIlNoYXBlU3R5bGUiOnsiJGlkIjoiMjI4IiwiTWFyZ2luIjp7IiRyZWYiOiIxMDIifSwiUGFkZGluZyI6eyIkcmVmIjoiMTAzIn0sIkJhY2tncm91bmQiOnsiJGlkIjoiMjI5IiwiQ29sb3IiOnsiJGlkIjoiMjMwIiwiQSI6MjU1LCJSIjo5MSwiRyI6MTU1LCJCIjoyMTN9fSwiSXNWaXNpYmxlIjp0cnVlLCJXaWR0aCI6MC4wLCJIZWlnaHQiOjE2LjAsIkJvcmRlclN0eWxlIjp7IiRpZCI6IjIzMSIsIkxpbmVDb2xvciI6eyIkcmVmIjoiMTA1In0sIkxpbmVXZWlnaHQiOjAuMCwiTGluZVR5cGUiOjAsIlBhcmVudFN0eWxlIjp7IiRyZWYiOiIxMDQifX0sIlBhcmVudFN0eWxlIjp7IiRyZWYiOiIxMDEifX0sIlRpdGxlU3R5bGUiOnsiJGlkIjoiMjMyIiwiRm9udFNldHRpbmdzIjp7IiRpZCI6IjIzMyIsIkZvbnRTaXplIjoxMSwiRm9udE5hbWUiOiJDYWxpYnJpIiwiSXNCb2xkIjp0cnVlLCJJc0l0YWxpYyI6ZmFsc2UsIklzVW5kZXJsaW5lZCI6ZmFsc2UsIlBhcmVudFN0eWxlIjp7IiRyZWYiOiIxMDgifX0sIkF1dG9TaXplIjowLCJGb3JlZ3JvdW5kIjp7IiRyZWYiOiIxMDkifSwiTWF4V2lkdGgiOjcyMC4wLCJNYXhIZWlnaHQiOiJJbmZpbml0eSIsIlNtYXJ0Rm9yZWdyb3VuZElzQWN0aXZlIjpmYWxzZSwiSG9yaXpvbnRhbEFsaWdubWVudCI6MCwiVmVydGljYWxBbGlnbm1lbnQiOjAsIlNtYXJ0Rm9yZWdyb3VuZCI6bnVsbCwiTWFyZ2luIjp7IiRyZWYiOiIxMTEifSwiUGFkZGluZyI6eyIkcmVmIjoiMTEyIn0sIkJhY2tncm91bmQiOnsiJHJlZiI6IjExMyJ9LCJJc1Zpc2libGUiOnRydWUsIldpZHRoIjowLjAsIkhlaWdodCI6MC4wLCJCb3JkZXJTdHlsZSI6eyIkaWQiOiIyMzQiLCJMaW5lQ29sb3IiOm51bGwsIkxpbmVXZWlnaHQiOjAuMCwiTGluZVR5cGUiOjAsIlBhcmVudFN0eWxlIjpudWxsfSwiUGFyZW50U3R5bGUiOnsiJHJlZiI6IjEwNyJ9fSwiRGF0ZVN0eWxlIjp7IiRpZCI6IjIzNSIsIkZvbnRTZXR0aW5ncyI6eyIkaWQiOiIyMzYiLCJGb250U2l6ZSI6MTAsIkZvbnROYW1lIjoiQ2FsaWJyaSIsIklzQm9sZCI6ZmFsc2UsIklzSXRhbGljIjpmYWxzZSwiSXNVbmRlcmxpbmVkIjpmYWxzZSwiUGFyZW50U3R5bGUiOnsiJHJlZiI6IjExNSJ9fSwiQXV0b1NpemUiOjAsIkZvcmVncm91bmQiOnsiJHJlZiI6IjExNiJ9LCJNYXhXaWR0aCI6MjAwLjAsIk1heEhlaWdodCI6IkluZmluaXR5IiwiU21hcnRGb3JlZ3JvdW5kSXNBY3RpdmUiOmZhbHNlLCJIb3Jpem9udGFsQWxpZ25tZW50IjowLCJWZXJ0aWNhbEFsaWdubWVudCI6MCwiU21hcnRGb3JlZ3JvdW5kIjpudWxsLCJNYXJnaW4iOnsiJHJlZiI6IjExOCJ9LCJQYWRkaW5nIjp7IiRyZWYiOiIxMTkifSwiQmFja2dyb3VuZCI6eyIkcmVmIjoiMTIwIn0sIklzVmlzaWJsZSI6dHJ1ZSwiV2lkdGgiOjAuMCwiSGVpZ2h0IjowLjAsIkJvcmRlclN0eWxlIjp7IiRpZCI6IjIzNyIsIkxpbmVDb2xvciI6bnVsbCwiTGluZVdlaWdodCI6MC4wLCJMaW5lVHlwZSI6MCwiUGFyZW50U3R5bGUiOm51bGx9LCJQYXJlbnRTdHlsZSI6eyIkcmVmIjoiMTE0In19LCJEYXRlRm9ybWF0Ijp7IiRyZWYiOiIxMjEifSwiSXNWaXNpYmxlIjp0cnVlLCJQYXJlbnRTdHlsZSI6eyIkcmVmIjoiODAifX0sIkluZGV4IjoyLCJJZCI6Ijk1MTY1Y2U5LTZkNzItNGMzOS1hMThiLTQzMDM1NjlhNDgxMSIsIkltcG9ydElkIjpudWxsLCJUaXRsZSI6IkZpbmFsaXNhdGlvbiBkZSBsYSAxw6hyZSBwYXJ0aWUgYXZlYyBjYWxjdWwgZGUgbGEgcsOpZ3Jlc3Npb24gbGluw6lhaXJlIiwiTm90ZSI6bnVsbCwiSHlwZXJsaW5rIjpudWxsLCJJc0NoYW5nZWQiOmZhbHNlLCJJc05ldyI6ZmFsc2V9LHsiJGlkIjoiMjM4IiwiR3JvdXBOYW1lIjpudWxsLCJTdGFydERhdGUiOiIyMDE3LTAyLTExVDAwOjAwOjAwWiIsIkVuZERhdGUiOiIyMDE3LTAyLTIwVDIzOjU5OjU5Ljk5OVoiLCJQZXJjZW50YWdlQ29tcGxldGUiOm51bGwsIlN0eWxlIjp7IiRpZCI6IjIzOSIsIlNoYXBlIjowLCJTaGFwZVRoaWNrbmVzcyI6MSwiRHVyYXRpb25Gb3JtYXQiOjAsIkluY2x1ZGVOb25Xb3JraW5nRGF5c0luRHVyYXRpb24iOnRydWUsIlBlcmNlbnRhZ2VDb21wbGV0ZVN0eWxlIjp7IiRpZCI6IjI0MCIsIkZvbnRTZXR0aW5ncyI6eyIkaWQiOiIyNDEiLCJGb250U2l6ZSI6MTAsIkZvbnROYW1lIjoiQ2FsaWJyaSIsIklzQm9sZCI6ZmFsc2UsIklzSXRhbGljIjpmYWxzZSwiSXNVbmRlcmxpbmVkIjpmYWxzZSwiUGFyZW50U3R5bGUiOnsiJHJlZiI6IjgyIn19LCJBdXRvU2l6ZSI6MCwiRm9yZWdyb3VuZCI6eyIkcmVmIjoiODMifSwiTWF4V2lkdGgiOjIwMC4wLCJNYXhIZWlnaHQiOiJJbmZpbml0eSIsIlNtYXJ0Rm9yZWdyb3VuZElzQWN0aXZlIjpmYWxzZSwiSG9yaXpvbnRhbEFsaWdubWVudCI6MCwiVmVydGljYWxBbGlnbm1lbnQiOjAsIlNtYXJ0Rm9yZWdyb3VuZCI6bnVsbCwiTWFyZ2luIjp7IiRyZWYiOiI4NSJ9LCJQYWRkaW5nIjp7IiRyZWYiOiI4NiJ9LCJCYWNrZ3JvdW5kIjp7IiRyZWYiOiI4NyJ9LCJJc1Zpc2libGUiOnRydWUsIldpZHRoIjowLjAsIkhlaWdodCI6MC4wLCJCb3JkZXJTdHlsZSI6eyIkaWQiOiIyNDIiLCJMaW5lQ29sb3IiOm51bGwsIkxpbmVXZWlnaHQiOjAuMCwiTGluZVR5cGUiOjAsIlBhcmVudFN0eWxlIjpudWxsfSwiUGFyZW50U3R5bGUiOnsiJHJlZiI6IjgxIn19LCJEdXJhdGlvblN0eWxlIjp7IiRpZCI6IjI0MyIsIkZvbnRTZXR0aW5ncyI6eyIkaWQiOiIyNDQiLCJGb250U2l6ZSI6MTAsIkZvbnROYW1lIjoiQ2FsaWJyaSIsIklzQm9sZCI6ZmFsc2UsIklzSXRhbGljIjpmYWxzZSwiSXNVbmRlcmxpbmVkIjpmYWxzZSwiUGFyZW50U3R5bGUiOnsiJHJlZiI6Ijg5In19LCJBdXRvU2l6ZSI6MCwiRm9yZWdyb3VuZCI6eyIkcmVmIjoiOTAifSwiTWF4V2lkdGgiOjIwMC4wLCJNYXhIZWlnaHQiOiJJbmZpbml0eSIsIlNtYXJ0Rm9yZWdyb3VuZElzQWN0aXZlIjpmYWxzZSwiSG9yaXpvbnRhbEFsaWdubWVudCI6MCwiVmVydGljYWxBbGlnbm1lbnQiOjAsIlNtYXJ0Rm9yZWdyb3VuZCI6bnVsbCwiTWFyZ2luIjp7IiRyZWYiOiI5MiJ9LCJQYWRkaW5nIjp7IiRyZWYiOiI5MyJ9LCJCYWNrZ3JvdW5kIjp7IiRyZWYiOiI5NCJ9LCJJc1Zpc2libGUiOnRydWUsIldpZHRoIjowLjAsIkhlaWdodCI6MC4wLCJCb3JkZXJTdHlsZSI6eyIkaWQiOiIyNDUiLCJMaW5lQ29sb3IiOm51bGwsIkxpbmVXZWlnaHQiOjAuMCwiTGluZVR5cGUiOjAsIlBhcmVudFN0eWxlIjpudWxsfSwiUGFyZW50U3R5bGUiOnsiJHJlZiI6Ijg4In19LCJIb3Jpem9udGFsQ29ubmVjdG9yU3R5bGUiOnsiJGlkIjoiMjQ2IiwiTGluZUNvbG9yIjp7IiRyZWYiOiI5NiJ9LCJMaW5lV2VpZ2h0IjoxLjAsIkxpbmVUeXBlIjowLCJQYXJlbnRTdHlsZSI6eyIkcmVmIjoiOTUifX0sIlZlcnRpY2FsQ29ubmVjdG9yU3R5bGUiOnsiJGlkIjoiMjQ3IiwiTGluZUNvbG9yIjp7IiRyZWYiOiI5OSJ9LCJMaW5lV2VpZ2h0IjowLjAsIkxpbmVUeXBlIjowLCJQYXJlbnRTdHlsZSI6eyIkcmVmIjoiOTgifX0sIk1hcmdpbiI6bnVsbCwiU3RhcnREYXRlUG9zaXRpb24iOjQsIkVuZERhdGVQb3NpdGlvbiI6NCwiVGl0bGVQb3NpdGlvbiI6NSwiRHVyYXRpb25Qb3NpdGlvbiI6NiwiUGVyY2VudGFnZUNvbXBsZXRlZFBvc2l0aW9uIjo2LCJTcGFjaW5nIjo1LCJJc0JlbG93VGltZWJhbmQiOnRydWUsIlBlcmNlbnRhZ2VDb21wbGV0ZVNoYXBlT3BhY2l0eSI6MzUsIlNoYXBlU3R5bGUiOnsiJGlkIjoiMjQ4IiwiTWFyZ2luIjp7IiRyZWYiOiIxMDIifSwiUGFkZGluZyI6eyIkcmVmIjoiMTAzIn0sIkJhY2tncm91bmQiOnsiJGlkIjoiMjQ5IiwiQ29sb3IiOnsiJGlkIjoiMjUwIiwiQSI6MjU1LCJSIjoyMzcsIkciOjEyNSwiQiI6NDl9fSwiSXNWaXNpYmxlIjp0cnVlLCJXaWR0aCI6MC4wLCJIZWlnaHQiOjE2LjAsIkJvcmRlclN0eWxlIjp7IiRpZCI6IjI1MSIsIkxpbmVDb2xvciI6eyIkcmVmIjoiMTA1In0sIkxpbmVXZWlnaHQiOjAuMCwiTGluZVR5cGUiOjAsIlBhcmVudFN0eWxlIjp7IiRyZWYiOiIxMDQifX0sIlBhcmVudFN0eWxlIjp7IiRyZWYiOiIxMDEifX0sIlRpdGxlU3R5bGUiOnsiJGlkIjoiMjUyIiwiRm9udFNldHRpbmdzIjp7IiRpZCI6IjI1MyIsIkZvbnRTaXplIjoxMSwiRm9udE5hbWUiOiJDYWxpYnJpIiwiSXNCb2xkIjp0cnVlLCJJc0l0YWxpYyI6ZmFsc2UsIklzVW5kZXJsaW5lZCI6ZmFsc2UsIlBhcmVudFN0eWxlIjp7IiRyZWYiOiIxMDgifX0sIkF1dG9TaXplIjowLCJGb3JlZ3JvdW5kIjp7IiRyZWYiOiIxMDkifSwiTWF4V2lkdGgiOjcyMC4wLCJNYXhIZWlnaHQiOiJJbmZpbml0eSIsIlNtYXJ0Rm9yZWdyb3VuZElzQWN0aXZlIjpmYWxzZSwiSG9yaXpvbnRhbEFsaWdubWVudCI6MCwiVmVydGljYWxBbGlnbm1lbnQiOjAsIlNtYXJ0Rm9yZWdyb3VuZCI6bnVsbCwiTWFyZ2luIjp7IiRyZWYiOiIxMTEifSwiUGFkZGluZyI6eyIkcmVmIjoiMTEyIn0sIkJhY2tncm91bmQiOnsiJHJlZiI6IjExMyJ9LCJJc1Zpc2libGUiOnRydWUsIldpZHRoIjowLjAsIkhlaWdodCI6MC4wLCJCb3JkZXJTdHlsZSI6eyIkaWQiOiIyNTQiLCJMaW5lQ29sb3IiOm51bGwsIkxpbmVXZWlnaHQiOjAuMCwiTGluZVR5cGUiOjAsIlBhcmVudFN0eWxlIjpudWxsfSwiUGFyZW50U3R5bGUiOnsiJHJlZiI6IjEwNyJ9fSwiRGF0ZVN0eWxlIjp7IiRpZCI6IjI1NSIsIkZvbnRTZXR0aW5ncyI6eyIkaWQiOiIyNTYiLCJGb250U2l6ZSI6MTAsIkZvbnROYW1lIjoiQ2FsaWJyaSIsIklzQm9sZCI6ZmFsc2UsIklzSXRhbGljIjpmYWxzZSwiSXNVbmRlcmxpbmVkIjpmYWxzZSwiUGFyZW50U3R5bGUiOnsiJHJlZiI6IjExNSJ9fSwiQXV0b1NpemUiOjAsIkZvcmVncm91bmQiOnsiJHJlZiI6IjExNiJ9LCJNYXhXaWR0aCI6MjAwLjAsIk1heEhlaWdodCI6IkluZmluaXR5IiwiU21hcnRGb3JlZ3JvdW5kSXNBY3RpdmUiOmZhbHNlLCJIb3Jpem9udGFsQWxpZ25tZW50IjowLCJWZXJ0aWNhbEFsaWdubWVudCI6MCwiU21hcnRGb3JlZ3JvdW5kIjpudWxsLCJNYXJnaW4iOnsiJHJlZiI6IjExOCJ9LCJQYWRkaW5nIjp7IiRyZWYiOiIxMTkifSwiQmFja2dyb3VuZCI6eyIkcmVmIjoiMTIwIn0sIklzVmlzaWJsZSI6dHJ1ZSwiV2lkdGgiOjAuMCwiSGVpZ2h0IjowLjAsIkJvcmRlclN0eWxlIjp7IiRpZCI6IjI1NyIsIkxpbmVDb2xvciI6bnVsbCwiTGluZVdlaWdodCI6MC4wLCJMaW5lVHlwZSI6MCwiUGFyZW50U3R5bGUiOm51bGx9LCJQYXJlbnRTdHlsZSI6eyIkcmVmIjoiMTE0In19LCJEYXRlRm9ybWF0Ijp7IiRyZWYiOiIxMjEifSwiSXNWaXNpYmxlIjp0cnVlLCJQYXJlbnRTdHlsZSI6eyIkcmVmIjoiODAifX0sIkluZGV4IjozLCJJZCI6ImZiYWM5YTQzLWI1NWYtNDY5Ny04NWNkLWU4MDYyMjNhY2FhNyIsIkltcG9ydElkIjpudWxsLCJUaXRsZSI6IkFqb3V0IGRlcyBkb25uw6llcyBJbnRlcnZlbnRpb25zIFRyYXZhaWxsZXVycyBzb2NpYXV4IiwiTm90ZSI6bnVsbCwiSHlwZXJsaW5rIjpudWxsLCJJc0NoYW5nZWQiOmZhbHNlLCJJc05ldyI6ZmFsc2V9LHsiJGlkIjoiMjU4IiwiR3JvdXBOYW1lIjpudWxsLCJTdGFydERhdGUiOiIyMDE3LTAyLTIxVDAwOjAwOjAwWiIsIkVuZERhdGUiOiIyMDE3LTAzLTAxVDIzOjU5OjU5Ljk5OVoiLCJQZXJjZW50YWdlQ29tcGxldGUiOm51bGwsIlN0eWxlIjp7IiRpZCI6IjI1OSIsIlNoYXBlIjowLCJTaGFwZVRoaWNrbmVzcyI6MSwiRHVyYXRpb25Gb3JtYXQiOjAsIkluY2x1ZGVOb25Xb3JraW5nRGF5c0luRHVyYXRpb24iOnRydWUsIlBlcmNlbnRhZ2VDb21wbGV0ZVN0eWxlIjp7IiRpZCI6IjI2MCIsIkZvbnRTZXR0aW5ncyI6eyIkaWQiOiIyNjEiLCJGb250U2l6ZSI6MTAsIkZvbnROYW1lIjoiQ2FsaWJyaSIsIklzQm9sZCI6ZmFsc2UsIklzSXRhbGljIjpmYWxzZSwiSXNVbmRlcmxpbmVkIjpmYWxzZSwiUGFyZW50U3R5bGUiOnsiJHJlZiI6IjgyIn19LCJBdXRvU2l6ZSI6MCwiRm9yZWdyb3VuZCI6eyIkcmVmIjoiODMifSwiTWF4V2lkdGgiOjIwMC4wLCJNYXhIZWlnaHQiOiJJbmZpbml0eSIsIlNtYXJ0Rm9yZWdyb3VuZElzQWN0aXZlIjpmYWxzZSwiSG9yaXpvbnRhbEFsaWdubWVudCI6MCwiVmVydGljYWxBbGlnbm1lbnQiOjAsIlNtYXJ0Rm9yZWdyb3VuZCI6bnVsbCwiTWFyZ2luIjp7IiRyZWYiOiI4NSJ9LCJQYWRkaW5nIjp7IiRyZWYiOiI4NiJ9LCJCYWNrZ3JvdW5kIjp7IiRyZWYiOiI4NyJ9LCJJc1Zpc2libGUiOnRydWUsIldpZHRoIjowLjAsIkhlaWdodCI6MC4wLCJCb3JkZXJTdHlsZSI6eyIkaWQiOiIyNjIiLCJMaW5lQ29sb3IiOm51bGwsIkxpbmVXZWlnaHQiOjAuMCwiTGluZVR5cGUiOjAsIlBhcmVudFN0eWxlIjpudWxsfSwiUGFyZW50U3R5bGUiOnsiJHJlZiI6IjgxIn19LCJEdXJhdGlvblN0eWxlIjp7IiRpZCI6IjI2MyIsIkZvbnRTZXR0aW5ncyI6eyIkaWQiOiIyNjQiLCJGb250U2l6ZSI6MTAsIkZvbnROYW1lIjoiQ2FsaWJyaSIsIklzQm9sZCI6ZmFsc2UsIklzSXRhbGljIjpmYWxzZSwiSXNVbmRlcmxpbmVkIjpmYWxzZSwiUGFyZW50U3R5bGUiOnsiJHJlZiI6Ijg5In19LCJBdXRvU2l6ZSI6MCwiRm9yZWdyb3VuZCI6eyIkcmVmIjoiOTAifSwiTWF4V2lkdGgiOjIwMC4wLCJNYXhIZWlnaHQiOiJJbmZpbml0eSIsIlNtYXJ0Rm9yZWdyb3VuZElzQWN0aXZlIjpmYWxzZSwiSG9yaXpvbnRhbEFsaWdubWVudCI6MCwiVmVydGljYWxBbGlnbm1lbnQiOjAsIlNtYXJ0Rm9yZWdyb3VuZCI6bnVsbCwiTWFyZ2luIjp7IiRyZWYiOiI5MiJ9LCJQYWRkaW5nIjp7IiRyZWYiOiI5MyJ9LCJCYWNrZ3JvdW5kIjp7IiRyZWYiOiI5NCJ9LCJJc1Zpc2libGUiOnRydWUsIldpZHRoIjowLjAsIkhlaWdodCI6MC4wLCJCb3JkZXJTdHlsZSI6eyIkaWQiOiIyNjUiLCJMaW5lQ29sb3IiOm51bGwsIkxpbmVXZWlnaHQiOjAuMCwiTGluZVR5cGUiOjAsIlBhcmVudFN0eWxlIjpudWxsfSwiUGFyZW50U3R5bGUiOnsiJHJlZiI6Ijg4In19LCJIb3Jpem9udGFsQ29ubmVjdG9yU3R5bGUiOnsiJGlkIjoiMjY2IiwiTGluZUNvbG9yIjp7IiRyZWYiOiI5NiJ9LCJMaW5lV2VpZ2h0IjoxLjAsIkxpbmVUeXBlIjowLCJQYXJlbnRTdHlsZSI6eyIkcmVmIjoiOTUifX0sIlZlcnRpY2FsQ29ubmVjdG9yU3R5bGUiOnsiJGlkIjoiMjY3IiwiTGluZUNvbG9yIjp7IiRyZWYiOiI5OSJ9LCJMaW5lV2VpZ2h0IjowLjAsIkxpbmVUeXBlIjowLCJQYXJlbnRTdHlsZSI6eyIkcmVmIjoiOTgifX0sIk1hcmdpbiI6bnVsbCwiU3RhcnREYXRlUG9zaXRpb24iOjQsIkVuZERhdGVQb3NpdGlvbiI6NCwiVGl0bGVQb3NpdGlvbiI6NSwiRHVyYXRpb25Qb3NpdGlvbiI6NiwiUGVyY2VudGFnZUNvbXBsZXRlZFBvc2l0aW9uIjo2LCJTcGFjaW5nIjo1LCJJc0JlbG93VGltZWJhbmQiOnRydWUsIlBlcmNlbnRhZ2VDb21wbGV0ZVNoYXBlT3BhY2l0eSI6MzUsIlNoYXBlU3R5bGUiOnsiJGlkIjoiMjY4IiwiTWFyZ2luIjp7IiRyZWYiOiIxMDIifSwiUGFkZGluZyI6eyIkcmVmIjoiMTAzIn0sIkJhY2tncm91bmQiOnsiJGlkIjoiMjY5IiwiQ29sb3IiOnsiJGlkIjoiMjcwIiwiQSI6MjU1LCJSIjoxNjUsIkciOjE2NSwiQiI6MTY1fX0sIklzVmlzaWJsZSI6dHJ1ZSwiV2lkdGgiOjAuMCwiSGVpZ2h0IjoxNi4wLCJCb3JkZXJTdHlsZSI6eyIkaWQiOiIyNzEiLCJMaW5lQ29sb3IiOnsiJHJlZiI6IjEwNSJ9LCJMaW5lV2VpZ2h0IjowLjAsIkxpbmVUeXBlIjowLCJQYXJlbnRTdHlsZSI6eyIkcmVmIjoiMTA0In19LCJQYXJlbnRTdHlsZSI6eyIkcmVmIjoiMTAxIn19LCJUaXRsZVN0eWxlIjp7IiRpZCI6IjI3MiIsIkZvbnRTZXR0aW5ncyI6eyIkaWQiOiIyNzMiLCJGb250U2l6ZSI6MTEsIkZvbnROYW1lIjoiQ2FsaWJyaSIsIklzQm9sZCI6dHJ1ZSwiSXNJdGFsaWMiOmZhbHNlLCJJc1VuZGVybGluZWQiOmZhbHNlLCJQYXJlbnRTdHlsZSI6eyIkcmVmIjoiMTA4In19LCJBdXRvU2l6ZSI6MCwiRm9yZWdyb3VuZCI6eyIkcmVmIjoiMTA5In0sIk1heFdpZHRoIjo3MjAuMCwiTWF4SGVpZ2h0IjoiSW5maW5pdHkiLCJTbWFydEZvcmVncm91bmRJc0FjdGl2ZSI6ZmFsc2UsIkhvcml6b250YWxBbGlnbm1lbnQiOjAsIlZlcnRpY2FsQWxpZ25tZW50IjowLCJTbWFydEZvcmVncm91bmQiOm51bGwsIk1hcmdpbiI6eyIkcmVmIjoiMTExIn0sIlBhZGRpbmciOnsiJHJlZiI6IjExMiJ9LCJCYWNrZ3JvdW5kIjp7IiRyZWYiOiIxMTMifSwiSXNWaXNpYmxlIjp0cnVlLCJXaWR0aCI6MC4wLCJIZWlnaHQiOjAuMCwiQm9yZGVyU3R5bGUiOnsiJGlkIjoiMjc0IiwiTGluZUNvbG9yIjpudWxsLCJMaW5lV2VpZ2h0IjowLjAsIkxpbmVUeXBlIjowLCJQYXJlbnRTdHlsZSI6bnVsbH0sIlBhcmVudFN0eWxlIjp7IiRyZWYiOiIxMDcifX0sIkRhdGVTdHlsZSI6eyIkaWQiOiIyNzUiLCJGb250U2V0dGluZ3MiOnsiJGlkIjoiMjc2IiwiRm9udFNpemUiOjEwLCJGb250TmFtZSI6IkNhbGlicmkiLCJJc0JvbGQiOmZhbHNlLCJJc0l0YWxpYyI6ZmFsc2UsIklzVW5kZXJsaW5lZCI6ZmFsc2UsIlBhcmVudFN0eWxlIjp7IiRyZWYiOiIxMTUifX0sIkF1dG9TaXplIjowLCJGb3JlZ3JvdW5kIjp7IiRyZWYiOiIxMTYifSwiTWF4V2lkdGgiOjIwMC4wLCJNYXhIZWlnaHQiOiJJbmZpbml0eSIsIlNtYXJ0Rm9yZWdyb3VuZElzQWN0aXZlIjpmYWxzZSwiSG9yaXpvbnRhbEFsaWdubWVudCI6MCwiVmVydGljYWxBbGlnbm1lbnQiOjAsIlNtYXJ0Rm9yZWdyb3VuZCI6bnVsbCwiTWFyZ2luIjp7IiRyZWYiOiIxMTgifSwiUGFkZGluZyI6eyIkcmVmIjoiMTE5In0sIkJhY2tncm91bmQiOnsiJHJlZiI6IjEyMCJ9LCJJc1Zpc2libGUiOnRydWUsIldpZHRoIjowLjAsIkhlaWdodCI6MC4wLCJCb3JkZXJTdHlsZSI6eyIkaWQiOiIyNzciLCJMaW5lQ29sb3IiOm51bGwsIkxpbmVXZWlnaHQiOjAuMCwiTGluZVR5cGUiOjAsIlBhcmVudFN0eWxlIjpudWxsfSwiUGFyZW50U3R5bGUiOnsiJHJlZiI6IjExNCJ9fSwiRGF0ZUZvcm1hdCI6eyIkcmVmIjoiMTIxIn0sIklzVmlzaWJsZSI6dHJ1ZSwiUGFyZW50U3R5bGUiOnsiJHJlZiI6IjgwIn19LCJJbmRleCI6NCwiSWQiOiI2MzllYjQyNS01OTQ5LTQ5ZGUtODkxNS0yZDM0YzJmNTNmYTUiLCJJbXBvcnRJZCI6bnVsbCwiVGl0bGUiOiJBam91dCBkZXMgZG9ubsOpZXMgZGUgbCdlbnNlaWduZW1lbnQiLCJOb3RlIjpudWxsLCJIeXBlcmxpbmsiOm51bGwsIklzQ2hhbmdlZCI6ZmFsc2UsIklzTmV3IjpmYWxzZX1dLCJNc1Byb2plY3RJdGVtc1RyZWUiOnsiJGlkIjoiMjc4IiwiUm9vdCI6eyJJbXBvcnRJZCI6bnVsbCwiSXNJbXBvcnRlZCI6ZmFsc2UsIkNoaWxkcmVuIjpbXX19LCJNZXRhZGF0YSI6eyIkaWQiOiIyNzkifSwiU2V0dGluZ3MiOnsiJGlkIjoiMjgwIiwiSW1wYU9wdGlvbnMiOnsiJGlkIjoiMjgxIiwiTGVmdFRvUmlnaHQiOmZhbHNlLCJQYXlsb2FkT3B0aW9ucyI6Mn0sIlVzZUNvbXByZXNzaW9uIjpmYWxzZSwiQ29tcHJlc2lvblBlcmNlbnRhZ2UiOjAuMCwiSW5hY3RpdmVJbnRlcnZhbFdpZHRoVGhyZXNob2xkIjowLjAsIkluYWN0aXZlSW50ZXJ2YWxXaWR0aCI6MC4wLCJTcGxpdFRhc2tzIjpmYWxzZSwiVXNlQ2x1c3RlciI6ZmFsc2UsIkVwc2lsb24iOjAuMCwiTWluUG9pbnRzVG9Gb3JtQUNsdXN0ZXIiOjAsIkdlbmVyYXRlSW52aXNpYmxlU2hhcGVzIjpmYWxzZSwiU21hcnRUaW1lbGluZVRhc2tQZXJjZW50YWdlRml0IjpmYWxzZX0sIklzTmV3Ijp0cnVlLCJJbXBvcnRUeXBlIjowLCJGaWxlUGF0aCI6bnVsbCwiVGltZWxpbmVJbXBvcnRlZCI6ZmFsc2UsIlRpbWVsaW5lSW1wb3J0ZWRGcm9tRXhjZWwiOmZhbHNlfQ=="/>
   <p:tag name="__MASTER" val="__part_0"/>
 </p:tagLst>
 </file>
@@ -6289,7 +7152,103 @@
 </p:tagLst>
 </file>
 
+<file path=ppt/tags/tag62.xml><?xml version="1.0" encoding="utf-8"?>
+<p:tagLst xmlns:a="http://schemas.openxmlformats.org/drawingml/2006/main" xmlns:r="http://schemas.openxmlformats.org/officeDocument/2006/relationships" xmlns:p="http://schemas.openxmlformats.org/presentationml/2006/main">
+  <p:tag name="OTLMARKERSHAPE" val="OTL"/>
+</p:tagLst>
+</file>
+
+<file path=ppt/tags/tag63.xml><?xml version="1.0" encoding="utf-8"?>
+<p:tagLst xmlns:a="http://schemas.openxmlformats.org/drawingml/2006/main" xmlns:r="http://schemas.openxmlformats.org/officeDocument/2006/relationships" xmlns:p="http://schemas.openxmlformats.org/presentationml/2006/main">
+  <p:tag name="OTLMARKERSHAPE" val="OTL"/>
+</p:tagLst>
+</file>
+
+<file path=ppt/tags/tag64.xml><?xml version="1.0" encoding="utf-8"?>
+<p:tagLst xmlns:a="http://schemas.openxmlformats.org/drawingml/2006/main" xmlns:r="http://schemas.openxmlformats.org/officeDocument/2006/relationships" xmlns:p="http://schemas.openxmlformats.org/presentationml/2006/main">
+  <p:tag name="OTLMARKERSHAPE" val="OTL"/>
+</p:tagLst>
+</file>
+
+<file path=ppt/tags/tag65.xml><?xml version="1.0" encoding="utf-8"?>
+<p:tagLst xmlns:a="http://schemas.openxmlformats.org/drawingml/2006/main" xmlns:r="http://schemas.openxmlformats.org/officeDocument/2006/relationships" xmlns:p="http://schemas.openxmlformats.org/presentationml/2006/main">
+  <p:tag name="OTLMARKERSHAPE" val="OTL"/>
+</p:tagLst>
+</file>
+
+<file path=ppt/tags/tag66.xml><?xml version="1.0" encoding="utf-8"?>
+<p:tagLst xmlns:a="http://schemas.openxmlformats.org/drawingml/2006/main" xmlns:r="http://schemas.openxmlformats.org/officeDocument/2006/relationships" xmlns:p="http://schemas.openxmlformats.org/presentationml/2006/main">
+  <p:tag name="OTLMARKERSHAPE" val="OTL"/>
+</p:tagLst>
+</file>
+
+<file path=ppt/tags/tag67.xml><?xml version="1.0" encoding="utf-8"?>
+<p:tagLst xmlns:a="http://schemas.openxmlformats.org/drawingml/2006/main" xmlns:r="http://schemas.openxmlformats.org/officeDocument/2006/relationships" xmlns:p="http://schemas.openxmlformats.org/presentationml/2006/main">
+  <p:tag name="OTLMARKERSHAPE" val="OTL"/>
+</p:tagLst>
+</file>
+
+<file path=ppt/tags/tag68.xml><?xml version="1.0" encoding="utf-8"?>
+<p:tagLst xmlns:a="http://schemas.openxmlformats.org/drawingml/2006/main" xmlns:r="http://schemas.openxmlformats.org/officeDocument/2006/relationships" xmlns:p="http://schemas.openxmlformats.org/presentationml/2006/main">
+  <p:tag name="OTLMARKERSHAPE" val="OTL"/>
+</p:tagLst>
+</file>
+
+<file path=ppt/tags/tag69.xml><?xml version="1.0" encoding="utf-8"?>
+<p:tagLst xmlns:a="http://schemas.openxmlformats.org/drawingml/2006/main" xmlns:r="http://schemas.openxmlformats.org/officeDocument/2006/relationships" xmlns:p="http://schemas.openxmlformats.org/presentationml/2006/main">
+  <p:tag name="OTLMARKERSHAPE" val="OTL"/>
+</p:tagLst>
+</file>
+
 <file path=ppt/tags/tag7.xml><?xml version="1.0" encoding="utf-8"?>
+<p:tagLst xmlns:a="http://schemas.openxmlformats.org/drawingml/2006/main" xmlns:r="http://schemas.openxmlformats.org/officeDocument/2006/relationships" xmlns:p="http://schemas.openxmlformats.org/presentationml/2006/main">
+  <p:tag name="OTLMARKERSHAPE" val="OTL"/>
+</p:tagLst>
+</file>
+
+<file path=ppt/tags/tag70.xml><?xml version="1.0" encoding="utf-8"?>
+<p:tagLst xmlns:a="http://schemas.openxmlformats.org/drawingml/2006/main" xmlns:r="http://schemas.openxmlformats.org/officeDocument/2006/relationships" xmlns:p="http://schemas.openxmlformats.org/presentationml/2006/main">
+  <p:tag name="OTLMARKERSHAPE" val="OTL"/>
+</p:tagLst>
+</file>
+
+<file path=ppt/tags/tag71.xml><?xml version="1.0" encoding="utf-8"?>
+<p:tagLst xmlns:a="http://schemas.openxmlformats.org/drawingml/2006/main" xmlns:r="http://schemas.openxmlformats.org/officeDocument/2006/relationships" xmlns:p="http://schemas.openxmlformats.org/presentationml/2006/main">
+  <p:tag name="OTLMARKERSHAPE" val="OTL"/>
+</p:tagLst>
+</file>
+
+<file path=ppt/tags/tag72.xml><?xml version="1.0" encoding="utf-8"?>
+<p:tagLst xmlns:a="http://schemas.openxmlformats.org/drawingml/2006/main" xmlns:r="http://schemas.openxmlformats.org/officeDocument/2006/relationships" xmlns:p="http://schemas.openxmlformats.org/presentationml/2006/main">
+  <p:tag name="OTLMARKERSHAPE" val="OTL"/>
+</p:tagLst>
+</file>
+
+<file path=ppt/tags/tag73.xml><?xml version="1.0" encoding="utf-8"?>
+<p:tagLst xmlns:a="http://schemas.openxmlformats.org/drawingml/2006/main" xmlns:r="http://schemas.openxmlformats.org/officeDocument/2006/relationships" xmlns:p="http://schemas.openxmlformats.org/presentationml/2006/main">
+  <p:tag name="OTLMARKERSHAPE" val="OTL"/>
+</p:tagLst>
+</file>
+
+<file path=ppt/tags/tag74.xml><?xml version="1.0" encoding="utf-8"?>
+<p:tagLst xmlns:a="http://schemas.openxmlformats.org/drawingml/2006/main" xmlns:r="http://schemas.openxmlformats.org/officeDocument/2006/relationships" xmlns:p="http://schemas.openxmlformats.org/presentationml/2006/main">
+  <p:tag name="OTLMARKERSHAPE" val="OTL"/>
+</p:tagLst>
+</file>
+
+<file path=ppt/tags/tag75.xml><?xml version="1.0" encoding="utf-8"?>
+<p:tagLst xmlns:a="http://schemas.openxmlformats.org/drawingml/2006/main" xmlns:r="http://schemas.openxmlformats.org/officeDocument/2006/relationships" xmlns:p="http://schemas.openxmlformats.org/presentationml/2006/main">
+  <p:tag name="OTLMARKERSHAPE" val="OTL"/>
+</p:tagLst>
+</file>
+
+<file path=ppt/tags/tag76.xml><?xml version="1.0" encoding="utf-8"?>
+<p:tagLst xmlns:a="http://schemas.openxmlformats.org/drawingml/2006/main" xmlns:r="http://schemas.openxmlformats.org/officeDocument/2006/relationships" xmlns:p="http://schemas.openxmlformats.org/presentationml/2006/main">
+  <p:tag name="OTLMARKERSHAPE" val="OTL"/>
+</p:tagLst>
+</file>
+
+<file path=ppt/tags/tag77.xml><?xml version="1.0" encoding="utf-8"?>
 <p:tagLst xmlns:a="http://schemas.openxmlformats.org/drawingml/2006/main" xmlns:r="http://schemas.openxmlformats.org/officeDocument/2006/relationships" xmlns:p="http://schemas.openxmlformats.org/presentationml/2006/main">
   <p:tag name="OTLMARKERSHAPE" val="OTL"/>
 </p:tagLst>

</xml_diff>